<commit_message>
imporved search space size estimation.
</commit_message>
<xml_diff>
--- a/slides/05_games.pptx
+++ b/slides/05_games.pptx
@@ -246,7 +246,7 @@
             <a:fld id="{46E2045A-045A-4BC7-A4D3-1395440B1C3D}" type="datetimeFigureOut">
               <a:rPr lang="en-US" smtClean="0"/>
               <a:pPr/>
-              <a:t>10/27/2021</a:t>
+              <a:t>11/1/2021</a:t>
             </a:fld>
             <a:endParaRPr lang="en-US"/>
           </a:p>
@@ -4755,6 +4755,60 @@
           </a:p>
         </p:txBody>
       </p:sp>
+      <p:sp>
+        <p:nvSpPr>
+          <p:cNvPr id="15" name="Callout: Line 14">
+            <a:extLst>
+              <a:ext uri="{FF2B5EF4-FFF2-40B4-BE49-F238E27FC236}">
+                <a16:creationId xmlns:a16="http://schemas.microsoft.com/office/drawing/2014/main" id="{4916C582-6F81-4FB7-8A93-69B2C345120C}"/>
+              </a:ext>
+            </a:extLst>
+          </p:cNvPr>
+          <p:cNvSpPr/>
+          <p:nvPr/>
+        </p:nvSpPr>
+        <p:spPr>
+          <a:xfrm>
+            <a:off x="4844820" y="4998880"/>
+            <a:ext cx="3061678" cy="370322"/>
+          </a:xfrm>
+          <a:prstGeom prst="borderCallout1">
+            <a:avLst>
+              <a:gd name="adj1" fmla="val 54831"/>
+              <a:gd name="adj2" fmla="val -989"/>
+              <a:gd name="adj3" fmla="val 88967"/>
+              <a:gd name="adj4" fmla="val -19654"/>
+            </a:avLst>
+          </a:prstGeom>
+        </p:spPr>
+        <p:style>
+          <a:lnRef idx="2">
+            <a:schemeClr val="accent1">
+              <a:shade val="50000"/>
+            </a:schemeClr>
+          </a:lnRef>
+          <a:fillRef idx="1">
+            <a:schemeClr val="accent1"/>
+          </a:fillRef>
+          <a:effectRef idx="0">
+            <a:schemeClr val="accent1"/>
+          </a:effectRef>
+          <a:fontRef idx="minor">
+            <a:schemeClr val="lt1"/>
+          </a:fontRef>
+        </p:style>
+        <p:txBody>
+          <a:bodyPr rtlCol="0" anchor="ctr"/>
+          <a:lstStyle/>
+          <a:p>
+            <a:pPr algn="ctr"/>
+            <a:r>
+              <a:rPr lang="en-US" sz="1600" dirty="0"/>
+              <a:t>abandon subtree if a loss is found</a:t>
+            </a:r>
+          </a:p>
+        </p:txBody>
+      </p:sp>
     </p:spTree>
     <p:extLst>
       <p:ext uri="{BB962C8B-B14F-4D97-AF65-F5344CB8AC3E}">
@@ -5013,8 +5067,8 @@
         </p:nvSpPr>
         <p:spPr>
           <a:xfrm>
-            <a:off x="4669054" y="4207005"/>
-            <a:ext cx="3718367" cy="2031325"/>
+            <a:off x="4669054" y="3962400"/>
+            <a:ext cx="3718367" cy="2585323"/>
           </a:xfrm>
           <a:prstGeom prst="rect">
             <a:avLst/>
@@ -5046,7 +5100,7 @@
             </a:r>
             <a:r>
               <a:rPr lang="en-US" dirty="0"/>
-              <a:t>: Find a subtree that has only win leaf nodes (utility +1).</a:t>
+              <a:t>: Find a subtree that has only win leaf nodes (utility +1). We can abandon the subtree if we find a loss (utility -1).</a:t>
             </a:r>
           </a:p>
           <a:p>
@@ -5106,6 +5160,56 @@
             <a:r>
               <a:rPr lang="en-US" dirty="0"/>
               <a:t>MIN’s actions introduce non-determinism (AND).</a:t>
+            </a:r>
+          </a:p>
+        </p:txBody>
+      </p:sp>
+      <p:sp>
+        <p:nvSpPr>
+          <p:cNvPr id="12" name="TextBox 11">
+            <a:extLst>
+              <a:ext uri="{FF2B5EF4-FFF2-40B4-BE49-F238E27FC236}">
+                <a16:creationId xmlns:a16="http://schemas.microsoft.com/office/drawing/2014/main" id="{49723AB9-BDC0-4100-BB0D-CDB4036CFABE}"/>
+              </a:ext>
+            </a:extLst>
+          </p:cNvPr>
+          <p:cNvSpPr txBox="1"/>
+          <p:nvPr/>
+        </p:nvSpPr>
+        <p:spPr>
+          <a:xfrm>
+            <a:off x="6283245" y="2215627"/>
+            <a:ext cx="2508507" cy="646331"/>
+          </a:xfrm>
+          <a:prstGeom prst="rect">
+            <a:avLst/>
+          </a:prstGeom>
+          <a:noFill/>
+        </p:spPr>
+        <p:txBody>
+          <a:bodyPr wrap="none" rtlCol="0">
+            <a:spAutoFit/>
+          </a:bodyPr>
+          <a:lstStyle/>
+          <a:p>
+            <a:r>
+              <a:rPr lang="en-US" b="1" dirty="0">
+                <a:solidFill>
+                  <a:srgbClr val="FF0000"/>
+                </a:solidFill>
+              </a:rPr>
+              <a:t>Pick an action that leads</a:t>
+            </a:r>
+          </a:p>
+          <a:p>
+            <a:pPr algn="ctr"/>
+            <a:r>
+              <a:rPr lang="en-US" b="1" dirty="0">
+                <a:solidFill>
+                  <a:srgbClr val="FF0000"/>
+                </a:solidFill>
+              </a:rPr>
+              <a:t> to only win leaves.</a:t>
             </a:r>
           </a:p>
         </p:txBody>
@@ -22117,7 +22221,7 @@
         </p:blipFill>
         <p:spPr>
           <a:xfrm>
-            <a:off x="228600" y="1690689"/>
+            <a:off x="228601" y="1690689"/>
             <a:ext cx="8077200" cy="4913117"/>
           </a:xfrm>
           <a:prstGeom prst="rect">
@@ -22125,8 +22229,8 @@
           </a:prstGeom>
         </p:spPr>
       </p:pic>
-      <mc:AlternateContent xmlns:mc="http://schemas.openxmlformats.org/markup-compatibility/2006" xmlns:a14="http://schemas.microsoft.com/office/drawing/2010/main">
-        <mc:Choice Requires="a14">
+      <mc:AlternateContent xmlns:mc="http://schemas.openxmlformats.org/markup-compatibility/2006">
+        <mc:Choice xmlns:a14="http://schemas.microsoft.com/office/drawing/2010/main" Requires="a14">
           <p:sp>
             <p:nvSpPr>
               <p:cNvPr id="3" name="TextBox 2">
@@ -22141,8 +22245,8 @@
             </p:nvSpPr>
             <p:spPr>
               <a:xfrm>
-                <a:off x="5667375" y="3657600"/>
-                <a:ext cx="2743200" cy="2862322"/>
+                <a:off x="5667374" y="3906892"/>
+                <a:ext cx="3248025" cy="2578976"/>
               </a:xfrm>
               <a:prstGeom prst="rect">
                 <a:avLst/>
@@ -22231,7 +22335,6 @@
                 </a:r>
               </a:p>
               <a:p>
-                <a:pPr/>
                 <a14:m>
                   <m:oMathPara xmlns:m="http://schemas.openxmlformats.org/officeDocument/2006/math">
                     <m:oMathParaPr>
@@ -22239,41 +22342,107 @@
                     </m:oMathParaPr>
                     <m:oMath xmlns:m="http://schemas.openxmlformats.org/officeDocument/2006/math">
                       <m:r>
-                        <a:rPr lang="en-US" i="1">
+                        <a:rPr lang="en-US" b="0" i="0" smtClean="0">
                           <a:latin typeface="Cambria Math" panose="02040503050406030204" pitchFamily="18" charset="0"/>
                         </a:rPr>
-                        <m:t>9!=362</m:t>
+                        <m:t>1</m:t>
                       </m:r>
+                      <m:d>
+                        <m:dPr>
+                          <m:ctrlPr>
+                            <a:rPr lang="en-US" b="0" i="1" smtClean="0">
+                              <a:latin typeface="Cambria Math" panose="02040503050406030204" pitchFamily="18" charset="0"/>
+                            </a:rPr>
+                          </m:ctrlPr>
+                        </m:dPr>
+                        <m:e>
+                          <m:r>
+                            <a:rPr lang="en-US" b="0" i="1" smtClean="0">
+                              <a:latin typeface="Cambria Math" panose="02040503050406030204" pitchFamily="18" charset="0"/>
+                            </a:rPr>
+                            <m:t>9</m:t>
+                          </m:r>
+                        </m:e>
+                      </m:d>
+                      <m:d>
+                        <m:dPr>
+                          <m:ctrlPr>
+                            <a:rPr lang="en-US" b="0" i="1" smtClean="0">
+                              <a:latin typeface="Cambria Math" panose="02040503050406030204" pitchFamily="18" charset="0"/>
+                            </a:rPr>
+                          </m:ctrlPr>
+                        </m:dPr>
+                        <m:e>
+                          <m:r>
+                            <a:rPr lang="en-US" b="0" i="1" smtClean="0">
+                              <a:latin typeface="Cambria Math" panose="02040503050406030204" pitchFamily="18" charset="0"/>
+                            </a:rPr>
+                            <m:t>9× 8</m:t>
+                          </m:r>
+                        </m:e>
+                      </m:d>
+                      <m:d>
+                        <m:dPr>
+                          <m:ctrlPr>
+                            <a:rPr lang="en-US" b="0" i="1" smtClean="0">
+                              <a:latin typeface="Cambria Math" panose="02040503050406030204" pitchFamily="18" charset="0"/>
+                            </a:rPr>
+                          </m:ctrlPr>
+                        </m:dPr>
+                        <m:e>
+                          <m:r>
+                            <a:rPr lang="en-US" b="0" i="1" smtClean="0">
+                              <a:latin typeface="Cambria Math" panose="02040503050406030204" pitchFamily="18" charset="0"/>
+                            </a:rPr>
+                            <m:t>9×8×7</m:t>
+                          </m:r>
+                        </m:e>
+                      </m:d>
                       <m:r>
                         <a:rPr lang="en-US" b="0" i="1" smtClean="0">
                           <a:latin typeface="Cambria Math" panose="02040503050406030204" pitchFamily="18" charset="0"/>
                         </a:rPr>
-                        <m:t>,</m:t>
+                        <m:t>…</m:t>
                       </m:r>
+                      <m:d>
+                        <m:dPr>
+                          <m:ctrlPr>
+                            <a:rPr lang="en-US" b="0" i="1" smtClean="0">
+                              <a:latin typeface="Cambria Math" panose="02040503050406030204" pitchFamily="18" charset="0"/>
+                            </a:rPr>
+                          </m:ctrlPr>
+                        </m:dPr>
+                        <m:e>
+                          <m:r>
+                            <a:rPr lang="en-US" i="1">
+                              <a:latin typeface="Cambria Math" panose="02040503050406030204" pitchFamily="18" charset="0"/>
+                            </a:rPr>
+                            <m:t>9!</m:t>
+                          </m:r>
+                        </m:e>
+                      </m:d>
                       <m:r>
                         <a:rPr lang="en-US" i="1">
                           <a:latin typeface="Cambria Math" panose="02040503050406030204" pitchFamily="18" charset="0"/>
                         </a:rPr>
-                        <m:t>880</m:t>
+                        <m:t>=</m:t>
+                      </m:r>
+                      <m:r>
+                        <m:rPr>
+                          <m:nor/>
+                        </m:rPr>
+                        <a:rPr lang="en-US" dirty="0"/>
+                        <m:t>986,409</m:t>
                       </m:r>
                     </m:oMath>
                   </m:oMathPara>
                 </a14:m>
                 <a:endParaRPr lang="en-US" dirty="0"/>
               </a:p>
-              <a:p>
-                <a:endParaRPr lang="en-US" dirty="0"/>
-              </a:p>
-              <a:p>
-                <a:r>
-                  <a:rPr lang="en-US" dirty="0"/>
-                  <a:t>What can we do?</a:t>
-                </a:r>
-              </a:p>
             </p:txBody>
           </p:sp>
         </mc:Choice>
-        <mc:Fallback xmlns="">
+        <mc:Fallback>
           <p:sp>
             <p:nvSpPr>
               <p:cNvPr id="3" name="TextBox 2">
@@ -22290,8 +22459,8 @@
             </p:nvSpPr>
             <p:spPr>
               <a:xfrm>
-                <a:off x="5667375" y="3657600"/>
-                <a:ext cx="2743200" cy="2862322"/>
+                <a:off x="5667374" y="3906892"/>
+                <a:ext cx="3248025" cy="2578976"/>
               </a:xfrm>
               <a:prstGeom prst="rect">
                 <a:avLst/>
@@ -22299,7 +22468,7 @@
               <a:blipFill>
                 <a:blip r:embed="rId3"/>
                 <a:stretch>
-                  <a:fillRect l="-1766" t="-846" b="-1903"/>
+                  <a:fillRect l="-1495" t="-1174" r="-935"/>
                 </a:stretch>
               </a:blipFill>
             </p:spPr>
@@ -22443,6 +22612,206 @@
           </a:prstGeom>
         </p:spPr>
       </p:pic>
+      <p:sp>
+        <p:nvSpPr>
+          <p:cNvPr id="5" name="TextBox 4">
+            <a:extLst>
+              <a:ext uri="{FF2B5EF4-FFF2-40B4-BE49-F238E27FC236}">
+                <a16:creationId xmlns:a16="http://schemas.microsoft.com/office/drawing/2014/main" id="{F7B16DBF-E91D-4E6F-8287-E3D79BA3D854}"/>
+              </a:ext>
+            </a:extLst>
+          </p:cNvPr>
+          <p:cNvSpPr txBox="1"/>
+          <p:nvPr/>
+        </p:nvSpPr>
+        <p:spPr>
+          <a:xfrm>
+            <a:off x="8333679" y="1887741"/>
+            <a:ext cx="301686" cy="369332"/>
+          </a:xfrm>
+          <a:prstGeom prst="rect">
+            <a:avLst/>
+          </a:prstGeom>
+          <a:noFill/>
+        </p:spPr>
+        <p:txBody>
+          <a:bodyPr wrap="none" rtlCol="0">
+            <a:spAutoFit/>
+          </a:bodyPr>
+          <a:lstStyle/>
+          <a:p>
+            <a:r>
+              <a:rPr lang="en-US" dirty="0"/>
+              <a:t>1</a:t>
+            </a:r>
+          </a:p>
+        </p:txBody>
+      </p:sp>
+      <p:sp>
+        <p:nvSpPr>
+          <p:cNvPr id="8" name="TextBox 7">
+            <a:extLst>
+              <a:ext uri="{FF2B5EF4-FFF2-40B4-BE49-F238E27FC236}">
+                <a16:creationId xmlns:a16="http://schemas.microsoft.com/office/drawing/2014/main" id="{3D204637-4DE1-4B4C-ADAF-BF4747C36F31}"/>
+              </a:ext>
+            </a:extLst>
+          </p:cNvPr>
+          <p:cNvSpPr txBox="1"/>
+          <p:nvPr/>
+        </p:nvSpPr>
+        <p:spPr>
+          <a:xfrm>
+            <a:off x="8332425" y="2741545"/>
+            <a:ext cx="301686" cy="369332"/>
+          </a:xfrm>
+          <a:prstGeom prst="rect">
+            <a:avLst/>
+          </a:prstGeom>
+          <a:noFill/>
+        </p:spPr>
+        <p:txBody>
+          <a:bodyPr wrap="none" rtlCol="0">
+            <a:spAutoFit/>
+          </a:bodyPr>
+          <a:lstStyle/>
+          <a:p>
+            <a:r>
+              <a:rPr lang="en-US" dirty="0"/>
+              <a:t>9</a:t>
+            </a:r>
+          </a:p>
+        </p:txBody>
+      </p:sp>
+      <mc:AlternateContent xmlns:mc="http://schemas.openxmlformats.org/markup-compatibility/2006">
+        <mc:Choice xmlns:a14="http://schemas.microsoft.com/office/drawing/2010/main" Requires="a14">
+          <p:sp>
+            <p:nvSpPr>
+              <p:cNvPr id="10" name="TextBox 9">
+                <a:extLst>
+                  <a:ext uri="{FF2B5EF4-FFF2-40B4-BE49-F238E27FC236}">
+                    <a16:creationId xmlns:a16="http://schemas.microsoft.com/office/drawing/2014/main" id="{3D4F050A-6F0B-4BA0-836E-21A35B502F69}"/>
+                  </a:ext>
+                </a:extLst>
+              </p:cNvPr>
+              <p:cNvSpPr txBox="1"/>
+              <p:nvPr/>
+            </p:nvSpPr>
+            <p:spPr>
+              <a:xfrm>
+                <a:off x="8134476" y="3410683"/>
+                <a:ext cx="761747" cy="369332"/>
+              </a:xfrm>
+              <a:prstGeom prst="rect">
+                <a:avLst/>
+              </a:prstGeom>
+              <a:noFill/>
+            </p:spPr>
+            <p:txBody>
+              <a:bodyPr wrap="none" rtlCol="0">
+                <a:spAutoFit/>
+              </a:bodyPr>
+              <a:lstStyle/>
+              <a:p>
+                <a14:m>
+                  <m:oMathPara xmlns:m="http://schemas.openxmlformats.org/officeDocument/2006/math">
+                    <m:oMathParaPr>
+                      <m:jc m:val="centerGroup"/>
+                    </m:oMathParaPr>
+                    <m:oMath xmlns:m="http://schemas.openxmlformats.org/officeDocument/2006/math">
+                      <m:r>
+                        <a:rPr lang="en-US" b="0" i="1" smtClean="0">
+                          <a:latin typeface="Cambria Math" panose="02040503050406030204" pitchFamily="18" charset="0"/>
+                        </a:rPr>
+                        <m:t>9×8</m:t>
+                      </m:r>
+                    </m:oMath>
+                  </m:oMathPara>
+                </a14:m>
+                <a:endParaRPr lang="en-US" dirty="0"/>
+              </a:p>
+            </p:txBody>
+          </p:sp>
+        </mc:Choice>
+        <mc:Fallback>
+          <p:sp>
+            <p:nvSpPr>
+              <p:cNvPr id="10" name="TextBox 9">
+                <a:extLst>
+                  <a:ext uri="{FF2B5EF4-FFF2-40B4-BE49-F238E27FC236}">
+                    <a16:creationId xmlns:a16="http://schemas.microsoft.com/office/drawing/2014/main" id="{3D4F050A-6F0B-4BA0-836E-21A35B502F69}"/>
+                  </a:ext>
+                </a:extLst>
+              </p:cNvPr>
+              <p:cNvSpPr txBox="1">
+                <a:spLocks noRot="1" noChangeAspect="1" noMove="1" noResize="1" noEditPoints="1" noAdjustHandles="1" noChangeArrowheads="1" noChangeShapeType="1" noTextEdit="1"/>
+              </p:cNvSpPr>
+              <p:nvPr/>
+            </p:nvSpPr>
+            <p:spPr>
+              <a:xfrm>
+                <a:off x="8134476" y="3410683"/>
+                <a:ext cx="761747" cy="369332"/>
+              </a:xfrm>
+              <a:prstGeom prst="rect">
+                <a:avLst/>
+              </a:prstGeom>
+              <a:blipFill>
+                <a:blip r:embed="rId4"/>
+                <a:stretch>
+                  <a:fillRect/>
+                </a:stretch>
+              </a:blipFill>
+            </p:spPr>
+            <p:txBody>
+              <a:bodyPr/>
+              <a:lstStyle/>
+              <a:p>
+                <a:r>
+                  <a:rPr lang="en-US">
+                    <a:noFill/>
+                  </a:rPr>
+                  <a:t> </a:t>
+                </a:r>
+              </a:p>
+            </p:txBody>
+          </p:sp>
+        </mc:Fallback>
+      </mc:AlternateContent>
+      <p:sp>
+        <p:nvSpPr>
+          <p:cNvPr id="11" name="TextBox 10">
+            <a:extLst>
+              <a:ext uri="{FF2B5EF4-FFF2-40B4-BE49-F238E27FC236}">
+                <a16:creationId xmlns:a16="http://schemas.microsoft.com/office/drawing/2014/main" id="{CA637269-6CB1-4A37-B8A8-DE11D4614771}"/>
+              </a:ext>
+            </a:extLst>
+          </p:cNvPr>
+          <p:cNvSpPr txBox="1"/>
+          <p:nvPr/>
+        </p:nvSpPr>
+        <p:spPr>
+          <a:xfrm>
+            <a:off x="7826121" y="1391532"/>
+            <a:ext cx="1168910" cy="369332"/>
+          </a:xfrm>
+          <a:prstGeom prst="rect">
+            <a:avLst/>
+          </a:prstGeom>
+          <a:noFill/>
+        </p:spPr>
+        <p:txBody>
+          <a:bodyPr wrap="none" rtlCol="0">
+            <a:spAutoFit/>
+          </a:bodyPr>
+          <a:lstStyle/>
+          <a:p>
+            <a:r>
+              <a:rPr lang="en-US" dirty="0"/>
+              <a:t># of nodes</a:t>
+            </a:r>
+          </a:p>
+        </p:txBody>
+      </p:sp>
     </p:spTree>
     <p:extLst>
       <p:ext uri="{BB962C8B-B14F-4D97-AF65-F5344CB8AC3E}">

</xml_diff>

<commit_message>
improved game tree size calcualtion.
</commit_message>
<xml_diff>
--- a/slides/05_games.pptx
+++ b/slides/05_games.pptx
@@ -2772,7 +2772,7 @@
             <a:fld id="{46E2045A-045A-4BC7-A4D3-1395440B1C3D}" type="datetimeFigureOut">
               <a:rPr lang="en-US" smtClean="0"/>
               <a:pPr/>
-              <a:t>4/14/2022</a:t>
+              <a:t>10/18/2022</a:t>
             </a:fld>
             <a:endParaRPr lang="en-US"/>
           </a:p>
@@ -13733,8 +13733,8 @@
           </a:p>
         </p:txBody>
       </p:sp>
-      <mc:AlternateContent xmlns:mc="http://schemas.openxmlformats.org/markup-compatibility/2006">
-        <mc:Choice xmlns:a14="http://schemas.microsoft.com/office/drawing/2010/main" Requires="a14">
+      <mc:AlternateContent xmlns:mc="http://schemas.openxmlformats.org/markup-compatibility/2006" xmlns:a14="http://schemas.microsoft.com/office/drawing/2010/main">
+        <mc:Choice Requires="a14">
           <p:sp>
             <p:nvSpPr>
               <p:cNvPr id="3" name="Content Placeholder 2">
@@ -14096,7 +14096,7 @@
             </p:txBody>
           </p:sp>
         </mc:Choice>
-        <mc:Fallback>
+        <mc:Fallback xmlns="">
           <p:sp>
             <p:nvSpPr>
               <p:cNvPr id="3" name="Content Placeholder 2">
@@ -18199,8 +18199,8 @@
           </a:p>
         </p:txBody>
       </p:sp>
-      <mc:AlternateContent xmlns:mc="http://schemas.openxmlformats.org/markup-compatibility/2006">
-        <mc:Choice xmlns:a14="http://schemas.microsoft.com/office/drawing/2010/main" Requires="a14">
+      <mc:AlternateContent xmlns:mc="http://schemas.openxmlformats.org/markup-compatibility/2006" xmlns:a14="http://schemas.microsoft.com/office/drawing/2010/main">
+        <mc:Choice Requires="a14">
           <p:sp>
             <p:nvSpPr>
               <p:cNvPr id="5" name="Content Placeholder 4">
@@ -18760,7 +18760,7 @@
             </p:txBody>
           </p:sp>
         </mc:Choice>
-        <mc:Fallback>
+        <mc:Fallback xmlns="">
           <p:sp>
             <p:nvSpPr>
               <p:cNvPr id="5" name="Content Placeholder 4">
@@ -23241,8 +23241,8 @@
           </a:p>
         </p:txBody>
       </p:sp>
-      <mc:AlternateContent xmlns:mc="http://schemas.openxmlformats.org/markup-compatibility/2006">
-        <mc:Choice xmlns:a14="http://schemas.microsoft.com/office/drawing/2010/main" Requires="a14">
+      <mc:AlternateContent xmlns:mc="http://schemas.openxmlformats.org/markup-compatibility/2006" xmlns:a14="http://schemas.microsoft.com/office/drawing/2010/main">
+        <mc:Choice Requires="a14">
           <p:sp>
             <p:nvSpPr>
               <p:cNvPr id="3" name="Content Placeholder 2">
@@ -23374,7 +23374,7 @@
             </p:txBody>
           </p:sp>
         </mc:Choice>
-        <mc:Fallback>
+        <mc:Fallback xmlns="">
           <p:sp>
             <p:nvSpPr>
               <p:cNvPr id="3" name="Content Placeholder 2">
@@ -23808,8 +23808,8 @@
           </p:sp>
         </mc:Fallback>
       </mc:AlternateContent>
-      <mc:AlternateContent xmlns:mc="http://schemas.openxmlformats.org/markup-compatibility/2006">
-        <mc:Choice xmlns:a14="http://schemas.microsoft.com/office/drawing/2010/main" Requires="a14">
+      <mc:AlternateContent xmlns:mc="http://schemas.openxmlformats.org/markup-compatibility/2006" xmlns:a14="http://schemas.microsoft.com/office/drawing/2010/main">
+        <mc:Choice Requires="a14">
           <p:sp>
             <p:nvSpPr>
               <p:cNvPr id="6" name="Rectangle 5">
@@ -23924,7 +23924,7 @@
             </p:txBody>
           </p:sp>
         </mc:Choice>
-        <mc:Fallback>
+        <mc:Fallback xmlns="">
           <p:sp>
             <p:nvSpPr>
               <p:cNvPr id="6" name="Rectangle 5">
@@ -27612,8 +27612,8 @@
           </a:p>
         </p:txBody>
       </p:sp>
-      <mc:AlternateContent xmlns:mc="http://schemas.openxmlformats.org/markup-compatibility/2006">
-        <mc:Choice xmlns:a14="http://schemas.microsoft.com/office/drawing/2010/main" Requires="a14">
+      <mc:AlternateContent xmlns:mc="http://schemas.openxmlformats.org/markup-compatibility/2006" xmlns:a14="http://schemas.microsoft.com/office/drawing/2010/main">
+        <mc:Choice Requires="a14">
           <p:sp>
             <p:nvSpPr>
               <p:cNvPr id="5" name="Content Placeholder 4">
@@ -28415,7 +28415,7 @@
             </p:txBody>
           </p:sp>
         </mc:Choice>
-        <mc:Fallback>
+        <mc:Fallback xmlns="">
           <p:sp>
             <p:nvSpPr>
               <p:cNvPr id="5" name="Content Placeholder 4">
@@ -29601,8 +29601,8 @@
           </a:prstGeom>
         </p:spPr>
       </p:pic>
-      <mc:AlternateContent xmlns:mc="http://schemas.openxmlformats.org/markup-compatibility/2006" xmlns:a14="http://schemas.microsoft.com/office/drawing/2010/main">
-        <mc:Choice Requires="a14">
+      <mc:AlternateContent xmlns:mc="http://schemas.openxmlformats.org/markup-compatibility/2006">
+        <mc:Choice xmlns:a14="http://schemas.microsoft.com/office/drawing/2010/main" Requires="a14">
           <p:sp>
             <p:nvSpPr>
               <p:cNvPr id="3" name="TextBox 2">
@@ -29617,8 +29617,8 @@
             </p:nvSpPr>
             <p:spPr>
               <a:xfrm>
-                <a:off x="5667374" y="3906892"/>
-                <a:ext cx="3248025" cy="2855975"/>
+                <a:off x="5445464" y="3810240"/>
+                <a:ext cx="3470955" cy="1815882"/>
               </a:xfrm>
               <a:prstGeom prst="rect">
                 <a:avLst/>
@@ -29645,61 +29645,6 @@
               <a:lstStyle/>
               <a:p>
                 <a:r>
-                  <a:rPr lang="en-US" sz="1600" dirty="0"/>
-                  <a:t>The state space is a little smaller than:</a:t>
-                </a:r>
-              </a:p>
-              <a:p>
-                <a:pPr algn="ctr"/>
-                <a14:m>
-                  <m:oMath xmlns:m="http://schemas.openxmlformats.org/officeDocument/2006/math">
-                    <m:sSup>
-                      <m:sSupPr>
-                        <m:ctrlPr>
-                          <a:rPr lang="en-US" sz="1600" b="0" i="1" smtClean="0">
-                            <a:latin typeface="Cambria Math" panose="02040503050406030204" pitchFamily="18" charset="0"/>
-                          </a:rPr>
-                        </m:ctrlPr>
-                      </m:sSupPr>
-                      <m:e>
-                        <m:r>
-                          <a:rPr lang="en-US" sz="1600" b="0" i="1" smtClean="0">
-                            <a:latin typeface="Cambria Math" panose="02040503050406030204" pitchFamily="18" charset="0"/>
-                          </a:rPr>
-                          <m:t>3</m:t>
-                        </m:r>
-                      </m:e>
-                      <m:sup>
-                        <m:r>
-                          <a:rPr lang="en-US" sz="1600" b="0" i="1" smtClean="0">
-                            <a:latin typeface="Cambria Math" panose="02040503050406030204" pitchFamily="18" charset="0"/>
-                          </a:rPr>
-                          <m:t>9</m:t>
-                        </m:r>
-                      </m:sup>
-                    </m:sSup>
-                    <m:r>
-                      <a:rPr lang="en-US" sz="1600" b="0" i="0" smtClean="0">
-                        <a:latin typeface="Cambria Math" panose="02040503050406030204" pitchFamily="18" charset="0"/>
-                      </a:rPr>
-                      <m:t>=19,683  </m:t>
-                    </m:r>
-                  </m:oMath>
-                </a14:m>
-                <a:r>
-                  <a:rPr lang="en-US" sz="1600" b="0" i="0" dirty="0">
-                    <a:latin typeface="Cambria Math" panose="02040503050406030204" pitchFamily="18" charset="0"/>
-                  </a:rPr>
-                  <a:t>boards</a:t>
-                </a:r>
-              </a:p>
-              <a:p>
-                <a:endParaRPr lang="en-US" sz="1600" dirty="0">
-                  <a:latin typeface="Cambria Math" panose="02040503050406030204" pitchFamily="18" charset="0"/>
-                </a:endParaRPr>
-              </a:p>
-              <a:p>
-                <a:r>
                   <a:rPr lang="en-US" sz="1600" dirty="0">
                     <a:latin typeface="Cambria Math" panose="02040503050406030204" pitchFamily="18" charset="0"/>
                   </a:rPr>
@@ -29707,7 +29652,15 @@
                 </a:r>
                 <a:r>
                   <a:rPr lang="en-US" sz="1600" dirty="0"/>
-                  <a:t>he complete game tree size much larger because the same state (board) can be reached in different subtrees. The game tree here is a little smaller than:</a:t>
+                  <a:t>he complete game tree size is much larger because the same state (board) can be reached in different subtrees (</a:t>
+                </a:r>
+                <a:r>
+                  <a:rPr lang="en-US" sz="1600" b="1" dirty="0"/>
+                  <a:t>redundant paths</a:t>
+                </a:r>
+                <a:r>
+                  <a:rPr lang="en-US" sz="1600" dirty="0"/>
+                  <a:t>). The game tree here is a little smaller than:</a:t>
                 </a:r>
               </a:p>
               <a:p>
@@ -29724,23 +29677,12 @@
                         </a:rPr>
                         <m:t>1</m:t>
                       </m:r>
-                      <m:d>
-                        <m:dPr>
-                          <m:ctrlPr>
-                            <a:rPr lang="en-US" sz="1600" b="0" i="1" smtClean="0">
-                              <a:latin typeface="Cambria Math" panose="02040503050406030204" pitchFamily="18" charset="0"/>
-                            </a:rPr>
-                          </m:ctrlPr>
-                        </m:dPr>
-                        <m:e>
-                          <m:r>
-                            <a:rPr lang="en-US" sz="1600" b="0" i="1" smtClean="0">
-                              <a:latin typeface="Cambria Math" panose="02040503050406030204" pitchFamily="18" charset="0"/>
-                            </a:rPr>
-                            <m:t>9</m:t>
-                          </m:r>
-                        </m:e>
-                      </m:d>
+                      <m:r>
+                        <a:rPr lang="en-US" sz="1600" b="0" i="1" smtClean="0">
+                          <a:latin typeface="Cambria Math" panose="02040503050406030204" pitchFamily="18" charset="0"/>
+                        </a:rPr>
+                        <m:t>+</m:t>
+                      </m:r>
                       <m:d>
                         <m:dPr>
                           <m:ctrlPr>
@@ -29758,6 +29700,12 @@
                           </m:r>
                         </m:e>
                       </m:d>
+                      <m:r>
+                        <a:rPr lang="en-US" sz="1600" b="0" i="1" smtClean="0">
+                          <a:latin typeface="Cambria Math" panose="02040503050406030204" pitchFamily="18" charset="0"/>
+                        </a:rPr>
+                        <m:t>+</m:t>
+                      </m:r>
                       <m:d>
                         <m:dPr>
                           <m:ctrlPr>
@@ -29775,6 +29723,12 @@
                           </m:r>
                         </m:e>
                       </m:d>
+                      <m:r>
+                        <a:rPr lang="en-US" sz="1600" b="0" i="1" smtClean="0">
+                          <a:latin typeface="Cambria Math" panose="02040503050406030204" pitchFamily="18" charset="0"/>
+                        </a:rPr>
+                        <m:t>+</m:t>
+                      </m:r>
                       <m:r>
                         <a:rPr lang="en-US" sz="1600" b="0" i="1" smtClean="0">
                           <a:latin typeface="Cambria Math" panose="02040503050406030204" pitchFamily="18" charset="0"/>
@@ -29831,7 +29785,7 @@
             </p:txBody>
           </p:sp>
         </mc:Choice>
-        <mc:Fallback xmlns="">
+        <mc:Fallback>
           <p:sp>
             <p:nvSpPr>
               <p:cNvPr id="3" name="TextBox 2">
@@ -29848,8 +29802,8 @@
             </p:nvSpPr>
             <p:spPr>
               <a:xfrm>
-                <a:off x="5667374" y="3906892"/>
-                <a:ext cx="3248025" cy="2855975"/>
+                <a:off x="5445464" y="3810240"/>
+                <a:ext cx="3470955" cy="1815882"/>
               </a:xfrm>
               <a:prstGeom prst="rect">
                 <a:avLst/>
@@ -29857,7 +29811,7 @@
               <a:blipFill>
                 <a:blip r:embed="rId3"/>
                 <a:stretch>
-                  <a:fillRect l="-935" t="-425"/>
+                  <a:fillRect l="-698" t="-1329" r="-524" b="-2658"/>
                 </a:stretch>
               </a:blipFill>
             </p:spPr>
@@ -29944,7 +29898,10 @@
               </a:path>
             </a:pathLst>
           </a:custGeom>
-          <a:ln>
+          <a:ln w="28575">
+            <a:solidFill>
+              <a:srgbClr val="FF0000"/>
+            </a:solidFill>
             <a:headEnd type="none" w="med" len="med"/>
             <a:tailEnd type="triangle" w="med" len="med"/>
           </a:ln>
@@ -30071,8 +30028,8 @@
           </a:p>
         </p:txBody>
       </p:sp>
-      <mc:AlternateContent xmlns:mc="http://schemas.openxmlformats.org/markup-compatibility/2006" xmlns:a14="http://schemas.microsoft.com/office/drawing/2010/main">
-        <mc:Choice Requires="a14">
+      <mc:AlternateContent xmlns:mc="http://schemas.openxmlformats.org/markup-compatibility/2006">
+        <mc:Choice xmlns:a14="http://schemas.microsoft.com/office/drawing/2010/main" Requires="a14">
           <p:sp>
             <p:nvSpPr>
               <p:cNvPr id="10" name="TextBox 9">
@@ -30088,7 +30045,7 @@
             <p:spPr>
               <a:xfrm>
                 <a:off x="8134476" y="3410683"/>
-                <a:ext cx="761747" cy="369332"/>
+                <a:ext cx="813813" cy="646331"/>
               </a:xfrm>
               <a:prstGeom prst="rect">
                 <a:avLst/>
@@ -30119,10 +30076,17 @@
                 </a14:m>
                 <a:endParaRPr lang="en-US" dirty="0"/>
               </a:p>
+              <a:p>
+                <a:pPr/>
+                <a:r>
+                  <a:rPr lang="en-US" dirty="0"/>
+                  <a:t>  </a:t>
+                </a:r>
+              </a:p>
             </p:txBody>
           </p:sp>
         </mc:Choice>
-        <mc:Fallback xmlns="">
+        <mc:Fallback>
           <p:sp>
             <p:nvSpPr>
               <p:cNvPr id="10" name="TextBox 9">
@@ -30140,7 +30104,7 @@
             <p:spPr>
               <a:xfrm>
                 <a:off x="8134476" y="3410683"/>
-                <a:ext cx="761747" cy="369332"/>
+                <a:ext cx="813813" cy="646331"/>
               </a:xfrm>
               <a:prstGeom prst="rect">
                 <a:avLst/>
@@ -30249,6 +30213,131 @@
           <a:p>
             <a:pPr algn="ctr"/>
             <a:endParaRPr lang="en-US"/>
+          </a:p>
+        </p:txBody>
+      </p:sp>
+      <p:cxnSp>
+        <p:nvCxnSpPr>
+          <p:cNvPr id="12" name="Straight Arrow Connector 11">
+            <a:extLst>
+              <a:ext uri="{FF2B5EF4-FFF2-40B4-BE49-F238E27FC236}">
+                <a16:creationId xmlns:a16="http://schemas.microsoft.com/office/drawing/2014/main" id="{8B086F7E-51D6-0CCE-22B6-FE8EB02F2B6F}"/>
+              </a:ext>
+            </a:extLst>
+          </p:cNvPr>
+          <p:cNvCxnSpPr/>
+          <p:nvPr/>
+        </p:nvCxnSpPr>
+        <p:spPr>
+          <a:xfrm>
+            <a:off x="2286000" y="4022224"/>
+            <a:ext cx="0" cy="303033"/>
+          </a:xfrm>
+          <a:prstGeom prst="straightConnector1">
+            <a:avLst/>
+          </a:prstGeom>
+          <a:ln w="38100">
+            <a:solidFill>
+              <a:srgbClr val="FF0000"/>
+            </a:solidFill>
+            <a:tailEnd type="triangle"/>
+          </a:ln>
+        </p:spPr>
+        <p:style>
+          <a:lnRef idx="1">
+            <a:schemeClr val="accent1"/>
+          </a:lnRef>
+          <a:fillRef idx="0">
+            <a:schemeClr val="accent1"/>
+          </a:fillRef>
+          <a:effectRef idx="0">
+            <a:schemeClr val="accent1"/>
+          </a:effectRef>
+          <a:fontRef idx="minor">
+            <a:schemeClr val="tx1"/>
+          </a:fontRef>
+        </p:style>
+      </p:cxnSp>
+      <p:cxnSp>
+        <p:nvCxnSpPr>
+          <p:cNvPr id="13" name="Straight Arrow Connector 12">
+            <a:extLst>
+              <a:ext uri="{FF2B5EF4-FFF2-40B4-BE49-F238E27FC236}">
+                <a16:creationId xmlns:a16="http://schemas.microsoft.com/office/drawing/2014/main" id="{96D846CA-2030-E9AF-834C-0199CD9E2FAE}"/>
+              </a:ext>
+            </a:extLst>
+          </p:cNvPr>
+          <p:cNvCxnSpPr>
+            <a:cxnSpLocks/>
+          </p:cNvCxnSpPr>
+          <p:nvPr/>
+        </p:nvCxnSpPr>
+        <p:spPr>
+          <a:xfrm>
+            <a:off x="5032808" y="4147247"/>
+            <a:ext cx="0" cy="212800"/>
+          </a:xfrm>
+          <a:prstGeom prst="straightConnector1">
+            <a:avLst/>
+          </a:prstGeom>
+          <a:ln w="38100">
+            <a:solidFill>
+              <a:srgbClr val="FF0000"/>
+            </a:solidFill>
+            <a:tailEnd type="triangle"/>
+          </a:ln>
+        </p:spPr>
+        <p:style>
+          <a:lnRef idx="1">
+            <a:schemeClr val="accent1"/>
+          </a:lnRef>
+          <a:fillRef idx="0">
+            <a:schemeClr val="accent1"/>
+          </a:fillRef>
+          <a:effectRef idx="0">
+            <a:schemeClr val="accent1"/>
+          </a:effectRef>
+          <a:fontRef idx="minor">
+            <a:schemeClr val="tx1"/>
+          </a:fontRef>
+        </p:style>
+      </p:cxnSp>
+      <p:sp>
+        <p:nvSpPr>
+          <p:cNvPr id="15" name="TextBox 14">
+            <a:extLst>
+              <a:ext uri="{FF2B5EF4-FFF2-40B4-BE49-F238E27FC236}">
+                <a16:creationId xmlns:a16="http://schemas.microsoft.com/office/drawing/2014/main" id="{9C4D8F49-6842-C5E4-7AC4-5CF2DE69C347}"/>
+              </a:ext>
+            </a:extLst>
+          </p:cNvPr>
+          <p:cNvSpPr txBox="1"/>
+          <p:nvPr/>
+        </p:nvSpPr>
+        <p:spPr>
+          <a:xfrm>
+            <a:off x="4800600" y="3344447"/>
+            <a:ext cx="1523750" cy="338554"/>
+          </a:xfrm>
+          <a:prstGeom prst="rect">
+            <a:avLst/>
+          </a:prstGeom>
+          <a:noFill/>
+        </p:spPr>
+        <p:txBody>
+          <a:bodyPr wrap="none" rtlCol="0">
+            <a:spAutoFit/>
+          </a:bodyPr>
+          <a:lstStyle/>
+          <a:p>
+            <a:r>
+              <a:rPr lang="en-US" sz="1600" dirty="0">
+                <a:solidFill>
+                  <a:srgbClr val="FF0000"/>
+                </a:solidFill>
+              </a:rPr>
+              <a:t>Redundant path</a:t>
+            </a:r>
           </a:p>
         </p:txBody>
       </p:sp>

</xml_diff>

<commit_message>
Move ordering is its own slide now.
</commit_message>
<xml_diff>
--- a/slides/05_games.pptx
+++ b/slides/05_games.pptx
@@ -5,7 +5,7 @@
     <p:sldMasterId id="2147483708" r:id="rId1"/>
   </p:sldMasterIdLst>
   <p:notesMasterIdLst>
-    <p:notesMasterId r:id="rId43"/>
+    <p:notesMasterId r:id="rId44"/>
   </p:notesMasterIdLst>
   <p:sldIdLst>
     <p:sldId id="256" r:id="rId2"/>
@@ -30,25 +30,26 @@
     <p:sldId id="275" r:id="rId21"/>
     <p:sldId id="302" r:id="rId22"/>
     <p:sldId id="276" r:id="rId23"/>
-    <p:sldId id="277" r:id="rId24"/>
-    <p:sldId id="292" r:id="rId25"/>
-    <p:sldId id="289" r:id="rId26"/>
-    <p:sldId id="297" r:id="rId27"/>
-    <p:sldId id="278" r:id="rId28"/>
-    <p:sldId id="298" r:id="rId29"/>
-    <p:sldId id="279" r:id="rId30"/>
-    <p:sldId id="293" r:id="rId31"/>
-    <p:sldId id="280" r:id="rId32"/>
-    <p:sldId id="281" r:id="rId33"/>
-    <p:sldId id="282" r:id="rId34"/>
-    <p:sldId id="284" r:id="rId35"/>
-    <p:sldId id="304" r:id="rId36"/>
-    <p:sldId id="283" r:id="rId37"/>
-    <p:sldId id="303" r:id="rId38"/>
-    <p:sldId id="286" r:id="rId39"/>
-    <p:sldId id="287" r:id="rId40"/>
-    <p:sldId id="300" r:id="rId41"/>
-    <p:sldId id="288" r:id="rId42"/>
+    <p:sldId id="305" r:id="rId24"/>
+    <p:sldId id="277" r:id="rId25"/>
+    <p:sldId id="292" r:id="rId26"/>
+    <p:sldId id="289" r:id="rId27"/>
+    <p:sldId id="297" r:id="rId28"/>
+    <p:sldId id="278" r:id="rId29"/>
+    <p:sldId id="298" r:id="rId30"/>
+    <p:sldId id="279" r:id="rId31"/>
+    <p:sldId id="293" r:id="rId32"/>
+    <p:sldId id="280" r:id="rId33"/>
+    <p:sldId id="281" r:id="rId34"/>
+    <p:sldId id="282" r:id="rId35"/>
+    <p:sldId id="284" r:id="rId36"/>
+    <p:sldId id="304" r:id="rId37"/>
+    <p:sldId id="283" r:id="rId38"/>
+    <p:sldId id="303" r:id="rId39"/>
+    <p:sldId id="286" r:id="rId40"/>
+    <p:sldId id="287" r:id="rId41"/>
+    <p:sldId id="300" r:id="rId42"/>
+    <p:sldId id="288" r:id="rId43"/>
   </p:sldIdLst>
   <p:sldSz cx="9144000" cy="6858000" type="screen4x3"/>
   <p:notesSz cx="7315200" cy="9601200"/>
@@ -2771,7 +2772,7 @@
             <a:fld id="{46E2045A-045A-4BC7-A4D3-1395440B1C3D}" type="datetimeFigureOut">
               <a:rPr lang="en-US" smtClean="0"/>
               <a:pPr/>
-              <a:t>10/31/2022</a:t>
+              <a:t>11/2/2022</a:t>
             </a:fld>
             <a:endParaRPr lang="en-US"/>
           </a:p>
@@ -15642,8 +15643,8 @@
           </p:sp>
         </mc:Fallback>
       </mc:AlternateContent>
-      <mc:AlternateContent xmlns:mc="http://schemas.openxmlformats.org/markup-compatibility/2006">
-        <mc:Choice xmlns:a14="http://schemas.microsoft.com/office/drawing/2010/main" Requires="a14">
+      <mc:AlternateContent xmlns:mc="http://schemas.openxmlformats.org/markup-compatibility/2006" xmlns:a14="http://schemas.microsoft.com/office/drawing/2010/main">
+        <mc:Choice Requires="a14">
           <p:sp>
             <p:nvSpPr>
               <p:cNvPr id="56" name="TextBox 55">
@@ -15709,7 +15710,7 @@
             </p:txBody>
           </p:sp>
         </mc:Choice>
-        <mc:Fallback>
+        <mc:Fallback xmlns="">
           <p:sp>
             <p:nvSpPr>
               <p:cNvPr id="56" name="TextBox 55">
@@ -15754,8 +15755,8 @@
           </p:sp>
         </mc:Fallback>
       </mc:AlternateContent>
-      <mc:AlternateContent xmlns:mc="http://schemas.openxmlformats.org/markup-compatibility/2006">
-        <mc:Choice xmlns:a14="http://schemas.microsoft.com/office/drawing/2010/main" Requires="a14">
+      <mc:AlternateContent xmlns:mc="http://schemas.openxmlformats.org/markup-compatibility/2006" xmlns:a14="http://schemas.microsoft.com/office/drawing/2010/main">
+        <mc:Choice Requires="a14">
           <p:sp>
             <p:nvSpPr>
               <p:cNvPr id="57" name="TextBox 56">
@@ -15821,7 +15822,7 @@
             </p:txBody>
           </p:sp>
         </mc:Choice>
-        <mc:Fallback>
+        <mc:Fallback xmlns="">
           <p:sp>
             <p:nvSpPr>
               <p:cNvPr id="57" name="TextBox 56">
@@ -16759,86 +16760,6 @@
       </p:sp>
       <p:sp>
         <p:nvSpPr>
-          <p:cNvPr id="10" name="TextBox 9">
-            <a:extLst>
-              <a:ext uri="{FF2B5EF4-FFF2-40B4-BE49-F238E27FC236}">
-                <a16:creationId xmlns:a16="http://schemas.microsoft.com/office/drawing/2014/main" id="{F1C06FF1-A35B-4745-A762-7742FEDA0ADA}"/>
-              </a:ext>
-            </a:extLst>
-          </p:cNvPr>
-          <p:cNvSpPr txBox="1"/>
-          <p:nvPr/>
-        </p:nvSpPr>
-        <p:spPr>
-          <a:xfrm>
-            <a:off x="7239000" y="3443279"/>
-            <a:ext cx="1862176" cy="3077766"/>
-          </a:xfrm>
-          <a:prstGeom prst="rect">
-            <a:avLst/>
-          </a:prstGeom>
-        </p:spPr>
-        <p:style>
-          <a:lnRef idx="3">
-            <a:schemeClr val="lt1"/>
-          </a:lnRef>
-          <a:fillRef idx="1">
-            <a:schemeClr val="accent6"/>
-          </a:fillRef>
-          <a:effectRef idx="1">
-            <a:schemeClr val="accent6"/>
-          </a:effectRef>
-          <a:fontRef idx="minor">
-            <a:schemeClr val="lt1"/>
-          </a:fontRef>
-        </p:style>
-        <p:txBody>
-          <a:bodyPr wrap="square" rtlCol="0">
-            <a:spAutoFit/>
-          </a:bodyPr>
-          <a:lstStyle/>
-          <a:p>
-            <a:r>
-              <a:rPr lang="en-US" b="1" dirty="0"/>
-              <a:t>Notes</a:t>
-            </a:r>
-            <a:r>
-              <a:rPr lang="en-US" dirty="0"/>
-              <a:t>: </a:t>
-            </a:r>
-          </a:p>
-          <a:p>
-            <a:pPr marL="285750" indent="-285750">
-              <a:buFont typeface="Arial" panose="020B0604020202020204" pitchFamily="34" charset="0"/>
-              <a:buChar char="•"/>
-            </a:pPr>
-            <a:r>
-              <a:rPr lang="en-US" sz="1600" dirty="0"/>
-              <a:t>Pruning can be made more effective by </a:t>
-            </a:r>
-            <a:r>
-              <a:rPr lang="en-US" sz="1600" b="1" dirty="0"/>
-              <a:t>move ordering</a:t>
-            </a:r>
-            <a:r>
-              <a:rPr lang="en-US" sz="1600" dirty="0"/>
-              <a:t>: Check known good moves first to get a good bound early.</a:t>
-            </a:r>
-          </a:p>
-          <a:p>
-            <a:pPr marL="285750" indent="-285750">
-              <a:buFont typeface="Arial" panose="020B0604020202020204" pitchFamily="34" charset="0"/>
-              <a:buChar char="•"/>
-            </a:pPr>
-            <a:r>
-              <a:rPr lang="en-US" sz="1600" dirty="0"/>
-              <a:t>Optimal decision algorithms still scale poorly!</a:t>
-            </a:r>
-          </a:p>
-        </p:txBody>
-      </p:sp>
-      <p:sp>
-        <p:nvSpPr>
           <p:cNvPr id="2" name="Speech Bubble: Rectangle 1">
             <a:extLst>
               <a:ext uri="{FF2B5EF4-FFF2-40B4-BE49-F238E27FC236}">
@@ -17101,6 +17022,156 @@
 </file>
 
 <file path=ppt/slides/slide23.xml><?xml version="1.0" encoding="utf-8"?>
+<p:sld xmlns:a="http://schemas.openxmlformats.org/drawingml/2006/main" xmlns:r="http://schemas.openxmlformats.org/officeDocument/2006/relationships" xmlns:p="http://schemas.openxmlformats.org/presentationml/2006/main">
+  <p:cSld>
+    <p:spTree>
+      <p:nvGrpSpPr>
+        <p:cNvPr id="1" name=""/>
+        <p:cNvGrpSpPr/>
+        <p:nvPr/>
+      </p:nvGrpSpPr>
+      <p:grpSpPr>
+        <a:xfrm>
+          <a:off x="0" y="0"/>
+          <a:ext cx="0" cy="0"/>
+          <a:chOff x="0" y="0"/>
+          <a:chExt cx="0" cy="0"/>
+        </a:xfrm>
+      </p:grpSpPr>
+      <p:sp>
+        <p:nvSpPr>
+          <p:cNvPr id="2" name="Title 1">
+            <a:extLst>
+              <a:ext uri="{FF2B5EF4-FFF2-40B4-BE49-F238E27FC236}">
+                <a16:creationId xmlns:a16="http://schemas.microsoft.com/office/drawing/2014/main" id="{E1A8D6DE-1218-FDAF-3734-B4A4BB2D5E32}"/>
+              </a:ext>
+            </a:extLst>
+          </p:cNvPr>
+          <p:cNvSpPr>
+            <a:spLocks noGrp="1"/>
+          </p:cNvSpPr>
+          <p:nvPr>
+            <p:ph type="title"/>
+          </p:nvPr>
+        </p:nvSpPr>
+        <p:spPr/>
+        <p:txBody>
+          <a:bodyPr>
+            <a:normAutofit/>
+          </a:bodyPr>
+          <a:lstStyle/>
+          <a:p>
+            <a:r>
+              <a:rPr lang="en-US" sz="4000" dirty="0"/>
+              <a:t>Move Ordering for Alpha-Beta Search</a:t>
+            </a:r>
+          </a:p>
+        </p:txBody>
+      </p:sp>
+      <p:sp>
+        <p:nvSpPr>
+          <p:cNvPr id="3" name="Content Placeholder 2">
+            <a:extLst>
+              <a:ext uri="{FF2B5EF4-FFF2-40B4-BE49-F238E27FC236}">
+                <a16:creationId xmlns:a16="http://schemas.microsoft.com/office/drawing/2014/main" id="{1E63C81C-C722-6E32-05D7-279EB3694D55}"/>
+              </a:ext>
+            </a:extLst>
+          </p:cNvPr>
+          <p:cNvSpPr>
+            <a:spLocks noGrp="1"/>
+          </p:cNvSpPr>
+          <p:nvPr>
+            <p:ph idx="1"/>
+          </p:nvPr>
+        </p:nvSpPr>
+        <p:spPr/>
+        <p:txBody>
+          <a:bodyPr>
+            <a:normAutofit fontScale="77500" lnSpcReduction="20000"/>
+          </a:bodyPr>
+          <a:lstStyle/>
+          <a:p>
+            <a:r>
+              <a:rPr lang="en-US" b="1" dirty="0"/>
+              <a:t>Idea: </a:t>
+            </a:r>
+            <a:r>
+              <a:rPr lang="en-US" dirty="0"/>
+              <a:t>Pruning is more effective if good alpha-beta bounds can be found in the first few checked subtrees.</a:t>
+            </a:r>
+          </a:p>
+          <a:p>
+            <a:endParaRPr lang="en-US" dirty="0"/>
+          </a:p>
+          <a:p>
+            <a:r>
+              <a:rPr lang="en-US" b="1" dirty="0"/>
+              <a:t>Move ordering for DFS </a:t>
+            </a:r>
+            <a:r>
+              <a:rPr lang="en-US" dirty="0"/>
+              <a:t>= </a:t>
+            </a:r>
+            <a:r>
+              <a:rPr lang="en-US" sz="2800" dirty="0"/>
+              <a:t>Check good moves for </a:t>
+            </a:r>
+            <a:r>
+              <a:rPr lang="en-US" dirty="0"/>
+              <a:t>Min and Max </a:t>
+            </a:r>
+            <a:r>
+              <a:rPr lang="en-US" sz="2800" dirty="0"/>
+              <a:t>first.</a:t>
+            </a:r>
+          </a:p>
+          <a:p>
+            <a:endParaRPr lang="en-US" sz="2800" dirty="0"/>
+          </a:p>
+          <a:p>
+            <a:r>
+              <a:rPr lang="en-US" sz="2800" dirty="0"/>
+              <a:t>We need expert knowledge or some heuristic to determine what a good move is.</a:t>
+            </a:r>
+          </a:p>
+          <a:p>
+            <a:endParaRPr lang="en-US" dirty="0"/>
+          </a:p>
+          <a:p>
+            <a:endParaRPr lang="en-US" dirty="0"/>
+          </a:p>
+          <a:p>
+            <a:endParaRPr lang="en-US" dirty="0"/>
+          </a:p>
+          <a:p>
+            <a:r>
+              <a:rPr lang="en-US" b="1" dirty="0"/>
+              <a:t>Issue: </a:t>
+            </a:r>
+            <a:r>
+              <a:rPr lang="en-US" sz="2800" dirty="0"/>
+              <a:t>Optimal decision algorithms still scale poorly even when using alpha-beta pruning with move ordering.</a:t>
+            </a:r>
+          </a:p>
+          <a:p>
+            <a:endParaRPr lang="en-US" dirty="0"/>
+          </a:p>
+        </p:txBody>
+      </p:sp>
+    </p:spTree>
+    <p:extLst>
+      <p:ext uri="{BB962C8B-B14F-4D97-AF65-F5344CB8AC3E}">
+        <p14:creationId xmlns:p14="http://schemas.microsoft.com/office/powerpoint/2010/main" val="520730292"/>
+      </p:ext>
+    </p:extLst>
+  </p:cSld>
+  <p:clrMapOvr>
+    <a:masterClrMapping/>
+  </p:clrMapOvr>
+</p:sld>
+</file>
+
+<file path=ppt/slides/slide24.xml><?xml version="1.0" encoding="utf-8"?>
 <p:sld xmlns:a="http://schemas.openxmlformats.org/drawingml/2006/main" xmlns:r="http://schemas.openxmlformats.org/officeDocument/2006/relationships" xmlns:p="http://schemas.openxmlformats.org/presentationml/2006/main">
   <p:cSld>
     <p:bg>
@@ -17328,7 +17399,7 @@
 </p:sld>
 </file>
 
-<file path=ppt/slides/slide24.xml><?xml version="1.0" encoding="utf-8"?>
+<file path=ppt/slides/slide25.xml><?xml version="1.0" encoding="utf-8"?>
 <p:sld xmlns:a="http://schemas.openxmlformats.org/drawingml/2006/main" xmlns:r="http://schemas.openxmlformats.org/officeDocument/2006/relationships" xmlns:p="http://schemas.openxmlformats.org/presentationml/2006/main">
   <p:cSld>
     <p:bg>
@@ -17938,7 +18009,7 @@
 </p:sld>
 </file>
 
-<file path=ppt/slides/slide25.xml><?xml version="1.0" encoding="utf-8"?>
+<file path=ppt/slides/slide26.xml><?xml version="1.0" encoding="utf-8"?>
 <p:sld xmlns:a="http://schemas.openxmlformats.org/drawingml/2006/main" xmlns:r="http://schemas.openxmlformats.org/officeDocument/2006/relationships" xmlns:p="http://schemas.openxmlformats.org/presentationml/2006/main">
   <p:cSld>
     <p:spTree>
@@ -17983,8 +18054,8 @@
           </a:p>
         </p:txBody>
       </p:sp>
-      <mc:AlternateContent xmlns:mc="http://schemas.openxmlformats.org/markup-compatibility/2006">
-        <mc:Choice xmlns:a14="http://schemas.microsoft.com/office/drawing/2010/main" Requires="a14">
+      <mc:AlternateContent xmlns:mc="http://schemas.openxmlformats.org/markup-compatibility/2006" xmlns:a14="http://schemas.microsoft.com/office/drawing/2010/main">
+        <mc:Choice Requires="a14">
           <p:sp>
             <p:nvSpPr>
               <p:cNvPr id="5" name="Content Placeholder 4">
@@ -18570,7 +18641,7 @@
             </p:txBody>
           </p:sp>
         </mc:Choice>
-        <mc:Fallback>
+        <mc:Fallback xmlns="">
           <p:sp>
             <p:nvSpPr>
               <p:cNvPr id="5" name="Content Placeholder 4">
@@ -18623,7 +18694,7 @@
 </p:sld>
 </file>
 
-<file path=ppt/slides/slide26.xml><?xml version="1.0" encoding="utf-8"?>
+<file path=ppt/slides/slide27.xml><?xml version="1.0" encoding="utf-8"?>
 <p:sld xmlns:a="http://schemas.openxmlformats.org/drawingml/2006/main" xmlns:r="http://schemas.openxmlformats.org/officeDocument/2006/relationships" xmlns:p="http://schemas.openxmlformats.org/presentationml/2006/main">
   <p:cSld>
     <p:spTree>
@@ -19861,180 +19932,6 @@
     <p:extLst>
       <p:ext uri="{BB962C8B-B14F-4D97-AF65-F5344CB8AC3E}">
         <p14:creationId xmlns:p14="http://schemas.microsoft.com/office/powerpoint/2010/main" val="688209942"/>
-      </p:ext>
-    </p:extLst>
-  </p:cSld>
-  <p:clrMapOvr>
-    <a:masterClrMapping/>
-  </p:clrMapOvr>
-</p:sld>
-</file>
-
-<file path=ppt/slides/slide27.xml><?xml version="1.0" encoding="utf-8"?>
-<p:sld xmlns:a="http://schemas.openxmlformats.org/drawingml/2006/main" xmlns:r="http://schemas.openxmlformats.org/officeDocument/2006/relationships" xmlns:p="http://schemas.openxmlformats.org/presentationml/2006/main">
-  <p:cSld>
-    <p:spTree>
-      <p:nvGrpSpPr>
-        <p:cNvPr id="1" name=""/>
-        <p:cNvGrpSpPr/>
-        <p:nvPr/>
-      </p:nvGrpSpPr>
-      <p:grpSpPr>
-        <a:xfrm>
-          <a:off x="0" y="0"/>
-          <a:ext cx="0" cy="0"/>
-          <a:chOff x="0" y="0"/>
-          <a:chExt cx="0" cy="0"/>
-        </a:xfrm>
-      </p:grpSpPr>
-      <p:sp>
-        <p:nvSpPr>
-          <p:cNvPr id="4" name="Title 3">
-            <a:extLst>
-              <a:ext uri="{FF2B5EF4-FFF2-40B4-BE49-F238E27FC236}">
-                <a16:creationId xmlns:a16="http://schemas.microsoft.com/office/drawing/2014/main" id="{88FA1E8F-C7CE-4612-AADE-D5EE0193870F}"/>
-              </a:ext>
-            </a:extLst>
-          </p:cNvPr>
-          <p:cNvSpPr>
-            <a:spLocks noGrp="1"/>
-          </p:cNvSpPr>
-          <p:nvPr>
-            <p:ph type="title"/>
-          </p:nvPr>
-        </p:nvSpPr>
-        <p:spPr/>
-        <p:txBody>
-          <a:bodyPr/>
-          <a:lstStyle/>
-          <a:p>
-            <a:r>
-              <a:rPr lang="en-US" dirty="0"/>
-              <a:t>Forward pruning</a:t>
-            </a:r>
-          </a:p>
-        </p:txBody>
-      </p:sp>
-      <p:sp>
-        <p:nvSpPr>
-          <p:cNvPr id="5" name="Content Placeholder 4">
-            <a:extLst>
-              <a:ext uri="{FF2B5EF4-FFF2-40B4-BE49-F238E27FC236}">
-                <a16:creationId xmlns:a16="http://schemas.microsoft.com/office/drawing/2014/main" id="{72E9FF16-3582-40D1-A77B-69BFE9567D61}"/>
-              </a:ext>
-            </a:extLst>
-          </p:cNvPr>
-          <p:cNvSpPr>
-            <a:spLocks noGrp="1"/>
-          </p:cNvSpPr>
-          <p:nvPr>
-            <p:ph idx="1"/>
-          </p:nvPr>
-        </p:nvSpPr>
-        <p:spPr/>
-        <p:txBody>
-          <a:bodyPr>
-            <a:normAutofit fontScale="85000" lnSpcReduction="20000"/>
-          </a:bodyPr>
-          <a:lstStyle/>
-          <a:p>
-            <a:pPr marL="514350" indent="-514350">
-              <a:buFont typeface="+mj-lt"/>
-              <a:buAutoNum type="alphaLcPeriod"/>
-            </a:pPr>
-            <a:endParaRPr lang="en-US" b="1" dirty="0"/>
-          </a:p>
-          <a:p>
-            <a:pPr marL="0" indent="0">
-              <a:buNone/>
-            </a:pPr>
-            <a:r>
-              <a:rPr lang="en-US" dirty="0"/>
-              <a:t>To save time, we can prune moves that appear bad. </a:t>
-            </a:r>
-          </a:p>
-          <a:p>
-            <a:pPr marL="0" indent="0">
-              <a:buNone/>
-            </a:pPr>
-            <a:endParaRPr lang="en-US" dirty="0"/>
-          </a:p>
-          <a:p>
-            <a:pPr marL="0" indent="0">
-              <a:buNone/>
-            </a:pPr>
-            <a:r>
-              <a:rPr lang="en-US" dirty="0"/>
-              <a:t>There are many ways move quality can be evaluated:</a:t>
-            </a:r>
-          </a:p>
-          <a:p>
-            <a:pPr marL="0" indent="0">
-              <a:buNone/>
-            </a:pPr>
-            <a:endParaRPr lang="en-US" dirty="0"/>
-          </a:p>
-          <a:p>
-            <a:pPr lvl="1"/>
-            <a:r>
-              <a:rPr lang="en-US" dirty="0"/>
-              <a:t>Low heuristic value.</a:t>
-            </a:r>
-          </a:p>
-          <a:p>
-            <a:pPr lvl="1"/>
-            <a:r>
-              <a:rPr lang="en-US" dirty="0"/>
-              <a:t>Low evaluation value after shallow search (cut-off search).</a:t>
-            </a:r>
-          </a:p>
-          <a:p>
-            <a:pPr lvl="1"/>
-            <a:r>
-              <a:rPr lang="en-US" dirty="0"/>
-              <a:t>Past experience.</a:t>
-            </a:r>
-          </a:p>
-          <a:p>
-            <a:pPr marL="0" indent="0">
-              <a:buNone/>
-            </a:pPr>
-            <a:endParaRPr lang="en-US" dirty="0"/>
-          </a:p>
-          <a:p>
-            <a:pPr marL="0" indent="0">
-              <a:buNone/>
-            </a:pPr>
-            <a:endParaRPr lang="en-US" dirty="0"/>
-          </a:p>
-          <a:p>
-            <a:pPr marL="0" indent="0">
-              <a:buNone/>
-            </a:pPr>
-            <a:br>
-              <a:rPr lang="en-US" dirty="0"/>
-            </a:br>
-            <a:r>
-              <a:rPr lang="en-US" b="1" dirty="0"/>
-              <a:t>Issue</a:t>
-            </a:r>
-            <a:r>
-              <a:rPr lang="en-US" dirty="0"/>
-              <a:t>: May prune important moves.</a:t>
-            </a:r>
-          </a:p>
-          <a:p>
-            <a:endParaRPr lang="en-US" dirty="0"/>
-          </a:p>
-          <a:p>
-            <a:endParaRPr lang="en-US" dirty="0"/>
-          </a:p>
-        </p:txBody>
-      </p:sp>
-    </p:spTree>
-    <p:extLst>
-      <p:ext uri="{BB962C8B-B14F-4D97-AF65-F5344CB8AC3E}">
-        <p14:creationId xmlns:p14="http://schemas.microsoft.com/office/powerpoint/2010/main" val="3779540540"/>
       </p:ext>
     </p:extLst>
   </p:cSld>
@@ -20063,6 +19960,180 @@
       </p:grpSpPr>
       <p:sp>
         <p:nvSpPr>
+          <p:cNvPr id="4" name="Title 3">
+            <a:extLst>
+              <a:ext uri="{FF2B5EF4-FFF2-40B4-BE49-F238E27FC236}">
+                <a16:creationId xmlns:a16="http://schemas.microsoft.com/office/drawing/2014/main" id="{88FA1E8F-C7CE-4612-AADE-D5EE0193870F}"/>
+              </a:ext>
+            </a:extLst>
+          </p:cNvPr>
+          <p:cNvSpPr>
+            <a:spLocks noGrp="1"/>
+          </p:cNvSpPr>
+          <p:nvPr>
+            <p:ph type="title"/>
+          </p:nvPr>
+        </p:nvSpPr>
+        <p:spPr/>
+        <p:txBody>
+          <a:bodyPr/>
+          <a:lstStyle/>
+          <a:p>
+            <a:r>
+              <a:rPr lang="en-US" dirty="0"/>
+              <a:t>Forward pruning</a:t>
+            </a:r>
+          </a:p>
+        </p:txBody>
+      </p:sp>
+      <p:sp>
+        <p:nvSpPr>
+          <p:cNvPr id="5" name="Content Placeholder 4">
+            <a:extLst>
+              <a:ext uri="{FF2B5EF4-FFF2-40B4-BE49-F238E27FC236}">
+                <a16:creationId xmlns:a16="http://schemas.microsoft.com/office/drawing/2014/main" id="{72E9FF16-3582-40D1-A77B-69BFE9567D61}"/>
+              </a:ext>
+            </a:extLst>
+          </p:cNvPr>
+          <p:cNvSpPr>
+            <a:spLocks noGrp="1"/>
+          </p:cNvSpPr>
+          <p:nvPr>
+            <p:ph idx="1"/>
+          </p:nvPr>
+        </p:nvSpPr>
+        <p:spPr/>
+        <p:txBody>
+          <a:bodyPr>
+            <a:normAutofit fontScale="85000" lnSpcReduction="20000"/>
+          </a:bodyPr>
+          <a:lstStyle/>
+          <a:p>
+            <a:pPr marL="514350" indent="-514350">
+              <a:buFont typeface="+mj-lt"/>
+              <a:buAutoNum type="alphaLcPeriod"/>
+            </a:pPr>
+            <a:endParaRPr lang="en-US" b="1" dirty="0"/>
+          </a:p>
+          <a:p>
+            <a:pPr marL="0" indent="0">
+              <a:buNone/>
+            </a:pPr>
+            <a:r>
+              <a:rPr lang="en-US" dirty="0"/>
+              <a:t>To save time, we can prune moves that appear bad. </a:t>
+            </a:r>
+          </a:p>
+          <a:p>
+            <a:pPr marL="0" indent="0">
+              <a:buNone/>
+            </a:pPr>
+            <a:endParaRPr lang="en-US" dirty="0"/>
+          </a:p>
+          <a:p>
+            <a:pPr marL="0" indent="0">
+              <a:buNone/>
+            </a:pPr>
+            <a:r>
+              <a:rPr lang="en-US" dirty="0"/>
+              <a:t>There are many ways move quality can be evaluated:</a:t>
+            </a:r>
+          </a:p>
+          <a:p>
+            <a:pPr marL="0" indent="0">
+              <a:buNone/>
+            </a:pPr>
+            <a:endParaRPr lang="en-US" dirty="0"/>
+          </a:p>
+          <a:p>
+            <a:pPr lvl="1"/>
+            <a:r>
+              <a:rPr lang="en-US" dirty="0"/>
+              <a:t>Low heuristic value.</a:t>
+            </a:r>
+          </a:p>
+          <a:p>
+            <a:pPr lvl="1"/>
+            <a:r>
+              <a:rPr lang="en-US" dirty="0"/>
+              <a:t>Low evaluation value after shallow search (cut-off search).</a:t>
+            </a:r>
+          </a:p>
+          <a:p>
+            <a:pPr lvl="1"/>
+            <a:r>
+              <a:rPr lang="en-US" dirty="0"/>
+              <a:t>Past experience.</a:t>
+            </a:r>
+          </a:p>
+          <a:p>
+            <a:pPr marL="0" indent="0">
+              <a:buNone/>
+            </a:pPr>
+            <a:endParaRPr lang="en-US" dirty="0"/>
+          </a:p>
+          <a:p>
+            <a:pPr marL="0" indent="0">
+              <a:buNone/>
+            </a:pPr>
+            <a:endParaRPr lang="en-US" dirty="0"/>
+          </a:p>
+          <a:p>
+            <a:pPr marL="0" indent="0">
+              <a:buNone/>
+            </a:pPr>
+            <a:br>
+              <a:rPr lang="en-US" dirty="0"/>
+            </a:br>
+            <a:r>
+              <a:rPr lang="en-US" b="1" dirty="0"/>
+              <a:t>Issue</a:t>
+            </a:r>
+            <a:r>
+              <a:rPr lang="en-US" dirty="0"/>
+              <a:t>: May prune important moves.</a:t>
+            </a:r>
+          </a:p>
+          <a:p>
+            <a:endParaRPr lang="en-US" dirty="0"/>
+          </a:p>
+          <a:p>
+            <a:endParaRPr lang="en-US" dirty="0"/>
+          </a:p>
+        </p:txBody>
+      </p:sp>
+    </p:spTree>
+    <p:extLst>
+      <p:ext uri="{BB962C8B-B14F-4D97-AF65-F5344CB8AC3E}">
+        <p14:creationId xmlns:p14="http://schemas.microsoft.com/office/powerpoint/2010/main" val="3779540540"/>
+      </p:ext>
+    </p:extLst>
+  </p:cSld>
+  <p:clrMapOvr>
+    <a:masterClrMapping/>
+  </p:clrMapOvr>
+</p:sld>
+</file>
+
+<file path=ppt/slides/slide29.xml><?xml version="1.0" encoding="utf-8"?>
+<p:sld xmlns:a="http://schemas.openxmlformats.org/drawingml/2006/main" xmlns:r="http://schemas.openxmlformats.org/officeDocument/2006/relationships" xmlns:p="http://schemas.openxmlformats.org/presentationml/2006/main">
+  <p:cSld>
+    <p:spTree>
+      <p:nvGrpSpPr>
+        <p:cNvPr id="1" name=""/>
+        <p:cNvGrpSpPr/>
+        <p:nvPr/>
+      </p:nvGrpSpPr>
+      <p:grpSpPr>
+        <a:xfrm>
+          <a:off x="0" y="0"/>
+          <a:ext cx="0" cy="0"/>
+          <a:chOff x="0" y="0"/>
+          <a:chExt cx="0" cy="0"/>
+        </a:xfrm>
+      </p:grpSpPr>
+      <p:sp>
+        <p:nvSpPr>
           <p:cNvPr id="2" name="Title 1">
             <a:extLst>
               <a:ext uri="{FF2B5EF4-FFF2-40B4-BE49-F238E27FC236}">
@@ -21427,237 +21498,6 @@
   </p:cSld>
   <p:clrMapOvr>
     <a:masterClrMapping/>
-  </p:clrMapOvr>
-</p:sld>
-</file>
-
-<file path=ppt/slides/slide29.xml><?xml version="1.0" encoding="utf-8"?>
-<p:sld xmlns:a="http://schemas.openxmlformats.org/drawingml/2006/main" xmlns:r="http://schemas.openxmlformats.org/officeDocument/2006/relationships" xmlns:p="http://schemas.openxmlformats.org/presentationml/2006/main">
-  <p:cSld>
-    <p:bg>
-      <p:bgPr>
-        <a:solidFill>
-          <a:srgbClr val="000000"/>
-        </a:solidFill>
-        <a:effectLst/>
-      </p:bgPr>
-    </p:bg>
-    <p:spTree>
-      <p:nvGrpSpPr>
-        <p:cNvPr id="1" name=""/>
-        <p:cNvGrpSpPr/>
-        <p:nvPr/>
-      </p:nvGrpSpPr>
-      <p:grpSpPr>
-        <a:xfrm>
-          <a:off x="0" y="0"/>
-          <a:ext cx="0" cy="0"/>
-          <a:chOff x="0" y="0"/>
-          <a:chExt cx="0" cy="0"/>
-        </a:xfrm>
-      </p:grpSpPr>
-      <p:sp>
-        <p:nvSpPr>
-          <p:cNvPr id="71" name="Rectangle 70">
-            <a:extLst>
-              <a:ext uri="{FF2B5EF4-FFF2-40B4-BE49-F238E27FC236}">
-                <a16:creationId xmlns:a16="http://schemas.microsoft.com/office/drawing/2014/main" id="{71B2258F-86CA-4D4D-8270-BC05FCDEBFB3}"/>
-              </a:ext>
-              <a:ext uri="{C183D7F6-B498-43B3-948B-1728B52AA6E4}">
-                <adec:decorative xmlns:adec="http://schemas.microsoft.com/office/drawing/2017/decorative" val="1"/>
-              </a:ext>
-            </a:extLst>
-          </p:cNvPr>
-          <p:cNvSpPr>
-            <a:spLocks noGrp="1" noRot="1" noChangeAspect="1" noMove="1" noResize="1" noEditPoints="1" noAdjustHandles="1" noChangeArrowheads="1" noChangeShapeType="1" noTextEdit="1"/>
-          </p:cNvSpPr>
-          <p:nvPr>
-            <p:extLst>
-              <p:ext uri="{386F3935-93C4-4BCD-93E2-E3B085C9AB24}">
-                <p16:designElem xmlns:p16="http://schemas.microsoft.com/office/powerpoint/2015/main" val="1"/>
-              </p:ext>
-            </p:extLst>
-          </p:nvPr>
-        </p:nvSpPr>
-        <p:spPr>
-          <a:xfrm>
-            <a:off x="0" y="0"/>
-            <a:ext cx="9144000" cy="6857999"/>
-          </a:xfrm>
-          <a:prstGeom prst="rect">
-            <a:avLst/>
-          </a:prstGeom>
-          <a:solidFill>
-            <a:srgbClr val="000000"/>
-          </a:solidFill>
-          <a:ln>
-            <a:noFill/>
-          </a:ln>
-        </p:spPr>
-        <p:style>
-          <a:lnRef idx="2">
-            <a:schemeClr val="accent1">
-              <a:shade val="50000"/>
-            </a:schemeClr>
-          </a:lnRef>
-          <a:fillRef idx="1">
-            <a:schemeClr val="accent1"/>
-          </a:fillRef>
-          <a:effectRef idx="0">
-            <a:schemeClr val="accent1"/>
-          </a:effectRef>
-          <a:fontRef idx="minor">
-            <a:schemeClr val="lt1"/>
-          </a:fontRef>
-        </p:style>
-        <p:txBody>
-          <a:bodyPr rtlCol="0" anchor="ctr"/>
-          <a:lstStyle/>
-          <a:p>
-            <a:pPr algn="ctr"/>
-            <a:endParaRPr lang="en-US"/>
-          </a:p>
-        </p:txBody>
-      </p:sp>
-      <p:pic>
-        <p:nvPicPr>
-          <p:cNvPr id="3074" name="Picture 2" descr="Image result for roulette">
-            <a:extLst>
-              <a:ext uri="{FF2B5EF4-FFF2-40B4-BE49-F238E27FC236}">
-                <a16:creationId xmlns:a16="http://schemas.microsoft.com/office/drawing/2014/main" id="{AF3FA02C-9522-4D90-A733-E1DA50E241B2}"/>
-              </a:ext>
-            </a:extLst>
-          </p:cNvPr>
-          <p:cNvPicPr>
-            <a:picLocks noChangeAspect="1" noChangeArrowheads="1"/>
-          </p:cNvPicPr>
-          <p:nvPr/>
-        </p:nvPicPr>
-        <p:blipFill rotWithShape="1">
-          <a:blip r:embed="rId2">
-            <a:alphaModFix amt="50000"/>
-            <a:extLst>
-              <a:ext uri="{28A0092B-C50C-407E-A947-70E740481C1C}">
-                <a14:useLocalDpi xmlns:a14="http://schemas.microsoft.com/office/drawing/2010/main" val="0"/>
-              </a:ext>
-            </a:extLst>
-          </a:blip>
-          <a:srcRect l="6200" r="4799" b="-2"/>
-          <a:stretch/>
-        </p:blipFill>
-        <p:spPr bwMode="auto">
-          <a:xfrm>
-            <a:off x="20" y="1"/>
-            <a:ext cx="9143980" cy="6857999"/>
-          </a:xfrm>
-          <a:prstGeom prst="rect">
-            <a:avLst/>
-          </a:prstGeom>
-          <a:noFill/>
-          <a:extLst>
-            <a:ext uri="{909E8E84-426E-40DD-AFC4-6F175D3DCCD1}">
-              <a14:hiddenFill xmlns:a14="http://schemas.microsoft.com/office/drawing/2010/main">
-                <a:solidFill>
-                  <a:srgbClr val="FFFFFF"/>
-                </a:solidFill>
-              </a14:hiddenFill>
-            </a:ext>
-          </a:extLst>
-        </p:spPr>
-      </p:pic>
-      <p:sp>
-        <p:nvSpPr>
-          <p:cNvPr id="4" name="Title 3">
-            <a:extLst>
-              <a:ext uri="{FF2B5EF4-FFF2-40B4-BE49-F238E27FC236}">
-                <a16:creationId xmlns:a16="http://schemas.microsoft.com/office/drawing/2014/main" id="{37EB4577-A182-4DCC-9D58-BA5AD1F4F6B2}"/>
-              </a:ext>
-            </a:extLst>
-          </p:cNvPr>
-          <p:cNvSpPr>
-            <a:spLocks noGrp="1"/>
-          </p:cNvSpPr>
-          <p:nvPr>
-            <p:ph type="title"/>
-          </p:nvPr>
-        </p:nvSpPr>
-        <p:spPr>
-          <a:xfrm>
-            <a:off x="1143000" y="1122362"/>
-            <a:ext cx="6858000" cy="2900518"/>
-          </a:xfrm>
-        </p:spPr>
-        <p:txBody>
-          <a:bodyPr vert="horz" lIns="91440" tIns="45720" rIns="91440" bIns="45720" rtlCol="0" anchor="b">
-            <a:normAutofit/>
-          </a:bodyPr>
-          <a:lstStyle/>
-          <a:p>
-            <a:pPr algn="ctr"/>
-            <a:r>
-              <a:rPr lang="en-US" b="1" dirty="0">
-                <a:solidFill>
-                  <a:srgbClr val="FFFFFF"/>
-                </a:solidFill>
-                <a:effectLst>
-                  <a:outerShdw blurRad="38100" dist="38100" dir="2700000" algn="tl">
-                    <a:srgbClr val="000000">
-                      <a:alpha val="43137"/>
-                    </a:srgbClr>
-                  </a:outerShdw>
-                </a:effectLst>
-              </a:rPr>
-              <a:t>Monte Carlo Tree Search (MCTS)</a:t>
-            </a:r>
-          </a:p>
-        </p:txBody>
-      </p:sp>
-      <p:sp>
-        <p:nvSpPr>
-          <p:cNvPr id="5" name="Text Placeholder 4">
-            <a:extLst>
-              <a:ext uri="{FF2B5EF4-FFF2-40B4-BE49-F238E27FC236}">
-                <a16:creationId xmlns:a16="http://schemas.microsoft.com/office/drawing/2014/main" id="{4CB8F61D-4C0E-4612-A028-69D4839D73EC}"/>
-              </a:ext>
-            </a:extLst>
-          </p:cNvPr>
-          <p:cNvSpPr>
-            <a:spLocks noGrp="1"/>
-          </p:cNvSpPr>
-          <p:nvPr>
-            <p:ph type="body" idx="1"/>
-          </p:nvPr>
-        </p:nvSpPr>
-        <p:spPr>
-          <a:xfrm>
-            <a:off x="1143000" y="4159404"/>
-            <a:ext cx="6858000" cy="1098395"/>
-          </a:xfrm>
-        </p:spPr>
-        <p:txBody>
-          <a:bodyPr vert="horz" lIns="91440" tIns="45720" rIns="91440" bIns="45720" rtlCol="0">
-            <a:normAutofit/>
-          </a:bodyPr>
-          <a:lstStyle/>
-          <a:p>
-            <a:pPr algn="ctr"/>
-            <a:endParaRPr lang="en-US">
-              <a:solidFill>
-                <a:srgbClr val="FFFFFF"/>
-              </a:solidFill>
-            </a:endParaRPr>
-          </a:p>
-        </p:txBody>
-      </p:sp>
-    </p:spTree>
-    <p:extLst>
-      <p:ext uri="{BB962C8B-B14F-4D97-AF65-F5344CB8AC3E}">
-        <p14:creationId xmlns:p14="http://schemas.microsoft.com/office/powerpoint/2010/main" val="3688985318"/>
-      </p:ext>
-    </p:extLst>
-  </p:cSld>
-  <p:clrMapOvr>
-    <a:overrideClrMapping bg1="dk1" tx1="lt1" bg2="dk2" tx2="lt2" accent1="accent1" accent2="accent2" accent3="accent3" accent4="accent4" accent5="accent5" accent6="accent6" hlink="hlink" folHlink="folHlink"/>
   </p:clrMapOvr>
 </p:sld>
 </file>
@@ -22164,6 +22004,237 @@
     <p:bg>
       <p:bgPr>
         <a:solidFill>
+          <a:srgbClr val="000000"/>
+        </a:solidFill>
+        <a:effectLst/>
+      </p:bgPr>
+    </p:bg>
+    <p:spTree>
+      <p:nvGrpSpPr>
+        <p:cNvPr id="1" name=""/>
+        <p:cNvGrpSpPr/>
+        <p:nvPr/>
+      </p:nvGrpSpPr>
+      <p:grpSpPr>
+        <a:xfrm>
+          <a:off x="0" y="0"/>
+          <a:ext cx="0" cy="0"/>
+          <a:chOff x="0" y="0"/>
+          <a:chExt cx="0" cy="0"/>
+        </a:xfrm>
+      </p:grpSpPr>
+      <p:sp>
+        <p:nvSpPr>
+          <p:cNvPr id="71" name="Rectangle 70">
+            <a:extLst>
+              <a:ext uri="{FF2B5EF4-FFF2-40B4-BE49-F238E27FC236}">
+                <a16:creationId xmlns:a16="http://schemas.microsoft.com/office/drawing/2014/main" id="{71B2258F-86CA-4D4D-8270-BC05FCDEBFB3}"/>
+              </a:ext>
+              <a:ext uri="{C183D7F6-B498-43B3-948B-1728B52AA6E4}">
+                <adec:decorative xmlns:adec="http://schemas.microsoft.com/office/drawing/2017/decorative" val="1"/>
+              </a:ext>
+            </a:extLst>
+          </p:cNvPr>
+          <p:cNvSpPr>
+            <a:spLocks noGrp="1" noRot="1" noChangeAspect="1" noMove="1" noResize="1" noEditPoints="1" noAdjustHandles="1" noChangeArrowheads="1" noChangeShapeType="1" noTextEdit="1"/>
+          </p:cNvSpPr>
+          <p:nvPr>
+            <p:extLst>
+              <p:ext uri="{386F3935-93C4-4BCD-93E2-E3B085C9AB24}">
+                <p16:designElem xmlns:p16="http://schemas.microsoft.com/office/powerpoint/2015/main" val="1"/>
+              </p:ext>
+            </p:extLst>
+          </p:nvPr>
+        </p:nvSpPr>
+        <p:spPr>
+          <a:xfrm>
+            <a:off x="0" y="0"/>
+            <a:ext cx="9144000" cy="6857999"/>
+          </a:xfrm>
+          <a:prstGeom prst="rect">
+            <a:avLst/>
+          </a:prstGeom>
+          <a:solidFill>
+            <a:srgbClr val="000000"/>
+          </a:solidFill>
+          <a:ln>
+            <a:noFill/>
+          </a:ln>
+        </p:spPr>
+        <p:style>
+          <a:lnRef idx="2">
+            <a:schemeClr val="accent1">
+              <a:shade val="50000"/>
+            </a:schemeClr>
+          </a:lnRef>
+          <a:fillRef idx="1">
+            <a:schemeClr val="accent1"/>
+          </a:fillRef>
+          <a:effectRef idx="0">
+            <a:schemeClr val="accent1"/>
+          </a:effectRef>
+          <a:fontRef idx="minor">
+            <a:schemeClr val="lt1"/>
+          </a:fontRef>
+        </p:style>
+        <p:txBody>
+          <a:bodyPr rtlCol="0" anchor="ctr"/>
+          <a:lstStyle/>
+          <a:p>
+            <a:pPr algn="ctr"/>
+            <a:endParaRPr lang="en-US"/>
+          </a:p>
+        </p:txBody>
+      </p:sp>
+      <p:pic>
+        <p:nvPicPr>
+          <p:cNvPr id="3074" name="Picture 2" descr="Image result for roulette">
+            <a:extLst>
+              <a:ext uri="{FF2B5EF4-FFF2-40B4-BE49-F238E27FC236}">
+                <a16:creationId xmlns:a16="http://schemas.microsoft.com/office/drawing/2014/main" id="{AF3FA02C-9522-4D90-A733-E1DA50E241B2}"/>
+              </a:ext>
+            </a:extLst>
+          </p:cNvPr>
+          <p:cNvPicPr>
+            <a:picLocks noChangeAspect="1" noChangeArrowheads="1"/>
+          </p:cNvPicPr>
+          <p:nvPr/>
+        </p:nvPicPr>
+        <p:blipFill rotWithShape="1">
+          <a:blip r:embed="rId2">
+            <a:alphaModFix amt="50000"/>
+            <a:extLst>
+              <a:ext uri="{28A0092B-C50C-407E-A947-70E740481C1C}">
+                <a14:useLocalDpi xmlns:a14="http://schemas.microsoft.com/office/drawing/2010/main" val="0"/>
+              </a:ext>
+            </a:extLst>
+          </a:blip>
+          <a:srcRect l="6200" r="4799" b="-2"/>
+          <a:stretch/>
+        </p:blipFill>
+        <p:spPr bwMode="auto">
+          <a:xfrm>
+            <a:off x="20" y="1"/>
+            <a:ext cx="9143980" cy="6857999"/>
+          </a:xfrm>
+          <a:prstGeom prst="rect">
+            <a:avLst/>
+          </a:prstGeom>
+          <a:noFill/>
+          <a:extLst>
+            <a:ext uri="{909E8E84-426E-40DD-AFC4-6F175D3DCCD1}">
+              <a14:hiddenFill xmlns:a14="http://schemas.microsoft.com/office/drawing/2010/main">
+                <a:solidFill>
+                  <a:srgbClr val="FFFFFF"/>
+                </a:solidFill>
+              </a14:hiddenFill>
+            </a:ext>
+          </a:extLst>
+        </p:spPr>
+      </p:pic>
+      <p:sp>
+        <p:nvSpPr>
+          <p:cNvPr id="4" name="Title 3">
+            <a:extLst>
+              <a:ext uri="{FF2B5EF4-FFF2-40B4-BE49-F238E27FC236}">
+                <a16:creationId xmlns:a16="http://schemas.microsoft.com/office/drawing/2014/main" id="{37EB4577-A182-4DCC-9D58-BA5AD1F4F6B2}"/>
+              </a:ext>
+            </a:extLst>
+          </p:cNvPr>
+          <p:cNvSpPr>
+            <a:spLocks noGrp="1"/>
+          </p:cNvSpPr>
+          <p:nvPr>
+            <p:ph type="title"/>
+          </p:nvPr>
+        </p:nvSpPr>
+        <p:spPr>
+          <a:xfrm>
+            <a:off x="1143000" y="1122362"/>
+            <a:ext cx="6858000" cy="2900518"/>
+          </a:xfrm>
+        </p:spPr>
+        <p:txBody>
+          <a:bodyPr vert="horz" lIns="91440" tIns="45720" rIns="91440" bIns="45720" rtlCol="0" anchor="b">
+            <a:normAutofit/>
+          </a:bodyPr>
+          <a:lstStyle/>
+          <a:p>
+            <a:pPr algn="ctr"/>
+            <a:r>
+              <a:rPr lang="en-US" b="1" dirty="0">
+                <a:solidFill>
+                  <a:srgbClr val="FFFFFF"/>
+                </a:solidFill>
+                <a:effectLst>
+                  <a:outerShdw blurRad="38100" dist="38100" dir="2700000" algn="tl">
+                    <a:srgbClr val="000000">
+                      <a:alpha val="43137"/>
+                    </a:srgbClr>
+                  </a:outerShdw>
+                </a:effectLst>
+              </a:rPr>
+              <a:t>Monte Carlo Tree Search (MCTS)</a:t>
+            </a:r>
+          </a:p>
+        </p:txBody>
+      </p:sp>
+      <p:sp>
+        <p:nvSpPr>
+          <p:cNvPr id="5" name="Text Placeholder 4">
+            <a:extLst>
+              <a:ext uri="{FF2B5EF4-FFF2-40B4-BE49-F238E27FC236}">
+                <a16:creationId xmlns:a16="http://schemas.microsoft.com/office/drawing/2014/main" id="{4CB8F61D-4C0E-4612-A028-69D4839D73EC}"/>
+              </a:ext>
+            </a:extLst>
+          </p:cNvPr>
+          <p:cNvSpPr>
+            <a:spLocks noGrp="1"/>
+          </p:cNvSpPr>
+          <p:nvPr>
+            <p:ph type="body" idx="1"/>
+          </p:nvPr>
+        </p:nvSpPr>
+        <p:spPr>
+          <a:xfrm>
+            <a:off x="1143000" y="4159404"/>
+            <a:ext cx="6858000" cy="1098395"/>
+          </a:xfrm>
+        </p:spPr>
+        <p:txBody>
+          <a:bodyPr vert="horz" lIns="91440" tIns="45720" rIns="91440" bIns="45720" rtlCol="0">
+            <a:normAutofit/>
+          </a:bodyPr>
+          <a:lstStyle/>
+          <a:p>
+            <a:pPr algn="ctr"/>
+            <a:endParaRPr lang="en-US">
+              <a:solidFill>
+                <a:srgbClr val="FFFFFF"/>
+              </a:solidFill>
+            </a:endParaRPr>
+          </a:p>
+        </p:txBody>
+      </p:sp>
+    </p:spTree>
+    <p:extLst>
+      <p:ext uri="{BB962C8B-B14F-4D97-AF65-F5344CB8AC3E}">
+        <p14:creationId xmlns:p14="http://schemas.microsoft.com/office/powerpoint/2010/main" val="3688985318"/>
+      </p:ext>
+    </p:extLst>
+  </p:cSld>
+  <p:clrMapOvr>
+    <a:overrideClrMapping bg1="dk1" tx1="lt1" bg2="dk2" tx2="lt2" accent1="accent1" accent2="accent2" accent3="accent3" accent4="accent4" accent5="accent5" accent6="accent6" hlink="hlink" folHlink="folHlink"/>
+  </p:clrMapOvr>
+</p:sld>
+</file>
+
+<file path=ppt/slides/slide31.xml><?xml version="1.0" encoding="utf-8"?>
+<p:sld xmlns:a="http://schemas.openxmlformats.org/drawingml/2006/main" xmlns:r="http://schemas.openxmlformats.org/officeDocument/2006/relationships" xmlns:p="http://schemas.openxmlformats.org/presentationml/2006/main">
+  <p:cSld>
+    <p:bg>
+      <p:bgPr>
+        <a:solidFill>
           <a:schemeClr val="bg1"/>
         </a:solidFill>
         <a:effectLst/>
@@ -22780,7 +22851,7 @@
 </p:sld>
 </file>
 
-<file path=ppt/slides/slide31.xml><?xml version="1.0" encoding="utf-8"?>
+<file path=ppt/slides/slide32.xml><?xml version="1.0" encoding="utf-8"?>
 <p:sld xmlns:a="http://schemas.openxmlformats.org/drawingml/2006/main" xmlns:r="http://schemas.openxmlformats.org/officeDocument/2006/relationships" xmlns:p="http://schemas.openxmlformats.org/presentationml/2006/main">
   <p:cSld>
     <p:spTree>
@@ -23006,7 +23077,7 @@
 </p:sld>
 </file>
 
-<file path=ppt/slides/slide32.xml><?xml version="1.0" encoding="utf-8"?>
+<file path=ppt/slides/slide33.xml><?xml version="1.0" encoding="utf-8"?>
 <p:sld xmlns:a="http://schemas.openxmlformats.org/drawingml/2006/main" xmlns:r="http://schemas.openxmlformats.org/officeDocument/2006/relationships" xmlns:p="http://schemas.openxmlformats.org/presentationml/2006/main">
   <p:cSld>
     <p:spTree>
@@ -23051,8 +23122,8 @@
           </a:p>
         </p:txBody>
       </p:sp>
-      <mc:AlternateContent xmlns:mc="http://schemas.openxmlformats.org/markup-compatibility/2006">
-        <mc:Choice xmlns:a14="http://schemas.microsoft.com/office/drawing/2010/main" Requires="a14">
+      <mc:AlternateContent xmlns:mc="http://schemas.openxmlformats.org/markup-compatibility/2006" xmlns:a14="http://schemas.microsoft.com/office/drawing/2010/main">
+        <mc:Choice Requires="a14">
           <p:sp>
             <p:nvSpPr>
               <p:cNvPr id="3" name="Content Placeholder 2">
@@ -23184,7 +23255,7 @@
             </p:txBody>
           </p:sp>
         </mc:Choice>
-        <mc:Fallback>
+        <mc:Fallback xmlns="">
           <p:sp>
             <p:nvSpPr>
               <p:cNvPr id="3" name="Content Placeholder 2">
@@ -23237,7 +23308,7 @@
 </p:sld>
 </file>
 
-<file path=ppt/slides/slide33.xml><?xml version="1.0" encoding="utf-8"?>
+<file path=ppt/slides/slide34.xml><?xml version="1.0" encoding="utf-8"?>
 <p:sld xmlns:a="http://schemas.openxmlformats.org/drawingml/2006/main" xmlns:r="http://schemas.openxmlformats.org/officeDocument/2006/relationships" xmlns:p="http://schemas.openxmlformats.org/presentationml/2006/main">
   <p:cSld>
     <p:spTree>
@@ -23550,7 +23621,7 @@
 </p:sld>
 </file>
 
-<file path=ppt/slides/slide34.xml><?xml version="1.0" encoding="utf-8"?>
+<file path=ppt/slides/slide35.xml><?xml version="1.0" encoding="utf-8"?>
 <p:sld xmlns:a="http://schemas.openxmlformats.org/drawingml/2006/main" xmlns:r="http://schemas.openxmlformats.org/officeDocument/2006/relationships" xmlns:p="http://schemas.openxmlformats.org/presentationml/2006/main">
   <p:cSld>
     <p:spTree>
@@ -24002,8 +24073,8 @@
           </a:p>
         </p:txBody>
       </p:sp>
-      <mc:AlternateContent xmlns:mc="http://schemas.openxmlformats.org/markup-compatibility/2006">
-        <mc:Choice xmlns:a14="http://schemas.microsoft.com/office/drawing/2010/main" Requires="a14">
+      <mc:AlternateContent xmlns:mc="http://schemas.openxmlformats.org/markup-compatibility/2006" xmlns:a14="http://schemas.microsoft.com/office/drawing/2010/main">
+        <mc:Choice Requires="a14">
           <p:sp>
             <p:nvSpPr>
               <p:cNvPr id="8" name="Rectangle 7">
@@ -24262,7 +24333,7 @@
             </p:txBody>
           </p:sp>
         </mc:Choice>
-        <mc:Fallback>
+        <mc:Fallback xmlns="">
           <p:sp>
             <p:nvSpPr>
               <p:cNvPr id="8" name="Rectangle 7">
@@ -24359,133 +24430,6 @@
 </p:sld>
 </file>
 
-<file path=ppt/slides/slide35.xml><?xml version="1.0" encoding="utf-8"?>
-<p:sld xmlns:a="http://schemas.openxmlformats.org/drawingml/2006/main" xmlns:r="http://schemas.openxmlformats.org/officeDocument/2006/relationships" xmlns:p="http://schemas.openxmlformats.org/presentationml/2006/main">
-  <p:cSld>
-    <p:spTree>
-      <p:nvGrpSpPr>
-        <p:cNvPr id="1" name=""/>
-        <p:cNvGrpSpPr/>
-        <p:nvPr/>
-      </p:nvGrpSpPr>
-      <p:grpSpPr>
-        <a:xfrm>
-          <a:off x="0" y="0"/>
-          <a:ext cx="0" cy="0"/>
-          <a:chOff x="0" y="0"/>
-          <a:chExt cx="0" cy="0"/>
-        </a:xfrm>
-      </p:grpSpPr>
-      <p:sp>
-        <p:nvSpPr>
-          <p:cNvPr id="2" name="Title 1">
-            <a:extLst>
-              <a:ext uri="{FF2B5EF4-FFF2-40B4-BE49-F238E27FC236}">
-                <a16:creationId xmlns:a16="http://schemas.microsoft.com/office/drawing/2014/main" id="{880227DC-69CE-4119-811C-2E2E6619AC91}"/>
-              </a:ext>
-            </a:extLst>
-          </p:cNvPr>
-          <p:cNvSpPr>
-            <a:spLocks noGrp="1"/>
-          </p:cNvSpPr>
-          <p:nvPr>
-            <p:ph type="title"/>
-          </p:nvPr>
-        </p:nvSpPr>
-        <p:spPr/>
-        <p:txBody>
-          <a:bodyPr/>
-          <a:lstStyle/>
-          <a:p>
-            <a:r>
-              <a:rPr lang="en-US" dirty="0"/>
-              <a:t>Monte Carlo Tree Search</a:t>
-            </a:r>
-          </a:p>
-        </p:txBody>
-      </p:sp>
-      <p:sp>
-        <p:nvSpPr>
-          <p:cNvPr id="4" name="Content Placeholder 3">
-            <a:extLst>
-              <a:ext uri="{FF2B5EF4-FFF2-40B4-BE49-F238E27FC236}">
-                <a16:creationId xmlns:a16="http://schemas.microsoft.com/office/drawing/2014/main" id="{C361553B-AF17-4D46-85D3-15DB5C1790F2}"/>
-              </a:ext>
-            </a:extLst>
-          </p:cNvPr>
-          <p:cNvSpPr txBox="1">
-            <a:spLocks noGrp="1"/>
-          </p:cNvSpPr>
-          <p:nvPr>
-            <p:ph idx="1"/>
-          </p:nvPr>
-        </p:nvSpPr>
-        <p:spPr>
-          <a:xfrm>
-            <a:off x="628650" y="1825625"/>
-            <a:ext cx="7886700" cy="4095480"/>
-          </a:xfrm>
-          <a:prstGeom prst="rect">
-            <a:avLst/>
-          </a:prstGeom>
-          <a:noFill/>
-        </p:spPr>
-        <p:txBody>
-          <a:bodyPr wrap="square">
-            <a:spAutoFit/>
-          </a:bodyPr>
-          <a:lstStyle/>
-          <a:p>
-            <a:pPr marL="0" indent="0">
-              <a:buNone/>
-            </a:pPr>
-            <a:r>
-              <a:rPr lang="en-US" dirty="0"/>
-              <a:t>We do not need to always start playouts from the current node, we can build a partial game tree and simulate from any node in that tree. </a:t>
-            </a:r>
-          </a:p>
-          <a:p>
-            <a:pPr marL="0" indent="0">
-              <a:buNone/>
-            </a:pPr>
-            <a:endParaRPr lang="en-US" dirty="0"/>
-          </a:p>
-          <a:p>
-            <a:pPr marL="0" indent="0">
-              <a:buNone/>
-            </a:pPr>
-            <a:r>
-              <a:rPr lang="en-US" dirty="0"/>
-              <a:t>Important considerations:</a:t>
-            </a:r>
-          </a:p>
-          <a:p>
-            <a:r>
-              <a:rPr lang="en-US" dirty="0"/>
-              <a:t>We can use UCB1 so decide what part of the tree we should focus on for the next playout.</a:t>
-            </a:r>
-          </a:p>
-          <a:p>
-            <a:r>
-              <a:rPr lang="en-US" dirty="0"/>
-              <a:t>We can only store a small part of the game tree, so we do not store the complete playout runs.</a:t>
-            </a:r>
-          </a:p>
-        </p:txBody>
-      </p:sp>
-    </p:spTree>
-    <p:extLst>
-      <p:ext uri="{BB962C8B-B14F-4D97-AF65-F5344CB8AC3E}">
-        <p14:creationId xmlns:p14="http://schemas.microsoft.com/office/powerpoint/2010/main" val="1280639319"/>
-      </p:ext>
-    </p:extLst>
-  </p:cSld>
-  <p:clrMapOvr>
-    <a:masterClrMapping/>
-  </p:clrMapOvr>
-</p:sld>
-</file>
-
 <file path=ppt/slides/slide36.xml><?xml version="1.0" encoding="utf-8"?>
 <p:sld xmlns:a="http://schemas.openxmlformats.org/drawingml/2006/main" xmlns:r="http://schemas.openxmlformats.org/officeDocument/2006/relationships" xmlns:p="http://schemas.openxmlformats.org/presentationml/2006/main">
   <p:cSld>
@@ -24503,246 +24447,54 @@
           <a:chExt cx="0" cy="0"/>
         </a:xfrm>
       </p:grpSpPr>
-      <p:pic>
-        <p:nvPicPr>
-          <p:cNvPr id="4" name="Picture 3">
-            <a:extLst>
-              <a:ext uri="{FF2B5EF4-FFF2-40B4-BE49-F238E27FC236}">
-                <a16:creationId xmlns:a16="http://schemas.microsoft.com/office/drawing/2014/main" id="{A2183ED0-97C8-46A9-ACE4-0AB43323E179}"/>
-              </a:ext>
-            </a:extLst>
-          </p:cNvPr>
-          <p:cNvPicPr>
-            <a:picLocks noChangeAspect="1"/>
-          </p:cNvPicPr>
-          <p:nvPr/>
-        </p:nvPicPr>
-        <p:blipFill>
-          <a:blip r:embed="rId2"/>
-          <a:stretch>
-            <a:fillRect/>
-          </a:stretch>
-        </p:blipFill>
-        <p:spPr>
-          <a:xfrm>
-            <a:off x="381000" y="354114"/>
-            <a:ext cx="8171826" cy="2437212"/>
-          </a:xfrm>
-          <a:prstGeom prst="rect">
-            <a:avLst/>
-          </a:prstGeom>
-        </p:spPr>
-        <p:style>
-          <a:lnRef idx="2">
-            <a:schemeClr val="accent2"/>
-          </a:lnRef>
-          <a:fillRef idx="1">
-            <a:schemeClr val="lt1"/>
-          </a:fillRef>
-          <a:effectRef idx="0">
-            <a:schemeClr val="accent2"/>
-          </a:effectRef>
-          <a:fontRef idx="minor">
-            <a:schemeClr val="dk1"/>
-          </a:fontRef>
-        </p:style>
-      </p:pic>
-      <p:pic>
-        <p:nvPicPr>
-          <p:cNvPr id="5" name="Picture 4">
-            <a:extLst>
-              <a:ext uri="{FF2B5EF4-FFF2-40B4-BE49-F238E27FC236}">
-                <a16:creationId xmlns:a16="http://schemas.microsoft.com/office/drawing/2014/main" id="{FF83E86E-0770-4D97-B52D-C26C85CF9C39}"/>
-              </a:ext>
-            </a:extLst>
-          </p:cNvPr>
-          <p:cNvPicPr>
-            <a:picLocks noChangeAspect="1"/>
-          </p:cNvPicPr>
-          <p:nvPr/>
-        </p:nvPicPr>
-        <p:blipFill>
-          <a:blip r:embed="rId3"/>
-          <a:stretch>
-            <a:fillRect/>
-          </a:stretch>
-        </p:blipFill>
-        <p:spPr>
-          <a:xfrm>
-            <a:off x="978351" y="2819400"/>
-            <a:ext cx="7784649" cy="3189476"/>
-          </a:xfrm>
-          <a:prstGeom prst="rect">
-            <a:avLst/>
-          </a:prstGeom>
-        </p:spPr>
-      </p:pic>
-      <p:sp>
-        <p:nvSpPr>
-          <p:cNvPr id="6" name="Speech Bubble: Rectangle 5">
-            <a:extLst>
-              <a:ext uri="{FF2B5EF4-FFF2-40B4-BE49-F238E27FC236}">
-                <a16:creationId xmlns:a16="http://schemas.microsoft.com/office/drawing/2014/main" id="{559D4B9A-014D-421F-AD0F-76EDEBC51C3A}"/>
-              </a:ext>
-            </a:extLst>
-          </p:cNvPr>
-          <p:cNvSpPr/>
-          <p:nvPr/>
-        </p:nvSpPr>
-        <p:spPr>
-          <a:xfrm>
-            <a:off x="3901408" y="5961528"/>
-            <a:ext cx="2286000" cy="838200"/>
-          </a:xfrm>
-          <a:prstGeom prst="wedgeRectCallout">
-            <a:avLst>
-              <a:gd name="adj1" fmla="val -47565"/>
-              <a:gd name="adj2" fmla="val -93817"/>
-            </a:avLst>
-          </a:prstGeom>
-        </p:spPr>
-        <p:style>
-          <a:lnRef idx="3">
-            <a:schemeClr val="lt1"/>
-          </a:lnRef>
-          <a:fillRef idx="1">
-            <a:schemeClr val="accent6"/>
-          </a:fillRef>
-          <a:effectRef idx="1">
-            <a:schemeClr val="accent6"/>
-          </a:effectRef>
-          <a:fontRef idx="minor">
-            <a:schemeClr val="lt1"/>
-          </a:fontRef>
-        </p:style>
-        <p:txBody>
-          <a:bodyPr rtlCol="0" anchor="ctr"/>
-          <a:lstStyle/>
-          <a:p>
-            <a:pPr algn="ctr"/>
-            <a:r>
-              <a:rPr lang="en-US" sz="1600" dirty="0"/>
-              <a:t>Note: the simulation path is not recorded to preserve memory!</a:t>
-            </a:r>
-          </a:p>
-        </p:txBody>
-      </p:sp>
-      <p:sp>
-        <p:nvSpPr>
-          <p:cNvPr id="7" name="Speech Bubble: Rectangle 6">
-            <a:extLst>
-              <a:ext uri="{FF2B5EF4-FFF2-40B4-BE49-F238E27FC236}">
-                <a16:creationId xmlns:a16="http://schemas.microsoft.com/office/drawing/2014/main" id="{8384930E-C4A4-4194-BB17-475E43E41D5F}"/>
-              </a:ext>
-            </a:extLst>
-          </p:cNvPr>
-          <p:cNvSpPr/>
-          <p:nvPr/>
-        </p:nvSpPr>
-        <p:spPr>
-          <a:xfrm>
-            <a:off x="3400113" y="1295400"/>
-            <a:ext cx="2133600" cy="381000"/>
-          </a:xfrm>
-          <a:prstGeom prst="wedgeRectCallout">
-            <a:avLst>
-              <a:gd name="adj1" fmla="val -71362"/>
-              <a:gd name="adj2" fmla="val -25922"/>
-            </a:avLst>
-          </a:prstGeom>
-        </p:spPr>
-        <p:style>
-          <a:lnRef idx="3">
-            <a:schemeClr val="lt1"/>
-          </a:lnRef>
-          <a:fillRef idx="1">
-            <a:schemeClr val="accent6"/>
-          </a:fillRef>
-          <a:effectRef idx="1">
-            <a:schemeClr val="accent6"/>
-          </a:effectRef>
-          <a:fontRef idx="minor">
-            <a:schemeClr val="lt1"/>
-          </a:fontRef>
-        </p:style>
-        <p:txBody>
-          <a:bodyPr rtlCol="0" anchor="ctr"/>
-          <a:lstStyle/>
-          <a:p>
-            <a:pPr algn="ctr"/>
+      <p:sp>
+        <p:nvSpPr>
+          <p:cNvPr id="2" name="Title 1">
+            <a:extLst>
+              <a:ext uri="{FF2B5EF4-FFF2-40B4-BE49-F238E27FC236}">
+                <a16:creationId xmlns:a16="http://schemas.microsoft.com/office/drawing/2014/main" id="{880227DC-69CE-4119-811C-2E2E6619AC91}"/>
+              </a:ext>
+            </a:extLst>
+          </p:cNvPr>
+          <p:cNvSpPr>
+            <a:spLocks noGrp="1"/>
+          </p:cNvSpPr>
+          <p:nvPr>
+            <p:ph type="title"/>
+          </p:nvPr>
+        </p:nvSpPr>
+        <p:spPr/>
+        <p:txBody>
+          <a:bodyPr/>
+          <a:lstStyle/>
+          <a:p>
             <a:r>
               <a:rPr lang="en-US" dirty="0"/>
-              <a:t>Highest UCB1 score</a:t>
-            </a:r>
-          </a:p>
-        </p:txBody>
-      </p:sp>
-      <p:sp>
-        <p:nvSpPr>
-          <p:cNvPr id="8" name="Speech Bubble: Rectangle 7">
-            <a:extLst>
-              <a:ext uri="{FF2B5EF4-FFF2-40B4-BE49-F238E27FC236}">
-                <a16:creationId xmlns:a16="http://schemas.microsoft.com/office/drawing/2014/main" id="{F14742F9-67BA-4ED1-A2CE-411A6E61255D}"/>
-              </a:ext>
-            </a:extLst>
-          </p:cNvPr>
-          <p:cNvSpPr/>
-          <p:nvPr/>
-        </p:nvSpPr>
-        <p:spPr>
-          <a:xfrm>
-            <a:off x="5105400" y="1676400"/>
-            <a:ext cx="3352800" cy="643689"/>
-          </a:xfrm>
-          <a:prstGeom prst="wedgeRectCallout">
-            <a:avLst>
-              <a:gd name="adj1" fmla="val -70802"/>
-              <a:gd name="adj2" fmla="val 66494"/>
-            </a:avLst>
-          </a:prstGeom>
-        </p:spPr>
-        <p:style>
-          <a:lnRef idx="3">
-            <a:schemeClr val="lt1"/>
-          </a:lnRef>
-          <a:fillRef idx="1">
-            <a:schemeClr val="accent6"/>
-          </a:fillRef>
-          <a:effectRef idx="1">
-            <a:schemeClr val="accent6"/>
-          </a:effectRef>
-          <a:fontRef idx="minor">
-            <a:schemeClr val="lt1"/>
-          </a:fontRef>
-        </p:style>
-        <p:txBody>
-          <a:bodyPr rtlCol="0" anchor="ctr"/>
-          <a:lstStyle/>
-          <a:p>
-            <a:pPr algn="ctr"/>
-            <a:r>
-              <a:rPr lang="en-US" dirty="0"/>
-              <a:t>UCB1 selection favors win percentage more and more.</a:t>
-            </a:r>
-          </a:p>
-        </p:txBody>
-      </p:sp>
-      <p:sp>
-        <p:nvSpPr>
-          <p:cNvPr id="9" name="TextBox 8">
-            <a:extLst>
-              <a:ext uri="{FF2B5EF4-FFF2-40B4-BE49-F238E27FC236}">
-                <a16:creationId xmlns:a16="http://schemas.microsoft.com/office/drawing/2014/main" id="{E49ADF20-5360-4C46-9A0F-C4AC022BFFB2}"/>
-              </a:ext>
-            </a:extLst>
-          </p:cNvPr>
-          <p:cNvSpPr txBox="1"/>
-          <p:nvPr/>
-        </p:nvSpPr>
-        <p:spPr>
-          <a:xfrm>
-            <a:off x="2743200" y="2895600"/>
-            <a:ext cx="1084079" cy="276999"/>
+              <a:t>Monte Carlo Tree Search</a:t>
+            </a:r>
+          </a:p>
+        </p:txBody>
+      </p:sp>
+      <p:sp>
+        <p:nvSpPr>
+          <p:cNvPr id="4" name="Content Placeholder 3">
+            <a:extLst>
+              <a:ext uri="{FF2B5EF4-FFF2-40B4-BE49-F238E27FC236}">
+                <a16:creationId xmlns:a16="http://schemas.microsoft.com/office/drawing/2014/main" id="{C361553B-AF17-4D46-85D3-15DB5C1790F2}"/>
+              </a:ext>
+            </a:extLst>
+          </p:cNvPr>
+          <p:cNvSpPr txBox="1">
+            <a:spLocks noGrp="1"/>
+          </p:cNvSpPr>
+          <p:nvPr>
+            <p:ph idx="1"/>
+          </p:nvPr>
+        </p:nvSpPr>
+        <p:spPr>
+          <a:xfrm>
+            <a:off x="628650" y="1825625"/>
+            <a:ext cx="7886700" cy="4095480"/>
           </a:xfrm>
           <a:prstGeom prst="rect">
             <a:avLst/>
@@ -24750,1025 +24502,52 @@
           <a:noFill/>
         </p:spPr>
         <p:txBody>
-          <a:bodyPr wrap="none" rtlCol="0">
+          <a:bodyPr wrap="square">
             <a:spAutoFit/>
           </a:bodyPr>
           <a:lstStyle/>
           <a:p>
-            <a:r>
-              <a:rPr lang="en-US" sz="1200" dirty="0"/>
-              <a:t>Wins/Playouts</a:t>
-            </a:r>
-          </a:p>
-        </p:txBody>
-      </p:sp>
-      <p:sp>
-        <p:nvSpPr>
-          <p:cNvPr id="10" name="Oval 9">
-            <a:extLst>
-              <a:ext uri="{FF2B5EF4-FFF2-40B4-BE49-F238E27FC236}">
-                <a16:creationId xmlns:a16="http://schemas.microsoft.com/office/drawing/2014/main" id="{15C69B09-9D37-4124-A65C-8B45BABCAFB7}"/>
-              </a:ext>
-            </a:extLst>
-          </p:cNvPr>
-          <p:cNvSpPr/>
-          <p:nvPr/>
-        </p:nvSpPr>
-        <p:spPr>
-          <a:xfrm>
-            <a:off x="1128530" y="4648200"/>
-            <a:ext cx="381000" cy="381000"/>
-          </a:xfrm>
-          <a:prstGeom prst="ellipse">
-            <a:avLst/>
-          </a:prstGeom>
-          <a:noFill/>
-          <a:ln w="38100">
-            <a:solidFill>
-              <a:srgbClr val="FF0000"/>
-            </a:solidFill>
-          </a:ln>
-        </p:spPr>
-        <p:style>
-          <a:lnRef idx="2">
-            <a:schemeClr val="accent1">
-              <a:shade val="50000"/>
-            </a:schemeClr>
-          </a:lnRef>
-          <a:fillRef idx="1">
-            <a:schemeClr val="accent1"/>
-          </a:fillRef>
-          <a:effectRef idx="0">
-            <a:schemeClr val="accent1"/>
-          </a:effectRef>
-          <a:fontRef idx="minor">
-            <a:schemeClr val="lt1"/>
-          </a:fontRef>
-        </p:style>
-        <p:txBody>
-          <a:bodyPr rtlCol="0" anchor="ctr"/>
-          <a:lstStyle/>
-          <a:p>
-            <a:pPr algn="ctr"/>
-            <a:endParaRPr lang="en-US"/>
-          </a:p>
-        </p:txBody>
-      </p:sp>
-      <p:sp>
-        <p:nvSpPr>
-          <p:cNvPr id="11" name="Oval 10">
-            <a:extLst>
-              <a:ext uri="{FF2B5EF4-FFF2-40B4-BE49-F238E27FC236}">
-                <a16:creationId xmlns:a16="http://schemas.microsoft.com/office/drawing/2014/main" id="{8CA756EA-5537-4B96-9E24-93C99C7BC71F}"/>
-              </a:ext>
-            </a:extLst>
-          </p:cNvPr>
-          <p:cNvSpPr/>
-          <p:nvPr/>
-        </p:nvSpPr>
-        <p:spPr>
-          <a:xfrm>
-            <a:off x="6693352" y="4089549"/>
-            <a:ext cx="381000" cy="381000"/>
-          </a:xfrm>
-          <a:prstGeom prst="ellipse">
-            <a:avLst/>
-          </a:prstGeom>
-          <a:noFill/>
-          <a:ln w="38100">
-            <a:solidFill>
-              <a:srgbClr val="FF0000"/>
-            </a:solidFill>
-          </a:ln>
-        </p:spPr>
-        <p:style>
-          <a:lnRef idx="2">
-            <a:schemeClr val="accent1">
-              <a:shade val="50000"/>
-            </a:schemeClr>
-          </a:lnRef>
-          <a:fillRef idx="1">
-            <a:schemeClr val="accent1"/>
-          </a:fillRef>
-          <a:effectRef idx="0">
-            <a:schemeClr val="accent1"/>
-          </a:effectRef>
-          <a:fontRef idx="minor">
-            <a:schemeClr val="lt1"/>
-          </a:fontRef>
-        </p:style>
-        <p:txBody>
-          <a:bodyPr rtlCol="0" anchor="ctr"/>
-          <a:lstStyle/>
-          <a:p>
-            <a:pPr algn="ctr"/>
-            <a:endParaRPr lang="en-US"/>
-          </a:p>
-        </p:txBody>
-      </p:sp>
-      <p:sp>
-        <p:nvSpPr>
-          <p:cNvPr id="12" name="Oval 11">
-            <a:extLst>
-              <a:ext uri="{FF2B5EF4-FFF2-40B4-BE49-F238E27FC236}">
-                <a16:creationId xmlns:a16="http://schemas.microsoft.com/office/drawing/2014/main" id="{51D6C00C-0565-4048-9352-92A781CD61BC}"/>
-              </a:ext>
-            </a:extLst>
-          </p:cNvPr>
-          <p:cNvSpPr/>
-          <p:nvPr/>
-        </p:nvSpPr>
-        <p:spPr>
-          <a:xfrm>
-            <a:off x="6693352" y="3504012"/>
-            <a:ext cx="381000" cy="381000"/>
-          </a:xfrm>
-          <a:prstGeom prst="ellipse">
-            <a:avLst/>
-          </a:prstGeom>
-          <a:noFill/>
-          <a:ln w="38100">
-            <a:solidFill>
-              <a:srgbClr val="FF0000"/>
-            </a:solidFill>
-          </a:ln>
-        </p:spPr>
-        <p:style>
-          <a:lnRef idx="2">
-            <a:schemeClr val="accent1">
-              <a:shade val="50000"/>
-            </a:schemeClr>
-          </a:lnRef>
-          <a:fillRef idx="1">
-            <a:schemeClr val="accent1"/>
-          </a:fillRef>
-          <a:effectRef idx="0">
-            <a:schemeClr val="accent1"/>
-          </a:effectRef>
-          <a:fontRef idx="minor">
-            <a:schemeClr val="lt1"/>
-          </a:fontRef>
-        </p:style>
-        <p:txBody>
-          <a:bodyPr rtlCol="0" anchor="ctr"/>
-          <a:lstStyle/>
-          <a:p>
-            <a:pPr algn="ctr"/>
-            <a:endParaRPr lang="en-US"/>
-          </a:p>
-        </p:txBody>
-      </p:sp>
-      <p:sp>
-        <p:nvSpPr>
-          <p:cNvPr id="13" name="Oval 12">
-            <a:extLst>
-              <a:ext uri="{FF2B5EF4-FFF2-40B4-BE49-F238E27FC236}">
-                <a16:creationId xmlns:a16="http://schemas.microsoft.com/office/drawing/2014/main" id="{86018CB8-30CF-469B-8288-0444EE3BCAD4}"/>
-              </a:ext>
-            </a:extLst>
-          </p:cNvPr>
-          <p:cNvSpPr/>
-          <p:nvPr/>
-        </p:nvSpPr>
-        <p:spPr>
-          <a:xfrm>
-            <a:off x="7315200" y="2908652"/>
-            <a:ext cx="381000" cy="396026"/>
-          </a:xfrm>
-          <a:prstGeom prst="ellipse">
-            <a:avLst/>
-          </a:prstGeom>
-          <a:noFill/>
-          <a:ln w="38100">
-            <a:solidFill>
-              <a:srgbClr val="FF0000"/>
-            </a:solidFill>
-          </a:ln>
-        </p:spPr>
-        <p:style>
-          <a:lnRef idx="2">
-            <a:schemeClr val="accent1">
-              <a:shade val="50000"/>
-            </a:schemeClr>
-          </a:lnRef>
-          <a:fillRef idx="1">
-            <a:schemeClr val="accent1"/>
-          </a:fillRef>
-          <a:effectRef idx="0">
-            <a:schemeClr val="accent1"/>
-          </a:effectRef>
-          <a:fontRef idx="minor">
-            <a:schemeClr val="lt1"/>
-          </a:fontRef>
-        </p:style>
-        <p:txBody>
-          <a:bodyPr rtlCol="0" anchor="ctr"/>
-          <a:lstStyle/>
-          <a:p>
-            <a:pPr algn="ctr"/>
-            <a:endParaRPr lang="en-US"/>
-          </a:p>
-        </p:txBody>
-      </p:sp>
-      <p:sp>
-        <p:nvSpPr>
-          <p:cNvPr id="14" name="Oval 13">
-            <a:extLst>
-              <a:ext uri="{FF2B5EF4-FFF2-40B4-BE49-F238E27FC236}">
-                <a16:creationId xmlns:a16="http://schemas.microsoft.com/office/drawing/2014/main" id="{90B203F2-B256-499E-968C-FBC9A0FAC327}"/>
-              </a:ext>
-            </a:extLst>
-          </p:cNvPr>
-          <p:cNvSpPr/>
-          <p:nvPr/>
-        </p:nvSpPr>
-        <p:spPr>
-          <a:xfrm>
-            <a:off x="6121852" y="4635575"/>
-            <a:ext cx="381000" cy="381000"/>
-          </a:xfrm>
-          <a:prstGeom prst="ellipse">
-            <a:avLst/>
-          </a:prstGeom>
-          <a:noFill/>
-          <a:ln w="38100">
-            <a:solidFill>
-              <a:srgbClr val="FF0000"/>
-            </a:solidFill>
-          </a:ln>
-        </p:spPr>
-        <p:style>
-          <a:lnRef idx="2">
-            <a:schemeClr val="accent1">
-              <a:shade val="50000"/>
-            </a:schemeClr>
-          </a:lnRef>
-          <a:fillRef idx="1">
-            <a:schemeClr val="accent1"/>
-          </a:fillRef>
-          <a:effectRef idx="0">
-            <a:schemeClr val="accent1"/>
-          </a:effectRef>
-          <a:fontRef idx="minor">
-            <a:schemeClr val="lt1"/>
-          </a:fontRef>
-        </p:style>
-        <p:txBody>
-          <a:bodyPr rtlCol="0" anchor="ctr"/>
-          <a:lstStyle/>
-          <a:p>
-            <a:pPr algn="ctr"/>
-            <a:endParaRPr lang="en-US"/>
-          </a:p>
-        </p:txBody>
-      </p:sp>
-      <p:sp>
-        <p:nvSpPr>
-          <p:cNvPr id="15" name="TextBox 14">
-            <a:extLst>
-              <a:ext uri="{FF2B5EF4-FFF2-40B4-BE49-F238E27FC236}">
-                <a16:creationId xmlns:a16="http://schemas.microsoft.com/office/drawing/2014/main" id="{599F4839-3EDC-4379-B9CC-63887372CCD6}"/>
-              </a:ext>
-            </a:extLst>
-          </p:cNvPr>
-          <p:cNvSpPr txBox="1"/>
-          <p:nvPr/>
-        </p:nvSpPr>
-        <p:spPr>
-          <a:xfrm>
-            <a:off x="557598" y="2999601"/>
-            <a:ext cx="562911" cy="276999"/>
-          </a:xfrm>
-          <a:prstGeom prst="rect">
-            <a:avLst/>
-          </a:prstGeom>
-          <a:noFill/>
-        </p:spPr>
-        <p:txBody>
-          <a:bodyPr wrap="none" rtlCol="0">
-            <a:spAutoFit/>
-          </a:bodyPr>
-          <a:lstStyle/>
-          <a:p>
-            <a:r>
-              <a:rPr lang="en-US" sz="1200" dirty="0"/>
-              <a:t>White</a:t>
-            </a:r>
-          </a:p>
-        </p:txBody>
-      </p:sp>
-      <p:sp>
-        <p:nvSpPr>
-          <p:cNvPr id="16" name="TextBox 15">
-            <a:extLst>
-              <a:ext uri="{FF2B5EF4-FFF2-40B4-BE49-F238E27FC236}">
-                <a16:creationId xmlns:a16="http://schemas.microsoft.com/office/drawing/2014/main" id="{4DEA6A0B-F53D-480C-99D5-82DB6899E24E}"/>
-              </a:ext>
-            </a:extLst>
-          </p:cNvPr>
-          <p:cNvSpPr txBox="1"/>
-          <p:nvPr/>
-        </p:nvSpPr>
-        <p:spPr>
-          <a:xfrm>
-            <a:off x="557598" y="4089549"/>
-            <a:ext cx="562911" cy="276999"/>
-          </a:xfrm>
-          <a:prstGeom prst="rect">
-            <a:avLst/>
-          </a:prstGeom>
-          <a:noFill/>
-        </p:spPr>
-        <p:txBody>
-          <a:bodyPr wrap="none" rtlCol="0">
-            <a:spAutoFit/>
-          </a:bodyPr>
-          <a:lstStyle/>
-          <a:p>
-            <a:r>
-              <a:rPr lang="en-US" sz="1200" dirty="0"/>
-              <a:t>White</a:t>
-            </a:r>
-          </a:p>
-        </p:txBody>
-      </p:sp>
-      <p:sp>
-        <p:nvSpPr>
-          <p:cNvPr id="17" name="TextBox 16">
-            <a:extLst>
-              <a:ext uri="{FF2B5EF4-FFF2-40B4-BE49-F238E27FC236}">
-                <a16:creationId xmlns:a16="http://schemas.microsoft.com/office/drawing/2014/main" id="{4FB26089-CE33-4440-8867-7A807316C56E}"/>
-              </a:ext>
-            </a:extLst>
-          </p:cNvPr>
-          <p:cNvSpPr txBox="1"/>
-          <p:nvPr/>
-        </p:nvSpPr>
-        <p:spPr>
-          <a:xfrm>
-            <a:off x="557598" y="5179497"/>
-            <a:ext cx="562911" cy="276999"/>
-          </a:xfrm>
-          <a:prstGeom prst="rect">
-            <a:avLst/>
-          </a:prstGeom>
-          <a:noFill/>
-        </p:spPr>
-        <p:txBody>
-          <a:bodyPr wrap="none" rtlCol="0">
-            <a:spAutoFit/>
-          </a:bodyPr>
-          <a:lstStyle/>
-          <a:p>
-            <a:r>
-              <a:rPr lang="en-US" sz="1200" dirty="0"/>
-              <a:t>White</a:t>
-            </a:r>
-          </a:p>
-        </p:txBody>
-      </p:sp>
-      <p:cxnSp>
-        <p:nvCxnSpPr>
-          <p:cNvPr id="21" name="Straight Connector 20">
-            <a:extLst>
-              <a:ext uri="{FF2B5EF4-FFF2-40B4-BE49-F238E27FC236}">
-                <a16:creationId xmlns:a16="http://schemas.microsoft.com/office/drawing/2014/main" id="{D5A7904B-BA97-438D-83FF-897983384C78}"/>
-              </a:ext>
-            </a:extLst>
-          </p:cNvPr>
-          <p:cNvCxnSpPr/>
-          <p:nvPr/>
-        </p:nvCxnSpPr>
-        <p:spPr>
-          <a:xfrm>
-            <a:off x="685800" y="3352800"/>
-            <a:ext cx="7912552" cy="0"/>
-          </a:xfrm>
-          <a:prstGeom prst="line">
-            <a:avLst/>
-          </a:prstGeom>
-          <a:ln w="9525" cap="flat" cmpd="sng" algn="ctr">
-            <a:solidFill>
-              <a:schemeClr val="accent3"/>
-            </a:solidFill>
-            <a:prstDash val="dash"/>
-            <a:round/>
-            <a:headEnd type="none" w="med" len="med"/>
-            <a:tailEnd type="none" w="med" len="med"/>
-          </a:ln>
-        </p:spPr>
-        <p:style>
-          <a:lnRef idx="0">
-            <a:scrgbClr r="0" g="0" b="0"/>
-          </a:lnRef>
-          <a:fillRef idx="0">
-            <a:scrgbClr r="0" g="0" b="0"/>
-          </a:fillRef>
-          <a:effectRef idx="0">
-            <a:scrgbClr r="0" g="0" b="0"/>
-          </a:effectRef>
-          <a:fontRef idx="minor">
-            <a:schemeClr val="tx1"/>
-          </a:fontRef>
-        </p:style>
-      </p:cxnSp>
-      <p:cxnSp>
-        <p:nvCxnSpPr>
-          <p:cNvPr id="23" name="Straight Connector 22">
-            <a:extLst>
-              <a:ext uri="{FF2B5EF4-FFF2-40B4-BE49-F238E27FC236}">
-                <a16:creationId xmlns:a16="http://schemas.microsoft.com/office/drawing/2014/main" id="{84117894-7786-4518-8579-1E6221DB0E65}"/>
-              </a:ext>
-            </a:extLst>
-          </p:cNvPr>
-          <p:cNvCxnSpPr/>
-          <p:nvPr/>
-        </p:nvCxnSpPr>
-        <p:spPr>
-          <a:xfrm>
-            <a:off x="685800" y="3962400"/>
-            <a:ext cx="7912552" cy="0"/>
-          </a:xfrm>
-          <a:prstGeom prst="line">
-            <a:avLst/>
-          </a:prstGeom>
-          <a:ln w="9525" cap="flat" cmpd="sng" algn="ctr">
-            <a:solidFill>
-              <a:schemeClr val="accent3"/>
-            </a:solidFill>
-            <a:prstDash val="dash"/>
-            <a:round/>
-            <a:headEnd type="none" w="med" len="med"/>
-            <a:tailEnd type="none" w="med" len="med"/>
-          </a:ln>
-        </p:spPr>
-        <p:style>
-          <a:lnRef idx="0">
-            <a:scrgbClr r="0" g="0" b="0"/>
-          </a:lnRef>
-          <a:fillRef idx="0">
-            <a:scrgbClr r="0" g="0" b="0"/>
-          </a:fillRef>
-          <a:effectRef idx="0">
-            <a:scrgbClr r="0" g="0" b="0"/>
-          </a:effectRef>
-          <a:fontRef idx="minor">
-            <a:schemeClr val="tx1"/>
-          </a:fontRef>
-        </p:style>
-      </p:cxnSp>
-      <p:cxnSp>
-        <p:nvCxnSpPr>
-          <p:cNvPr id="24" name="Straight Connector 23">
-            <a:extLst>
-              <a:ext uri="{FF2B5EF4-FFF2-40B4-BE49-F238E27FC236}">
-                <a16:creationId xmlns:a16="http://schemas.microsoft.com/office/drawing/2014/main" id="{2AEADF8D-FF0D-4751-9CC4-1349724322A9}"/>
-              </a:ext>
-            </a:extLst>
-          </p:cNvPr>
-          <p:cNvCxnSpPr/>
-          <p:nvPr/>
-        </p:nvCxnSpPr>
-        <p:spPr>
-          <a:xfrm>
-            <a:off x="685800" y="4572000"/>
-            <a:ext cx="7912552" cy="0"/>
-          </a:xfrm>
-          <a:prstGeom prst="line">
-            <a:avLst/>
-          </a:prstGeom>
-          <a:ln w="9525" cap="flat" cmpd="sng" algn="ctr">
-            <a:solidFill>
-              <a:schemeClr val="accent3"/>
-            </a:solidFill>
-            <a:prstDash val="dash"/>
-            <a:round/>
-            <a:headEnd type="none" w="med" len="med"/>
-            <a:tailEnd type="none" w="med" len="med"/>
-          </a:ln>
-        </p:spPr>
-        <p:style>
-          <a:lnRef idx="0">
-            <a:scrgbClr r="0" g="0" b="0"/>
-          </a:lnRef>
-          <a:fillRef idx="0">
-            <a:scrgbClr r="0" g="0" b="0"/>
-          </a:fillRef>
-          <a:effectRef idx="0">
-            <a:scrgbClr r="0" g="0" b="0"/>
-          </a:effectRef>
-          <a:fontRef idx="minor">
-            <a:schemeClr val="tx1"/>
-          </a:fontRef>
-        </p:style>
-      </p:cxnSp>
-      <p:cxnSp>
-        <p:nvCxnSpPr>
-          <p:cNvPr id="25" name="Straight Connector 24">
-            <a:extLst>
-              <a:ext uri="{FF2B5EF4-FFF2-40B4-BE49-F238E27FC236}">
-                <a16:creationId xmlns:a16="http://schemas.microsoft.com/office/drawing/2014/main" id="{FE0ADEEF-F66F-4D2B-A3EA-DBA44B3245A7}"/>
-              </a:ext>
-            </a:extLst>
-          </p:cNvPr>
-          <p:cNvCxnSpPr/>
-          <p:nvPr/>
-        </p:nvCxnSpPr>
-        <p:spPr>
-          <a:xfrm>
-            <a:off x="698048" y="5105400"/>
-            <a:ext cx="7912552" cy="0"/>
-          </a:xfrm>
-          <a:prstGeom prst="line">
-            <a:avLst/>
-          </a:prstGeom>
-          <a:ln w="9525" cap="flat" cmpd="sng" algn="ctr">
-            <a:solidFill>
-              <a:schemeClr val="accent3"/>
-            </a:solidFill>
-            <a:prstDash val="dash"/>
-            <a:round/>
-            <a:headEnd type="none" w="med" len="med"/>
-            <a:tailEnd type="none" w="med" len="med"/>
-          </a:ln>
-        </p:spPr>
-        <p:style>
-          <a:lnRef idx="0">
-            <a:scrgbClr r="0" g="0" b="0"/>
-          </a:lnRef>
-          <a:fillRef idx="0">
-            <a:scrgbClr r="0" g="0" b="0"/>
-          </a:fillRef>
-          <a:effectRef idx="0">
-            <a:scrgbClr r="0" g="0" b="0"/>
-          </a:effectRef>
-          <a:fontRef idx="minor">
-            <a:schemeClr val="tx1"/>
-          </a:fontRef>
-        </p:style>
-      </p:cxnSp>
-      <p:sp>
-        <p:nvSpPr>
-          <p:cNvPr id="26" name="TextBox 25">
-            <a:extLst>
-              <a:ext uri="{FF2B5EF4-FFF2-40B4-BE49-F238E27FC236}">
-                <a16:creationId xmlns:a16="http://schemas.microsoft.com/office/drawing/2014/main" id="{75F504AB-4225-404B-8E4F-67D9B559C564}"/>
-              </a:ext>
-            </a:extLst>
-          </p:cNvPr>
-          <p:cNvSpPr txBox="1"/>
-          <p:nvPr/>
-        </p:nvSpPr>
-        <p:spPr>
-          <a:xfrm>
-            <a:off x="582412" y="3511112"/>
-            <a:ext cx="513282" cy="276999"/>
-          </a:xfrm>
-          <a:prstGeom prst="rect">
-            <a:avLst/>
-          </a:prstGeom>
-          <a:noFill/>
-        </p:spPr>
-        <p:txBody>
-          <a:bodyPr wrap="none" rtlCol="0">
-            <a:spAutoFit/>
-          </a:bodyPr>
-          <a:lstStyle/>
-          <a:p>
-            <a:r>
-              <a:rPr lang="en-US" sz="1200" dirty="0"/>
-              <a:t>Black</a:t>
-            </a:r>
-          </a:p>
-        </p:txBody>
-      </p:sp>
-      <p:sp>
-        <p:nvSpPr>
-          <p:cNvPr id="27" name="TextBox 26">
-            <a:extLst>
-              <a:ext uri="{FF2B5EF4-FFF2-40B4-BE49-F238E27FC236}">
-                <a16:creationId xmlns:a16="http://schemas.microsoft.com/office/drawing/2014/main" id="{1A7FB683-F9F5-43B3-8589-DE698C4B78D0}"/>
-              </a:ext>
-            </a:extLst>
-          </p:cNvPr>
-          <p:cNvSpPr txBox="1"/>
-          <p:nvPr/>
-        </p:nvSpPr>
-        <p:spPr>
-          <a:xfrm>
-            <a:off x="582412" y="4676001"/>
-            <a:ext cx="513282" cy="276999"/>
-          </a:xfrm>
-          <a:prstGeom prst="rect">
-            <a:avLst/>
-          </a:prstGeom>
-          <a:noFill/>
-        </p:spPr>
-        <p:txBody>
-          <a:bodyPr wrap="none" rtlCol="0">
-            <a:spAutoFit/>
-          </a:bodyPr>
-          <a:lstStyle/>
-          <a:p>
-            <a:r>
-              <a:rPr lang="en-US" sz="1200" dirty="0"/>
-              <a:t>Black</a:t>
-            </a:r>
-          </a:p>
-        </p:txBody>
-      </p:sp>
-      <p:sp>
-        <p:nvSpPr>
-          <p:cNvPr id="2" name="Rectangle 1">
-            <a:extLst>
-              <a:ext uri="{FF2B5EF4-FFF2-40B4-BE49-F238E27FC236}">
-                <a16:creationId xmlns:a16="http://schemas.microsoft.com/office/drawing/2014/main" id="{1516C8A5-634E-42CD-8F82-EA0BA9FFDD98}"/>
-              </a:ext>
-            </a:extLst>
-          </p:cNvPr>
-          <p:cNvSpPr/>
-          <p:nvPr/>
-        </p:nvSpPr>
-        <p:spPr>
-          <a:xfrm>
-            <a:off x="4800600" y="2362200"/>
-            <a:ext cx="3581400" cy="341000"/>
-          </a:xfrm>
-          <a:prstGeom prst="rect">
-            <a:avLst/>
-          </a:prstGeom>
-          <a:noFill/>
-          <a:ln w="28575">
-            <a:solidFill>
-              <a:srgbClr val="FF0000"/>
-            </a:solidFill>
-          </a:ln>
-        </p:spPr>
-        <p:style>
-          <a:lnRef idx="2">
-            <a:schemeClr val="accent1">
-              <a:shade val="50000"/>
-            </a:schemeClr>
-          </a:lnRef>
-          <a:fillRef idx="1">
-            <a:schemeClr val="accent1"/>
-          </a:fillRef>
-          <a:effectRef idx="0">
-            <a:schemeClr val="accent1"/>
-          </a:effectRef>
-          <a:fontRef idx="minor">
-            <a:schemeClr val="lt1"/>
-          </a:fontRef>
-        </p:style>
-        <p:txBody>
-          <a:bodyPr rtlCol="0" anchor="ctr"/>
-          <a:lstStyle/>
-          <a:p>
-            <a:pPr algn="ctr"/>
-            <a:endParaRPr lang="en-US"/>
-          </a:p>
-        </p:txBody>
-      </p:sp>
-      <p:sp>
-        <p:nvSpPr>
-          <p:cNvPr id="30" name="Speech Bubble: Rectangle 29">
-            <a:extLst>
-              <a:ext uri="{FF2B5EF4-FFF2-40B4-BE49-F238E27FC236}">
-                <a16:creationId xmlns:a16="http://schemas.microsoft.com/office/drawing/2014/main" id="{C9BDF8D7-13E9-4165-B976-38B6BC431C55}"/>
-              </a:ext>
-            </a:extLst>
-          </p:cNvPr>
-          <p:cNvSpPr/>
-          <p:nvPr/>
-        </p:nvSpPr>
-        <p:spPr>
-          <a:xfrm>
-            <a:off x="381000" y="5891549"/>
-            <a:ext cx="1673507" cy="838200"/>
-          </a:xfrm>
-          <a:prstGeom prst="wedgeRectCallout">
-            <a:avLst>
-              <a:gd name="adj1" fmla="val 4728"/>
-              <a:gd name="adj2" fmla="val -156247"/>
-            </a:avLst>
-          </a:prstGeom>
-        </p:spPr>
-        <p:style>
-          <a:lnRef idx="3">
-            <a:schemeClr val="lt1"/>
-          </a:lnRef>
-          <a:fillRef idx="1">
-            <a:schemeClr val="accent6"/>
-          </a:fillRef>
-          <a:effectRef idx="1">
-            <a:schemeClr val="accent6"/>
-          </a:effectRef>
-          <a:fontRef idx="minor">
-            <a:schemeClr val="lt1"/>
-          </a:fontRef>
-        </p:style>
-        <p:txBody>
-          <a:bodyPr rtlCol="0" anchor="ctr"/>
-          <a:lstStyle/>
-          <a:p>
-            <a:pPr algn="ctr"/>
-            <a:r>
-              <a:rPr lang="en-US" sz="1600" dirty="0"/>
-              <a:t>Select highest UCB1 score node</a:t>
-            </a:r>
-          </a:p>
-        </p:txBody>
-      </p:sp>
-      <p:cxnSp>
-        <p:nvCxnSpPr>
-          <p:cNvPr id="20" name="Straight Arrow Connector 19">
-            <a:extLst>
-              <a:ext uri="{FF2B5EF4-FFF2-40B4-BE49-F238E27FC236}">
-                <a16:creationId xmlns:a16="http://schemas.microsoft.com/office/drawing/2014/main" id="{B53CBDDA-6B85-4575-A1E1-1B7BBBAB1E91}"/>
-              </a:ext>
-            </a:extLst>
-          </p:cNvPr>
-          <p:cNvCxnSpPr>
-            <a:cxnSpLocks/>
-            <a:endCxn id="11" idx="3"/>
-          </p:cNvCxnSpPr>
-          <p:nvPr/>
-        </p:nvCxnSpPr>
-        <p:spPr>
-          <a:xfrm flipV="1">
-            <a:off x="6462028" y="4414753"/>
-            <a:ext cx="287120" cy="261248"/>
-          </a:xfrm>
-          <a:prstGeom prst="straightConnector1">
-            <a:avLst/>
-          </a:prstGeom>
-          <a:ln w="38100">
-            <a:solidFill>
-              <a:srgbClr val="FF0000"/>
-            </a:solidFill>
-            <a:tailEnd type="triangle"/>
-          </a:ln>
-        </p:spPr>
-        <p:style>
-          <a:lnRef idx="1">
-            <a:schemeClr val="accent1"/>
-          </a:lnRef>
-          <a:fillRef idx="0">
-            <a:schemeClr val="accent1"/>
-          </a:fillRef>
-          <a:effectRef idx="0">
-            <a:schemeClr val="accent1"/>
-          </a:effectRef>
-          <a:fontRef idx="minor">
-            <a:schemeClr val="tx1"/>
-          </a:fontRef>
-        </p:style>
-      </p:cxnSp>
-      <p:cxnSp>
-        <p:nvCxnSpPr>
-          <p:cNvPr id="31" name="Straight Arrow Connector 30">
-            <a:extLst>
-              <a:ext uri="{FF2B5EF4-FFF2-40B4-BE49-F238E27FC236}">
-                <a16:creationId xmlns:a16="http://schemas.microsoft.com/office/drawing/2014/main" id="{31C6647B-D2E9-4088-B616-4526DFA01760}"/>
-              </a:ext>
-            </a:extLst>
-          </p:cNvPr>
-          <p:cNvCxnSpPr>
-            <a:cxnSpLocks/>
-            <a:endCxn id="12" idx="4"/>
-          </p:cNvCxnSpPr>
-          <p:nvPr/>
-        </p:nvCxnSpPr>
-        <p:spPr>
-          <a:xfrm flipV="1">
-            <a:off x="6856599" y="3885012"/>
-            <a:ext cx="27253" cy="194624"/>
-          </a:xfrm>
-          <a:prstGeom prst="straightConnector1">
-            <a:avLst/>
-          </a:prstGeom>
-          <a:ln w="38100">
-            <a:solidFill>
-              <a:srgbClr val="FF0000"/>
-            </a:solidFill>
-            <a:tailEnd type="triangle"/>
-          </a:ln>
-        </p:spPr>
-        <p:style>
-          <a:lnRef idx="1">
-            <a:schemeClr val="accent1"/>
-          </a:lnRef>
-          <a:fillRef idx="0">
-            <a:schemeClr val="accent1"/>
-          </a:fillRef>
-          <a:effectRef idx="0">
-            <a:schemeClr val="accent1"/>
-          </a:effectRef>
-          <a:fontRef idx="minor">
-            <a:schemeClr val="tx1"/>
-          </a:fontRef>
-        </p:style>
-      </p:cxnSp>
-      <p:cxnSp>
-        <p:nvCxnSpPr>
-          <p:cNvPr id="33" name="Straight Arrow Connector 32">
-            <a:extLst>
-              <a:ext uri="{FF2B5EF4-FFF2-40B4-BE49-F238E27FC236}">
-                <a16:creationId xmlns:a16="http://schemas.microsoft.com/office/drawing/2014/main" id="{30872F81-6E7B-4D9A-AC33-1362C71DE966}"/>
-              </a:ext>
-            </a:extLst>
-          </p:cNvPr>
-          <p:cNvCxnSpPr>
-            <a:cxnSpLocks/>
-            <a:stCxn id="12" idx="7"/>
-            <a:endCxn id="13" idx="3"/>
-          </p:cNvCxnSpPr>
-          <p:nvPr/>
-        </p:nvCxnSpPr>
-        <p:spPr>
-          <a:xfrm flipV="1">
-            <a:off x="7018556" y="3246681"/>
-            <a:ext cx="352440" cy="313127"/>
-          </a:xfrm>
-          <a:prstGeom prst="straightConnector1">
-            <a:avLst/>
-          </a:prstGeom>
-          <a:ln w="38100">
-            <a:solidFill>
-              <a:srgbClr val="FF0000"/>
-            </a:solidFill>
-            <a:tailEnd type="triangle"/>
-          </a:ln>
-        </p:spPr>
-        <p:style>
-          <a:lnRef idx="1">
-            <a:schemeClr val="accent1"/>
-          </a:lnRef>
-          <a:fillRef idx="0">
-            <a:schemeClr val="accent1"/>
-          </a:fillRef>
-          <a:effectRef idx="0">
-            <a:schemeClr val="accent1"/>
-          </a:effectRef>
-          <a:fontRef idx="minor">
-            <a:schemeClr val="tx1"/>
-          </a:fontRef>
-        </p:style>
-      </p:cxnSp>
-      <p:sp>
-        <p:nvSpPr>
-          <p:cNvPr id="44" name="Oval 43">
-            <a:extLst>
-              <a:ext uri="{FF2B5EF4-FFF2-40B4-BE49-F238E27FC236}">
-                <a16:creationId xmlns:a16="http://schemas.microsoft.com/office/drawing/2014/main" id="{F6965377-92F5-478D-86E0-6BC8DC756AFF}"/>
-              </a:ext>
-            </a:extLst>
-          </p:cNvPr>
-          <p:cNvSpPr/>
-          <p:nvPr/>
-        </p:nvSpPr>
-        <p:spPr>
-          <a:xfrm>
-            <a:off x="6121852" y="5183508"/>
-            <a:ext cx="381000" cy="381000"/>
-          </a:xfrm>
-          <a:prstGeom prst="ellipse">
-            <a:avLst/>
-          </a:prstGeom>
-          <a:noFill/>
-          <a:ln w="38100">
-            <a:solidFill>
-              <a:srgbClr val="FF0000"/>
-            </a:solidFill>
-          </a:ln>
-        </p:spPr>
-        <p:style>
-          <a:lnRef idx="2">
-            <a:schemeClr val="accent1">
-              <a:shade val="50000"/>
-            </a:schemeClr>
-          </a:lnRef>
-          <a:fillRef idx="1">
-            <a:schemeClr val="accent1"/>
-          </a:fillRef>
-          <a:effectRef idx="0">
-            <a:schemeClr val="accent1"/>
-          </a:effectRef>
-          <a:fontRef idx="minor">
-            <a:schemeClr val="lt1"/>
-          </a:fontRef>
-        </p:style>
-        <p:txBody>
-          <a:bodyPr rtlCol="0" anchor="ctr"/>
-          <a:lstStyle/>
-          <a:p>
-            <a:pPr algn="ctr"/>
-            <a:endParaRPr lang="en-US"/>
-          </a:p>
-        </p:txBody>
-      </p:sp>
-      <p:cxnSp>
-        <p:nvCxnSpPr>
-          <p:cNvPr id="45" name="Straight Arrow Connector 44">
-            <a:extLst>
-              <a:ext uri="{FF2B5EF4-FFF2-40B4-BE49-F238E27FC236}">
-                <a16:creationId xmlns:a16="http://schemas.microsoft.com/office/drawing/2014/main" id="{A7BF5870-B5EE-44E4-A1B1-B29644B74F68}"/>
-              </a:ext>
-            </a:extLst>
-          </p:cNvPr>
-          <p:cNvCxnSpPr>
-            <a:cxnSpLocks/>
-            <a:stCxn id="44" idx="0"/>
-            <a:endCxn id="14" idx="4"/>
-          </p:cNvCxnSpPr>
-          <p:nvPr/>
-        </p:nvCxnSpPr>
-        <p:spPr>
-          <a:xfrm flipV="1">
-            <a:off x="6312352" y="5016575"/>
-            <a:ext cx="0" cy="166933"/>
-          </a:xfrm>
-          <a:prstGeom prst="straightConnector1">
-            <a:avLst/>
-          </a:prstGeom>
-          <a:ln w="38100">
-            <a:solidFill>
-              <a:srgbClr val="FF0000"/>
-            </a:solidFill>
-            <a:tailEnd type="triangle"/>
-          </a:ln>
-        </p:spPr>
-        <p:style>
-          <a:lnRef idx="1">
-            <a:schemeClr val="accent1"/>
-          </a:lnRef>
-          <a:fillRef idx="0">
-            <a:schemeClr val="accent1"/>
-          </a:fillRef>
-          <a:effectRef idx="0">
-            <a:schemeClr val="accent1"/>
-          </a:effectRef>
-          <a:fontRef idx="minor">
-            <a:schemeClr val="tx1"/>
-          </a:fontRef>
-        </p:style>
-      </p:cxnSp>
-      <p:sp>
-        <p:nvSpPr>
-          <p:cNvPr id="48" name="Oval 47">
-            <a:extLst>
-              <a:ext uri="{FF2B5EF4-FFF2-40B4-BE49-F238E27FC236}">
-                <a16:creationId xmlns:a16="http://schemas.microsoft.com/office/drawing/2014/main" id="{83CCEF06-F7F5-4DE5-9901-29E2DFF7A679}"/>
-              </a:ext>
-            </a:extLst>
-          </p:cNvPr>
-          <p:cNvSpPr/>
-          <p:nvPr/>
-        </p:nvSpPr>
-        <p:spPr>
-          <a:xfrm>
-            <a:off x="3633105" y="5194226"/>
-            <a:ext cx="381000" cy="381000"/>
-          </a:xfrm>
-          <a:prstGeom prst="ellipse">
-            <a:avLst/>
-          </a:prstGeom>
-          <a:noFill/>
-          <a:ln w="38100">
-            <a:solidFill>
-              <a:srgbClr val="FF0000"/>
-            </a:solidFill>
-          </a:ln>
-        </p:spPr>
-        <p:style>
-          <a:lnRef idx="2">
-            <a:schemeClr val="accent1">
-              <a:shade val="50000"/>
-            </a:schemeClr>
-          </a:lnRef>
-          <a:fillRef idx="1">
-            <a:schemeClr val="accent1"/>
-          </a:fillRef>
-          <a:effectRef idx="0">
-            <a:schemeClr val="accent1"/>
-          </a:effectRef>
-          <a:fontRef idx="minor">
-            <a:schemeClr val="lt1"/>
-          </a:fontRef>
-        </p:style>
-        <p:txBody>
-          <a:bodyPr rtlCol="0" anchor="ctr"/>
-          <a:lstStyle/>
-          <a:p>
-            <a:pPr algn="ctr"/>
-            <a:endParaRPr lang="en-US"/>
+            <a:pPr marL="0" indent="0">
+              <a:buNone/>
+            </a:pPr>
+            <a:r>
+              <a:rPr lang="en-US" dirty="0"/>
+              <a:t>We do not need to always start playouts from the current node, we can build a partial game tree and simulate from any node in that tree. </a:t>
+            </a:r>
+          </a:p>
+          <a:p>
+            <a:pPr marL="0" indent="0">
+              <a:buNone/>
+            </a:pPr>
+            <a:endParaRPr lang="en-US" dirty="0"/>
+          </a:p>
+          <a:p>
+            <a:pPr marL="0" indent="0">
+              <a:buNone/>
+            </a:pPr>
+            <a:r>
+              <a:rPr lang="en-US" dirty="0"/>
+              <a:t>Important considerations:</a:t>
+            </a:r>
+          </a:p>
+          <a:p>
+            <a:r>
+              <a:rPr lang="en-US" dirty="0"/>
+              <a:t>We can use UCB1 so decide what part of the tree we should focus on for the next playout.</a:t>
+            </a:r>
+          </a:p>
+          <a:p>
+            <a:r>
+              <a:rPr lang="en-US" dirty="0"/>
+              <a:t>We can only store a small part of the game tree, so we do not store the complete playout runs.</a:t>
+            </a:r>
           </a:p>
         </p:txBody>
       </p:sp>
     </p:spTree>
     <p:extLst>
       <p:ext uri="{BB962C8B-B14F-4D97-AF65-F5344CB8AC3E}">
-        <p14:creationId xmlns:p14="http://schemas.microsoft.com/office/powerpoint/2010/main" val="1770306866"/>
+        <p14:creationId xmlns:p14="http://schemas.microsoft.com/office/powerpoint/2010/main" val="1280639319"/>
       </p:ext>
     </p:extLst>
   </p:cSld>
@@ -25797,6 +24576,1298 @@
       </p:grpSpPr>
       <p:pic>
         <p:nvPicPr>
+          <p:cNvPr id="4" name="Picture 3">
+            <a:extLst>
+              <a:ext uri="{FF2B5EF4-FFF2-40B4-BE49-F238E27FC236}">
+                <a16:creationId xmlns:a16="http://schemas.microsoft.com/office/drawing/2014/main" id="{A2183ED0-97C8-46A9-ACE4-0AB43323E179}"/>
+              </a:ext>
+            </a:extLst>
+          </p:cNvPr>
+          <p:cNvPicPr>
+            <a:picLocks noChangeAspect="1"/>
+          </p:cNvPicPr>
+          <p:nvPr/>
+        </p:nvPicPr>
+        <p:blipFill>
+          <a:blip r:embed="rId2"/>
+          <a:stretch>
+            <a:fillRect/>
+          </a:stretch>
+        </p:blipFill>
+        <p:spPr>
+          <a:xfrm>
+            <a:off x="381000" y="354114"/>
+            <a:ext cx="8171826" cy="2437212"/>
+          </a:xfrm>
+          <a:prstGeom prst="rect">
+            <a:avLst/>
+          </a:prstGeom>
+        </p:spPr>
+        <p:style>
+          <a:lnRef idx="2">
+            <a:schemeClr val="accent2"/>
+          </a:lnRef>
+          <a:fillRef idx="1">
+            <a:schemeClr val="lt1"/>
+          </a:fillRef>
+          <a:effectRef idx="0">
+            <a:schemeClr val="accent2"/>
+          </a:effectRef>
+          <a:fontRef idx="minor">
+            <a:schemeClr val="dk1"/>
+          </a:fontRef>
+        </p:style>
+      </p:pic>
+      <p:pic>
+        <p:nvPicPr>
+          <p:cNvPr id="5" name="Picture 4">
+            <a:extLst>
+              <a:ext uri="{FF2B5EF4-FFF2-40B4-BE49-F238E27FC236}">
+                <a16:creationId xmlns:a16="http://schemas.microsoft.com/office/drawing/2014/main" id="{FF83E86E-0770-4D97-B52D-C26C85CF9C39}"/>
+              </a:ext>
+            </a:extLst>
+          </p:cNvPr>
+          <p:cNvPicPr>
+            <a:picLocks noChangeAspect="1"/>
+          </p:cNvPicPr>
+          <p:nvPr/>
+        </p:nvPicPr>
+        <p:blipFill>
+          <a:blip r:embed="rId3"/>
+          <a:stretch>
+            <a:fillRect/>
+          </a:stretch>
+        </p:blipFill>
+        <p:spPr>
+          <a:xfrm>
+            <a:off x="978351" y="2819400"/>
+            <a:ext cx="7784649" cy="3189476"/>
+          </a:xfrm>
+          <a:prstGeom prst="rect">
+            <a:avLst/>
+          </a:prstGeom>
+        </p:spPr>
+      </p:pic>
+      <p:sp>
+        <p:nvSpPr>
+          <p:cNvPr id="6" name="Speech Bubble: Rectangle 5">
+            <a:extLst>
+              <a:ext uri="{FF2B5EF4-FFF2-40B4-BE49-F238E27FC236}">
+                <a16:creationId xmlns:a16="http://schemas.microsoft.com/office/drawing/2014/main" id="{559D4B9A-014D-421F-AD0F-76EDEBC51C3A}"/>
+              </a:ext>
+            </a:extLst>
+          </p:cNvPr>
+          <p:cNvSpPr/>
+          <p:nvPr/>
+        </p:nvSpPr>
+        <p:spPr>
+          <a:xfrm>
+            <a:off x="3901408" y="5961528"/>
+            <a:ext cx="2286000" cy="838200"/>
+          </a:xfrm>
+          <a:prstGeom prst="wedgeRectCallout">
+            <a:avLst>
+              <a:gd name="adj1" fmla="val -47565"/>
+              <a:gd name="adj2" fmla="val -93817"/>
+            </a:avLst>
+          </a:prstGeom>
+        </p:spPr>
+        <p:style>
+          <a:lnRef idx="3">
+            <a:schemeClr val="lt1"/>
+          </a:lnRef>
+          <a:fillRef idx="1">
+            <a:schemeClr val="accent6"/>
+          </a:fillRef>
+          <a:effectRef idx="1">
+            <a:schemeClr val="accent6"/>
+          </a:effectRef>
+          <a:fontRef idx="minor">
+            <a:schemeClr val="lt1"/>
+          </a:fontRef>
+        </p:style>
+        <p:txBody>
+          <a:bodyPr rtlCol="0" anchor="ctr"/>
+          <a:lstStyle/>
+          <a:p>
+            <a:pPr algn="ctr"/>
+            <a:r>
+              <a:rPr lang="en-US" sz="1600" dirty="0"/>
+              <a:t>Note: the simulation path is not recorded to preserve memory!</a:t>
+            </a:r>
+          </a:p>
+        </p:txBody>
+      </p:sp>
+      <p:sp>
+        <p:nvSpPr>
+          <p:cNvPr id="7" name="Speech Bubble: Rectangle 6">
+            <a:extLst>
+              <a:ext uri="{FF2B5EF4-FFF2-40B4-BE49-F238E27FC236}">
+                <a16:creationId xmlns:a16="http://schemas.microsoft.com/office/drawing/2014/main" id="{8384930E-C4A4-4194-BB17-475E43E41D5F}"/>
+              </a:ext>
+            </a:extLst>
+          </p:cNvPr>
+          <p:cNvSpPr/>
+          <p:nvPr/>
+        </p:nvSpPr>
+        <p:spPr>
+          <a:xfrm>
+            <a:off x="3400113" y="1295400"/>
+            <a:ext cx="2133600" cy="381000"/>
+          </a:xfrm>
+          <a:prstGeom prst="wedgeRectCallout">
+            <a:avLst>
+              <a:gd name="adj1" fmla="val -71362"/>
+              <a:gd name="adj2" fmla="val -25922"/>
+            </a:avLst>
+          </a:prstGeom>
+        </p:spPr>
+        <p:style>
+          <a:lnRef idx="3">
+            <a:schemeClr val="lt1"/>
+          </a:lnRef>
+          <a:fillRef idx="1">
+            <a:schemeClr val="accent6"/>
+          </a:fillRef>
+          <a:effectRef idx="1">
+            <a:schemeClr val="accent6"/>
+          </a:effectRef>
+          <a:fontRef idx="minor">
+            <a:schemeClr val="lt1"/>
+          </a:fontRef>
+        </p:style>
+        <p:txBody>
+          <a:bodyPr rtlCol="0" anchor="ctr"/>
+          <a:lstStyle/>
+          <a:p>
+            <a:pPr algn="ctr"/>
+            <a:r>
+              <a:rPr lang="en-US" dirty="0"/>
+              <a:t>Highest UCB1 score</a:t>
+            </a:r>
+          </a:p>
+        </p:txBody>
+      </p:sp>
+      <p:sp>
+        <p:nvSpPr>
+          <p:cNvPr id="8" name="Speech Bubble: Rectangle 7">
+            <a:extLst>
+              <a:ext uri="{FF2B5EF4-FFF2-40B4-BE49-F238E27FC236}">
+                <a16:creationId xmlns:a16="http://schemas.microsoft.com/office/drawing/2014/main" id="{F14742F9-67BA-4ED1-A2CE-411A6E61255D}"/>
+              </a:ext>
+            </a:extLst>
+          </p:cNvPr>
+          <p:cNvSpPr/>
+          <p:nvPr/>
+        </p:nvSpPr>
+        <p:spPr>
+          <a:xfrm>
+            <a:off x="5105400" y="1676400"/>
+            <a:ext cx="3352800" cy="643689"/>
+          </a:xfrm>
+          <a:prstGeom prst="wedgeRectCallout">
+            <a:avLst>
+              <a:gd name="adj1" fmla="val -70802"/>
+              <a:gd name="adj2" fmla="val 66494"/>
+            </a:avLst>
+          </a:prstGeom>
+        </p:spPr>
+        <p:style>
+          <a:lnRef idx="3">
+            <a:schemeClr val="lt1"/>
+          </a:lnRef>
+          <a:fillRef idx="1">
+            <a:schemeClr val="accent6"/>
+          </a:fillRef>
+          <a:effectRef idx="1">
+            <a:schemeClr val="accent6"/>
+          </a:effectRef>
+          <a:fontRef idx="minor">
+            <a:schemeClr val="lt1"/>
+          </a:fontRef>
+        </p:style>
+        <p:txBody>
+          <a:bodyPr rtlCol="0" anchor="ctr"/>
+          <a:lstStyle/>
+          <a:p>
+            <a:pPr algn="ctr"/>
+            <a:r>
+              <a:rPr lang="en-US" dirty="0"/>
+              <a:t>UCB1 selection favors win percentage more and more.</a:t>
+            </a:r>
+          </a:p>
+        </p:txBody>
+      </p:sp>
+      <p:sp>
+        <p:nvSpPr>
+          <p:cNvPr id="9" name="TextBox 8">
+            <a:extLst>
+              <a:ext uri="{FF2B5EF4-FFF2-40B4-BE49-F238E27FC236}">
+                <a16:creationId xmlns:a16="http://schemas.microsoft.com/office/drawing/2014/main" id="{E49ADF20-5360-4C46-9A0F-C4AC022BFFB2}"/>
+              </a:ext>
+            </a:extLst>
+          </p:cNvPr>
+          <p:cNvSpPr txBox="1"/>
+          <p:nvPr/>
+        </p:nvSpPr>
+        <p:spPr>
+          <a:xfrm>
+            <a:off x="2743200" y="2895600"/>
+            <a:ext cx="1084079" cy="276999"/>
+          </a:xfrm>
+          <a:prstGeom prst="rect">
+            <a:avLst/>
+          </a:prstGeom>
+          <a:noFill/>
+        </p:spPr>
+        <p:txBody>
+          <a:bodyPr wrap="none" rtlCol="0">
+            <a:spAutoFit/>
+          </a:bodyPr>
+          <a:lstStyle/>
+          <a:p>
+            <a:r>
+              <a:rPr lang="en-US" sz="1200" dirty="0"/>
+              <a:t>Wins/Playouts</a:t>
+            </a:r>
+          </a:p>
+        </p:txBody>
+      </p:sp>
+      <p:sp>
+        <p:nvSpPr>
+          <p:cNvPr id="10" name="Oval 9">
+            <a:extLst>
+              <a:ext uri="{FF2B5EF4-FFF2-40B4-BE49-F238E27FC236}">
+                <a16:creationId xmlns:a16="http://schemas.microsoft.com/office/drawing/2014/main" id="{15C69B09-9D37-4124-A65C-8B45BABCAFB7}"/>
+              </a:ext>
+            </a:extLst>
+          </p:cNvPr>
+          <p:cNvSpPr/>
+          <p:nvPr/>
+        </p:nvSpPr>
+        <p:spPr>
+          <a:xfrm>
+            <a:off x="1128530" y="4648200"/>
+            <a:ext cx="381000" cy="381000"/>
+          </a:xfrm>
+          <a:prstGeom prst="ellipse">
+            <a:avLst/>
+          </a:prstGeom>
+          <a:noFill/>
+          <a:ln w="38100">
+            <a:solidFill>
+              <a:srgbClr val="FF0000"/>
+            </a:solidFill>
+          </a:ln>
+        </p:spPr>
+        <p:style>
+          <a:lnRef idx="2">
+            <a:schemeClr val="accent1">
+              <a:shade val="50000"/>
+            </a:schemeClr>
+          </a:lnRef>
+          <a:fillRef idx="1">
+            <a:schemeClr val="accent1"/>
+          </a:fillRef>
+          <a:effectRef idx="0">
+            <a:schemeClr val="accent1"/>
+          </a:effectRef>
+          <a:fontRef idx="minor">
+            <a:schemeClr val="lt1"/>
+          </a:fontRef>
+        </p:style>
+        <p:txBody>
+          <a:bodyPr rtlCol="0" anchor="ctr"/>
+          <a:lstStyle/>
+          <a:p>
+            <a:pPr algn="ctr"/>
+            <a:endParaRPr lang="en-US"/>
+          </a:p>
+        </p:txBody>
+      </p:sp>
+      <p:sp>
+        <p:nvSpPr>
+          <p:cNvPr id="11" name="Oval 10">
+            <a:extLst>
+              <a:ext uri="{FF2B5EF4-FFF2-40B4-BE49-F238E27FC236}">
+                <a16:creationId xmlns:a16="http://schemas.microsoft.com/office/drawing/2014/main" id="{8CA756EA-5537-4B96-9E24-93C99C7BC71F}"/>
+              </a:ext>
+            </a:extLst>
+          </p:cNvPr>
+          <p:cNvSpPr/>
+          <p:nvPr/>
+        </p:nvSpPr>
+        <p:spPr>
+          <a:xfrm>
+            <a:off x="6693352" y="4089549"/>
+            <a:ext cx="381000" cy="381000"/>
+          </a:xfrm>
+          <a:prstGeom prst="ellipse">
+            <a:avLst/>
+          </a:prstGeom>
+          <a:noFill/>
+          <a:ln w="38100">
+            <a:solidFill>
+              <a:srgbClr val="FF0000"/>
+            </a:solidFill>
+          </a:ln>
+        </p:spPr>
+        <p:style>
+          <a:lnRef idx="2">
+            <a:schemeClr val="accent1">
+              <a:shade val="50000"/>
+            </a:schemeClr>
+          </a:lnRef>
+          <a:fillRef idx="1">
+            <a:schemeClr val="accent1"/>
+          </a:fillRef>
+          <a:effectRef idx="0">
+            <a:schemeClr val="accent1"/>
+          </a:effectRef>
+          <a:fontRef idx="minor">
+            <a:schemeClr val="lt1"/>
+          </a:fontRef>
+        </p:style>
+        <p:txBody>
+          <a:bodyPr rtlCol="0" anchor="ctr"/>
+          <a:lstStyle/>
+          <a:p>
+            <a:pPr algn="ctr"/>
+            <a:endParaRPr lang="en-US"/>
+          </a:p>
+        </p:txBody>
+      </p:sp>
+      <p:sp>
+        <p:nvSpPr>
+          <p:cNvPr id="12" name="Oval 11">
+            <a:extLst>
+              <a:ext uri="{FF2B5EF4-FFF2-40B4-BE49-F238E27FC236}">
+                <a16:creationId xmlns:a16="http://schemas.microsoft.com/office/drawing/2014/main" id="{51D6C00C-0565-4048-9352-92A781CD61BC}"/>
+              </a:ext>
+            </a:extLst>
+          </p:cNvPr>
+          <p:cNvSpPr/>
+          <p:nvPr/>
+        </p:nvSpPr>
+        <p:spPr>
+          <a:xfrm>
+            <a:off x="6693352" y="3504012"/>
+            <a:ext cx="381000" cy="381000"/>
+          </a:xfrm>
+          <a:prstGeom prst="ellipse">
+            <a:avLst/>
+          </a:prstGeom>
+          <a:noFill/>
+          <a:ln w="38100">
+            <a:solidFill>
+              <a:srgbClr val="FF0000"/>
+            </a:solidFill>
+          </a:ln>
+        </p:spPr>
+        <p:style>
+          <a:lnRef idx="2">
+            <a:schemeClr val="accent1">
+              <a:shade val="50000"/>
+            </a:schemeClr>
+          </a:lnRef>
+          <a:fillRef idx="1">
+            <a:schemeClr val="accent1"/>
+          </a:fillRef>
+          <a:effectRef idx="0">
+            <a:schemeClr val="accent1"/>
+          </a:effectRef>
+          <a:fontRef idx="minor">
+            <a:schemeClr val="lt1"/>
+          </a:fontRef>
+        </p:style>
+        <p:txBody>
+          <a:bodyPr rtlCol="0" anchor="ctr"/>
+          <a:lstStyle/>
+          <a:p>
+            <a:pPr algn="ctr"/>
+            <a:endParaRPr lang="en-US"/>
+          </a:p>
+        </p:txBody>
+      </p:sp>
+      <p:sp>
+        <p:nvSpPr>
+          <p:cNvPr id="13" name="Oval 12">
+            <a:extLst>
+              <a:ext uri="{FF2B5EF4-FFF2-40B4-BE49-F238E27FC236}">
+                <a16:creationId xmlns:a16="http://schemas.microsoft.com/office/drawing/2014/main" id="{86018CB8-30CF-469B-8288-0444EE3BCAD4}"/>
+              </a:ext>
+            </a:extLst>
+          </p:cNvPr>
+          <p:cNvSpPr/>
+          <p:nvPr/>
+        </p:nvSpPr>
+        <p:spPr>
+          <a:xfrm>
+            <a:off x="7315200" y="2908652"/>
+            <a:ext cx="381000" cy="396026"/>
+          </a:xfrm>
+          <a:prstGeom prst="ellipse">
+            <a:avLst/>
+          </a:prstGeom>
+          <a:noFill/>
+          <a:ln w="38100">
+            <a:solidFill>
+              <a:srgbClr val="FF0000"/>
+            </a:solidFill>
+          </a:ln>
+        </p:spPr>
+        <p:style>
+          <a:lnRef idx="2">
+            <a:schemeClr val="accent1">
+              <a:shade val="50000"/>
+            </a:schemeClr>
+          </a:lnRef>
+          <a:fillRef idx="1">
+            <a:schemeClr val="accent1"/>
+          </a:fillRef>
+          <a:effectRef idx="0">
+            <a:schemeClr val="accent1"/>
+          </a:effectRef>
+          <a:fontRef idx="minor">
+            <a:schemeClr val="lt1"/>
+          </a:fontRef>
+        </p:style>
+        <p:txBody>
+          <a:bodyPr rtlCol="0" anchor="ctr"/>
+          <a:lstStyle/>
+          <a:p>
+            <a:pPr algn="ctr"/>
+            <a:endParaRPr lang="en-US"/>
+          </a:p>
+        </p:txBody>
+      </p:sp>
+      <p:sp>
+        <p:nvSpPr>
+          <p:cNvPr id="14" name="Oval 13">
+            <a:extLst>
+              <a:ext uri="{FF2B5EF4-FFF2-40B4-BE49-F238E27FC236}">
+                <a16:creationId xmlns:a16="http://schemas.microsoft.com/office/drawing/2014/main" id="{90B203F2-B256-499E-968C-FBC9A0FAC327}"/>
+              </a:ext>
+            </a:extLst>
+          </p:cNvPr>
+          <p:cNvSpPr/>
+          <p:nvPr/>
+        </p:nvSpPr>
+        <p:spPr>
+          <a:xfrm>
+            <a:off x="6121852" y="4635575"/>
+            <a:ext cx="381000" cy="381000"/>
+          </a:xfrm>
+          <a:prstGeom prst="ellipse">
+            <a:avLst/>
+          </a:prstGeom>
+          <a:noFill/>
+          <a:ln w="38100">
+            <a:solidFill>
+              <a:srgbClr val="FF0000"/>
+            </a:solidFill>
+          </a:ln>
+        </p:spPr>
+        <p:style>
+          <a:lnRef idx="2">
+            <a:schemeClr val="accent1">
+              <a:shade val="50000"/>
+            </a:schemeClr>
+          </a:lnRef>
+          <a:fillRef idx="1">
+            <a:schemeClr val="accent1"/>
+          </a:fillRef>
+          <a:effectRef idx="0">
+            <a:schemeClr val="accent1"/>
+          </a:effectRef>
+          <a:fontRef idx="minor">
+            <a:schemeClr val="lt1"/>
+          </a:fontRef>
+        </p:style>
+        <p:txBody>
+          <a:bodyPr rtlCol="0" anchor="ctr"/>
+          <a:lstStyle/>
+          <a:p>
+            <a:pPr algn="ctr"/>
+            <a:endParaRPr lang="en-US"/>
+          </a:p>
+        </p:txBody>
+      </p:sp>
+      <p:sp>
+        <p:nvSpPr>
+          <p:cNvPr id="15" name="TextBox 14">
+            <a:extLst>
+              <a:ext uri="{FF2B5EF4-FFF2-40B4-BE49-F238E27FC236}">
+                <a16:creationId xmlns:a16="http://schemas.microsoft.com/office/drawing/2014/main" id="{599F4839-3EDC-4379-B9CC-63887372CCD6}"/>
+              </a:ext>
+            </a:extLst>
+          </p:cNvPr>
+          <p:cNvSpPr txBox="1"/>
+          <p:nvPr/>
+        </p:nvSpPr>
+        <p:spPr>
+          <a:xfrm>
+            <a:off x="557598" y="2999601"/>
+            <a:ext cx="562911" cy="276999"/>
+          </a:xfrm>
+          <a:prstGeom prst="rect">
+            <a:avLst/>
+          </a:prstGeom>
+          <a:noFill/>
+        </p:spPr>
+        <p:txBody>
+          <a:bodyPr wrap="none" rtlCol="0">
+            <a:spAutoFit/>
+          </a:bodyPr>
+          <a:lstStyle/>
+          <a:p>
+            <a:r>
+              <a:rPr lang="en-US" sz="1200" dirty="0"/>
+              <a:t>White</a:t>
+            </a:r>
+          </a:p>
+        </p:txBody>
+      </p:sp>
+      <p:sp>
+        <p:nvSpPr>
+          <p:cNvPr id="16" name="TextBox 15">
+            <a:extLst>
+              <a:ext uri="{FF2B5EF4-FFF2-40B4-BE49-F238E27FC236}">
+                <a16:creationId xmlns:a16="http://schemas.microsoft.com/office/drawing/2014/main" id="{4DEA6A0B-F53D-480C-99D5-82DB6899E24E}"/>
+              </a:ext>
+            </a:extLst>
+          </p:cNvPr>
+          <p:cNvSpPr txBox="1"/>
+          <p:nvPr/>
+        </p:nvSpPr>
+        <p:spPr>
+          <a:xfrm>
+            <a:off x="557598" y="4089549"/>
+            <a:ext cx="562911" cy="276999"/>
+          </a:xfrm>
+          <a:prstGeom prst="rect">
+            <a:avLst/>
+          </a:prstGeom>
+          <a:noFill/>
+        </p:spPr>
+        <p:txBody>
+          <a:bodyPr wrap="none" rtlCol="0">
+            <a:spAutoFit/>
+          </a:bodyPr>
+          <a:lstStyle/>
+          <a:p>
+            <a:r>
+              <a:rPr lang="en-US" sz="1200" dirty="0"/>
+              <a:t>White</a:t>
+            </a:r>
+          </a:p>
+        </p:txBody>
+      </p:sp>
+      <p:sp>
+        <p:nvSpPr>
+          <p:cNvPr id="17" name="TextBox 16">
+            <a:extLst>
+              <a:ext uri="{FF2B5EF4-FFF2-40B4-BE49-F238E27FC236}">
+                <a16:creationId xmlns:a16="http://schemas.microsoft.com/office/drawing/2014/main" id="{4FB26089-CE33-4440-8867-7A807316C56E}"/>
+              </a:ext>
+            </a:extLst>
+          </p:cNvPr>
+          <p:cNvSpPr txBox="1"/>
+          <p:nvPr/>
+        </p:nvSpPr>
+        <p:spPr>
+          <a:xfrm>
+            <a:off x="557598" y="5179497"/>
+            <a:ext cx="562911" cy="276999"/>
+          </a:xfrm>
+          <a:prstGeom prst="rect">
+            <a:avLst/>
+          </a:prstGeom>
+          <a:noFill/>
+        </p:spPr>
+        <p:txBody>
+          <a:bodyPr wrap="none" rtlCol="0">
+            <a:spAutoFit/>
+          </a:bodyPr>
+          <a:lstStyle/>
+          <a:p>
+            <a:r>
+              <a:rPr lang="en-US" sz="1200" dirty="0"/>
+              <a:t>White</a:t>
+            </a:r>
+          </a:p>
+        </p:txBody>
+      </p:sp>
+      <p:cxnSp>
+        <p:nvCxnSpPr>
+          <p:cNvPr id="21" name="Straight Connector 20">
+            <a:extLst>
+              <a:ext uri="{FF2B5EF4-FFF2-40B4-BE49-F238E27FC236}">
+                <a16:creationId xmlns:a16="http://schemas.microsoft.com/office/drawing/2014/main" id="{D5A7904B-BA97-438D-83FF-897983384C78}"/>
+              </a:ext>
+            </a:extLst>
+          </p:cNvPr>
+          <p:cNvCxnSpPr/>
+          <p:nvPr/>
+        </p:nvCxnSpPr>
+        <p:spPr>
+          <a:xfrm>
+            <a:off x="685800" y="3352800"/>
+            <a:ext cx="7912552" cy="0"/>
+          </a:xfrm>
+          <a:prstGeom prst="line">
+            <a:avLst/>
+          </a:prstGeom>
+          <a:ln w="9525" cap="flat" cmpd="sng" algn="ctr">
+            <a:solidFill>
+              <a:schemeClr val="accent3"/>
+            </a:solidFill>
+            <a:prstDash val="dash"/>
+            <a:round/>
+            <a:headEnd type="none" w="med" len="med"/>
+            <a:tailEnd type="none" w="med" len="med"/>
+          </a:ln>
+        </p:spPr>
+        <p:style>
+          <a:lnRef idx="0">
+            <a:scrgbClr r="0" g="0" b="0"/>
+          </a:lnRef>
+          <a:fillRef idx="0">
+            <a:scrgbClr r="0" g="0" b="0"/>
+          </a:fillRef>
+          <a:effectRef idx="0">
+            <a:scrgbClr r="0" g="0" b="0"/>
+          </a:effectRef>
+          <a:fontRef idx="minor">
+            <a:schemeClr val="tx1"/>
+          </a:fontRef>
+        </p:style>
+      </p:cxnSp>
+      <p:cxnSp>
+        <p:nvCxnSpPr>
+          <p:cNvPr id="23" name="Straight Connector 22">
+            <a:extLst>
+              <a:ext uri="{FF2B5EF4-FFF2-40B4-BE49-F238E27FC236}">
+                <a16:creationId xmlns:a16="http://schemas.microsoft.com/office/drawing/2014/main" id="{84117894-7786-4518-8579-1E6221DB0E65}"/>
+              </a:ext>
+            </a:extLst>
+          </p:cNvPr>
+          <p:cNvCxnSpPr/>
+          <p:nvPr/>
+        </p:nvCxnSpPr>
+        <p:spPr>
+          <a:xfrm>
+            <a:off x="685800" y="3962400"/>
+            <a:ext cx="7912552" cy="0"/>
+          </a:xfrm>
+          <a:prstGeom prst="line">
+            <a:avLst/>
+          </a:prstGeom>
+          <a:ln w="9525" cap="flat" cmpd="sng" algn="ctr">
+            <a:solidFill>
+              <a:schemeClr val="accent3"/>
+            </a:solidFill>
+            <a:prstDash val="dash"/>
+            <a:round/>
+            <a:headEnd type="none" w="med" len="med"/>
+            <a:tailEnd type="none" w="med" len="med"/>
+          </a:ln>
+        </p:spPr>
+        <p:style>
+          <a:lnRef idx="0">
+            <a:scrgbClr r="0" g="0" b="0"/>
+          </a:lnRef>
+          <a:fillRef idx="0">
+            <a:scrgbClr r="0" g="0" b="0"/>
+          </a:fillRef>
+          <a:effectRef idx="0">
+            <a:scrgbClr r="0" g="0" b="0"/>
+          </a:effectRef>
+          <a:fontRef idx="minor">
+            <a:schemeClr val="tx1"/>
+          </a:fontRef>
+        </p:style>
+      </p:cxnSp>
+      <p:cxnSp>
+        <p:nvCxnSpPr>
+          <p:cNvPr id="24" name="Straight Connector 23">
+            <a:extLst>
+              <a:ext uri="{FF2B5EF4-FFF2-40B4-BE49-F238E27FC236}">
+                <a16:creationId xmlns:a16="http://schemas.microsoft.com/office/drawing/2014/main" id="{2AEADF8D-FF0D-4751-9CC4-1349724322A9}"/>
+              </a:ext>
+            </a:extLst>
+          </p:cNvPr>
+          <p:cNvCxnSpPr/>
+          <p:nvPr/>
+        </p:nvCxnSpPr>
+        <p:spPr>
+          <a:xfrm>
+            <a:off x="685800" y="4572000"/>
+            <a:ext cx="7912552" cy="0"/>
+          </a:xfrm>
+          <a:prstGeom prst="line">
+            <a:avLst/>
+          </a:prstGeom>
+          <a:ln w="9525" cap="flat" cmpd="sng" algn="ctr">
+            <a:solidFill>
+              <a:schemeClr val="accent3"/>
+            </a:solidFill>
+            <a:prstDash val="dash"/>
+            <a:round/>
+            <a:headEnd type="none" w="med" len="med"/>
+            <a:tailEnd type="none" w="med" len="med"/>
+          </a:ln>
+        </p:spPr>
+        <p:style>
+          <a:lnRef idx="0">
+            <a:scrgbClr r="0" g="0" b="0"/>
+          </a:lnRef>
+          <a:fillRef idx="0">
+            <a:scrgbClr r="0" g="0" b="0"/>
+          </a:fillRef>
+          <a:effectRef idx="0">
+            <a:scrgbClr r="0" g="0" b="0"/>
+          </a:effectRef>
+          <a:fontRef idx="minor">
+            <a:schemeClr val="tx1"/>
+          </a:fontRef>
+        </p:style>
+      </p:cxnSp>
+      <p:cxnSp>
+        <p:nvCxnSpPr>
+          <p:cNvPr id="25" name="Straight Connector 24">
+            <a:extLst>
+              <a:ext uri="{FF2B5EF4-FFF2-40B4-BE49-F238E27FC236}">
+                <a16:creationId xmlns:a16="http://schemas.microsoft.com/office/drawing/2014/main" id="{FE0ADEEF-F66F-4D2B-A3EA-DBA44B3245A7}"/>
+              </a:ext>
+            </a:extLst>
+          </p:cNvPr>
+          <p:cNvCxnSpPr/>
+          <p:nvPr/>
+        </p:nvCxnSpPr>
+        <p:spPr>
+          <a:xfrm>
+            <a:off x="698048" y="5105400"/>
+            <a:ext cx="7912552" cy="0"/>
+          </a:xfrm>
+          <a:prstGeom prst="line">
+            <a:avLst/>
+          </a:prstGeom>
+          <a:ln w="9525" cap="flat" cmpd="sng" algn="ctr">
+            <a:solidFill>
+              <a:schemeClr val="accent3"/>
+            </a:solidFill>
+            <a:prstDash val="dash"/>
+            <a:round/>
+            <a:headEnd type="none" w="med" len="med"/>
+            <a:tailEnd type="none" w="med" len="med"/>
+          </a:ln>
+        </p:spPr>
+        <p:style>
+          <a:lnRef idx="0">
+            <a:scrgbClr r="0" g="0" b="0"/>
+          </a:lnRef>
+          <a:fillRef idx="0">
+            <a:scrgbClr r="0" g="0" b="0"/>
+          </a:fillRef>
+          <a:effectRef idx="0">
+            <a:scrgbClr r="0" g="0" b="0"/>
+          </a:effectRef>
+          <a:fontRef idx="minor">
+            <a:schemeClr val="tx1"/>
+          </a:fontRef>
+        </p:style>
+      </p:cxnSp>
+      <p:sp>
+        <p:nvSpPr>
+          <p:cNvPr id="26" name="TextBox 25">
+            <a:extLst>
+              <a:ext uri="{FF2B5EF4-FFF2-40B4-BE49-F238E27FC236}">
+                <a16:creationId xmlns:a16="http://schemas.microsoft.com/office/drawing/2014/main" id="{75F504AB-4225-404B-8E4F-67D9B559C564}"/>
+              </a:ext>
+            </a:extLst>
+          </p:cNvPr>
+          <p:cNvSpPr txBox="1"/>
+          <p:nvPr/>
+        </p:nvSpPr>
+        <p:spPr>
+          <a:xfrm>
+            <a:off x="582412" y="3511112"/>
+            <a:ext cx="513282" cy="276999"/>
+          </a:xfrm>
+          <a:prstGeom prst="rect">
+            <a:avLst/>
+          </a:prstGeom>
+          <a:noFill/>
+        </p:spPr>
+        <p:txBody>
+          <a:bodyPr wrap="none" rtlCol="0">
+            <a:spAutoFit/>
+          </a:bodyPr>
+          <a:lstStyle/>
+          <a:p>
+            <a:r>
+              <a:rPr lang="en-US" sz="1200" dirty="0"/>
+              <a:t>Black</a:t>
+            </a:r>
+          </a:p>
+        </p:txBody>
+      </p:sp>
+      <p:sp>
+        <p:nvSpPr>
+          <p:cNvPr id="27" name="TextBox 26">
+            <a:extLst>
+              <a:ext uri="{FF2B5EF4-FFF2-40B4-BE49-F238E27FC236}">
+                <a16:creationId xmlns:a16="http://schemas.microsoft.com/office/drawing/2014/main" id="{1A7FB683-F9F5-43B3-8589-DE698C4B78D0}"/>
+              </a:ext>
+            </a:extLst>
+          </p:cNvPr>
+          <p:cNvSpPr txBox="1"/>
+          <p:nvPr/>
+        </p:nvSpPr>
+        <p:spPr>
+          <a:xfrm>
+            <a:off x="582412" y="4676001"/>
+            <a:ext cx="513282" cy="276999"/>
+          </a:xfrm>
+          <a:prstGeom prst="rect">
+            <a:avLst/>
+          </a:prstGeom>
+          <a:noFill/>
+        </p:spPr>
+        <p:txBody>
+          <a:bodyPr wrap="none" rtlCol="0">
+            <a:spAutoFit/>
+          </a:bodyPr>
+          <a:lstStyle/>
+          <a:p>
+            <a:r>
+              <a:rPr lang="en-US" sz="1200" dirty="0"/>
+              <a:t>Black</a:t>
+            </a:r>
+          </a:p>
+        </p:txBody>
+      </p:sp>
+      <p:sp>
+        <p:nvSpPr>
+          <p:cNvPr id="2" name="Rectangle 1">
+            <a:extLst>
+              <a:ext uri="{FF2B5EF4-FFF2-40B4-BE49-F238E27FC236}">
+                <a16:creationId xmlns:a16="http://schemas.microsoft.com/office/drawing/2014/main" id="{1516C8A5-634E-42CD-8F82-EA0BA9FFDD98}"/>
+              </a:ext>
+            </a:extLst>
+          </p:cNvPr>
+          <p:cNvSpPr/>
+          <p:nvPr/>
+        </p:nvSpPr>
+        <p:spPr>
+          <a:xfrm>
+            <a:off x="4800600" y="2362200"/>
+            <a:ext cx="3581400" cy="341000"/>
+          </a:xfrm>
+          <a:prstGeom prst="rect">
+            <a:avLst/>
+          </a:prstGeom>
+          <a:noFill/>
+          <a:ln w="28575">
+            <a:solidFill>
+              <a:srgbClr val="FF0000"/>
+            </a:solidFill>
+          </a:ln>
+        </p:spPr>
+        <p:style>
+          <a:lnRef idx="2">
+            <a:schemeClr val="accent1">
+              <a:shade val="50000"/>
+            </a:schemeClr>
+          </a:lnRef>
+          <a:fillRef idx="1">
+            <a:schemeClr val="accent1"/>
+          </a:fillRef>
+          <a:effectRef idx="0">
+            <a:schemeClr val="accent1"/>
+          </a:effectRef>
+          <a:fontRef idx="minor">
+            <a:schemeClr val="lt1"/>
+          </a:fontRef>
+        </p:style>
+        <p:txBody>
+          <a:bodyPr rtlCol="0" anchor="ctr"/>
+          <a:lstStyle/>
+          <a:p>
+            <a:pPr algn="ctr"/>
+            <a:endParaRPr lang="en-US"/>
+          </a:p>
+        </p:txBody>
+      </p:sp>
+      <p:sp>
+        <p:nvSpPr>
+          <p:cNvPr id="30" name="Speech Bubble: Rectangle 29">
+            <a:extLst>
+              <a:ext uri="{FF2B5EF4-FFF2-40B4-BE49-F238E27FC236}">
+                <a16:creationId xmlns:a16="http://schemas.microsoft.com/office/drawing/2014/main" id="{C9BDF8D7-13E9-4165-B976-38B6BC431C55}"/>
+              </a:ext>
+            </a:extLst>
+          </p:cNvPr>
+          <p:cNvSpPr/>
+          <p:nvPr/>
+        </p:nvSpPr>
+        <p:spPr>
+          <a:xfrm>
+            <a:off x="381000" y="5891549"/>
+            <a:ext cx="1673507" cy="838200"/>
+          </a:xfrm>
+          <a:prstGeom prst="wedgeRectCallout">
+            <a:avLst>
+              <a:gd name="adj1" fmla="val 4728"/>
+              <a:gd name="adj2" fmla="val -156247"/>
+            </a:avLst>
+          </a:prstGeom>
+        </p:spPr>
+        <p:style>
+          <a:lnRef idx="3">
+            <a:schemeClr val="lt1"/>
+          </a:lnRef>
+          <a:fillRef idx="1">
+            <a:schemeClr val="accent6"/>
+          </a:fillRef>
+          <a:effectRef idx="1">
+            <a:schemeClr val="accent6"/>
+          </a:effectRef>
+          <a:fontRef idx="minor">
+            <a:schemeClr val="lt1"/>
+          </a:fontRef>
+        </p:style>
+        <p:txBody>
+          <a:bodyPr rtlCol="0" anchor="ctr"/>
+          <a:lstStyle/>
+          <a:p>
+            <a:pPr algn="ctr"/>
+            <a:r>
+              <a:rPr lang="en-US" sz="1600" dirty="0"/>
+              <a:t>Select highest UCB1 score node</a:t>
+            </a:r>
+          </a:p>
+        </p:txBody>
+      </p:sp>
+      <p:cxnSp>
+        <p:nvCxnSpPr>
+          <p:cNvPr id="20" name="Straight Arrow Connector 19">
+            <a:extLst>
+              <a:ext uri="{FF2B5EF4-FFF2-40B4-BE49-F238E27FC236}">
+                <a16:creationId xmlns:a16="http://schemas.microsoft.com/office/drawing/2014/main" id="{B53CBDDA-6B85-4575-A1E1-1B7BBBAB1E91}"/>
+              </a:ext>
+            </a:extLst>
+          </p:cNvPr>
+          <p:cNvCxnSpPr>
+            <a:cxnSpLocks/>
+            <a:endCxn id="11" idx="3"/>
+          </p:cNvCxnSpPr>
+          <p:nvPr/>
+        </p:nvCxnSpPr>
+        <p:spPr>
+          <a:xfrm flipV="1">
+            <a:off x="6462028" y="4414753"/>
+            <a:ext cx="287120" cy="261248"/>
+          </a:xfrm>
+          <a:prstGeom prst="straightConnector1">
+            <a:avLst/>
+          </a:prstGeom>
+          <a:ln w="38100">
+            <a:solidFill>
+              <a:srgbClr val="FF0000"/>
+            </a:solidFill>
+            <a:tailEnd type="triangle"/>
+          </a:ln>
+        </p:spPr>
+        <p:style>
+          <a:lnRef idx="1">
+            <a:schemeClr val="accent1"/>
+          </a:lnRef>
+          <a:fillRef idx="0">
+            <a:schemeClr val="accent1"/>
+          </a:fillRef>
+          <a:effectRef idx="0">
+            <a:schemeClr val="accent1"/>
+          </a:effectRef>
+          <a:fontRef idx="minor">
+            <a:schemeClr val="tx1"/>
+          </a:fontRef>
+        </p:style>
+      </p:cxnSp>
+      <p:cxnSp>
+        <p:nvCxnSpPr>
+          <p:cNvPr id="31" name="Straight Arrow Connector 30">
+            <a:extLst>
+              <a:ext uri="{FF2B5EF4-FFF2-40B4-BE49-F238E27FC236}">
+                <a16:creationId xmlns:a16="http://schemas.microsoft.com/office/drawing/2014/main" id="{31C6647B-D2E9-4088-B616-4526DFA01760}"/>
+              </a:ext>
+            </a:extLst>
+          </p:cNvPr>
+          <p:cNvCxnSpPr>
+            <a:cxnSpLocks/>
+            <a:endCxn id="12" idx="4"/>
+          </p:cNvCxnSpPr>
+          <p:nvPr/>
+        </p:nvCxnSpPr>
+        <p:spPr>
+          <a:xfrm flipV="1">
+            <a:off x="6856599" y="3885012"/>
+            <a:ext cx="27253" cy="194624"/>
+          </a:xfrm>
+          <a:prstGeom prst="straightConnector1">
+            <a:avLst/>
+          </a:prstGeom>
+          <a:ln w="38100">
+            <a:solidFill>
+              <a:srgbClr val="FF0000"/>
+            </a:solidFill>
+            <a:tailEnd type="triangle"/>
+          </a:ln>
+        </p:spPr>
+        <p:style>
+          <a:lnRef idx="1">
+            <a:schemeClr val="accent1"/>
+          </a:lnRef>
+          <a:fillRef idx="0">
+            <a:schemeClr val="accent1"/>
+          </a:fillRef>
+          <a:effectRef idx="0">
+            <a:schemeClr val="accent1"/>
+          </a:effectRef>
+          <a:fontRef idx="minor">
+            <a:schemeClr val="tx1"/>
+          </a:fontRef>
+        </p:style>
+      </p:cxnSp>
+      <p:cxnSp>
+        <p:nvCxnSpPr>
+          <p:cNvPr id="33" name="Straight Arrow Connector 32">
+            <a:extLst>
+              <a:ext uri="{FF2B5EF4-FFF2-40B4-BE49-F238E27FC236}">
+                <a16:creationId xmlns:a16="http://schemas.microsoft.com/office/drawing/2014/main" id="{30872F81-6E7B-4D9A-AC33-1362C71DE966}"/>
+              </a:ext>
+            </a:extLst>
+          </p:cNvPr>
+          <p:cNvCxnSpPr>
+            <a:cxnSpLocks/>
+            <a:stCxn id="12" idx="7"/>
+            <a:endCxn id="13" idx="3"/>
+          </p:cNvCxnSpPr>
+          <p:nvPr/>
+        </p:nvCxnSpPr>
+        <p:spPr>
+          <a:xfrm flipV="1">
+            <a:off x="7018556" y="3246681"/>
+            <a:ext cx="352440" cy="313127"/>
+          </a:xfrm>
+          <a:prstGeom prst="straightConnector1">
+            <a:avLst/>
+          </a:prstGeom>
+          <a:ln w="38100">
+            <a:solidFill>
+              <a:srgbClr val="FF0000"/>
+            </a:solidFill>
+            <a:tailEnd type="triangle"/>
+          </a:ln>
+        </p:spPr>
+        <p:style>
+          <a:lnRef idx="1">
+            <a:schemeClr val="accent1"/>
+          </a:lnRef>
+          <a:fillRef idx="0">
+            <a:schemeClr val="accent1"/>
+          </a:fillRef>
+          <a:effectRef idx="0">
+            <a:schemeClr val="accent1"/>
+          </a:effectRef>
+          <a:fontRef idx="minor">
+            <a:schemeClr val="tx1"/>
+          </a:fontRef>
+        </p:style>
+      </p:cxnSp>
+      <p:sp>
+        <p:nvSpPr>
+          <p:cNvPr id="44" name="Oval 43">
+            <a:extLst>
+              <a:ext uri="{FF2B5EF4-FFF2-40B4-BE49-F238E27FC236}">
+                <a16:creationId xmlns:a16="http://schemas.microsoft.com/office/drawing/2014/main" id="{F6965377-92F5-478D-86E0-6BC8DC756AFF}"/>
+              </a:ext>
+            </a:extLst>
+          </p:cNvPr>
+          <p:cNvSpPr/>
+          <p:nvPr/>
+        </p:nvSpPr>
+        <p:spPr>
+          <a:xfrm>
+            <a:off x="6121852" y="5183508"/>
+            <a:ext cx="381000" cy="381000"/>
+          </a:xfrm>
+          <a:prstGeom prst="ellipse">
+            <a:avLst/>
+          </a:prstGeom>
+          <a:noFill/>
+          <a:ln w="38100">
+            <a:solidFill>
+              <a:srgbClr val="FF0000"/>
+            </a:solidFill>
+          </a:ln>
+        </p:spPr>
+        <p:style>
+          <a:lnRef idx="2">
+            <a:schemeClr val="accent1">
+              <a:shade val="50000"/>
+            </a:schemeClr>
+          </a:lnRef>
+          <a:fillRef idx="1">
+            <a:schemeClr val="accent1"/>
+          </a:fillRef>
+          <a:effectRef idx="0">
+            <a:schemeClr val="accent1"/>
+          </a:effectRef>
+          <a:fontRef idx="minor">
+            <a:schemeClr val="lt1"/>
+          </a:fontRef>
+        </p:style>
+        <p:txBody>
+          <a:bodyPr rtlCol="0" anchor="ctr"/>
+          <a:lstStyle/>
+          <a:p>
+            <a:pPr algn="ctr"/>
+            <a:endParaRPr lang="en-US"/>
+          </a:p>
+        </p:txBody>
+      </p:sp>
+      <p:cxnSp>
+        <p:nvCxnSpPr>
+          <p:cNvPr id="45" name="Straight Arrow Connector 44">
+            <a:extLst>
+              <a:ext uri="{FF2B5EF4-FFF2-40B4-BE49-F238E27FC236}">
+                <a16:creationId xmlns:a16="http://schemas.microsoft.com/office/drawing/2014/main" id="{A7BF5870-B5EE-44E4-A1B1-B29644B74F68}"/>
+              </a:ext>
+            </a:extLst>
+          </p:cNvPr>
+          <p:cNvCxnSpPr>
+            <a:cxnSpLocks/>
+            <a:stCxn id="44" idx="0"/>
+            <a:endCxn id="14" idx="4"/>
+          </p:cNvCxnSpPr>
+          <p:nvPr/>
+        </p:nvCxnSpPr>
+        <p:spPr>
+          <a:xfrm flipV="1">
+            <a:off x="6312352" y="5016575"/>
+            <a:ext cx="0" cy="166933"/>
+          </a:xfrm>
+          <a:prstGeom prst="straightConnector1">
+            <a:avLst/>
+          </a:prstGeom>
+          <a:ln w="38100">
+            <a:solidFill>
+              <a:srgbClr val="FF0000"/>
+            </a:solidFill>
+            <a:tailEnd type="triangle"/>
+          </a:ln>
+        </p:spPr>
+        <p:style>
+          <a:lnRef idx="1">
+            <a:schemeClr val="accent1"/>
+          </a:lnRef>
+          <a:fillRef idx="0">
+            <a:schemeClr val="accent1"/>
+          </a:fillRef>
+          <a:effectRef idx="0">
+            <a:schemeClr val="accent1"/>
+          </a:effectRef>
+          <a:fontRef idx="minor">
+            <a:schemeClr val="tx1"/>
+          </a:fontRef>
+        </p:style>
+      </p:cxnSp>
+      <p:sp>
+        <p:nvSpPr>
+          <p:cNvPr id="48" name="Oval 47">
+            <a:extLst>
+              <a:ext uri="{FF2B5EF4-FFF2-40B4-BE49-F238E27FC236}">
+                <a16:creationId xmlns:a16="http://schemas.microsoft.com/office/drawing/2014/main" id="{83CCEF06-F7F5-4DE5-9901-29E2DFF7A679}"/>
+              </a:ext>
+            </a:extLst>
+          </p:cNvPr>
+          <p:cNvSpPr/>
+          <p:nvPr/>
+        </p:nvSpPr>
+        <p:spPr>
+          <a:xfrm>
+            <a:off x="3633105" y="5194226"/>
+            <a:ext cx="381000" cy="381000"/>
+          </a:xfrm>
+          <a:prstGeom prst="ellipse">
+            <a:avLst/>
+          </a:prstGeom>
+          <a:noFill/>
+          <a:ln w="38100">
+            <a:solidFill>
+              <a:srgbClr val="FF0000"/>
+            </a:solidFill>
+          </a:ln>
+        </p:spPr>
+        <p:style>
+          <a:lnRef idx="2">
+            <a:schemeClr val="accent1">
+              <a:shade val="50000"/>
+            </a:schemeClr>
+          </a:lnRef>
+          <a:fillRef idx="1">
+            <a:schemeClr val="accent1"/>
+          </a:fillRef>
+          <a:effectRef idx="0">
+            <a:schemeClr val="accent1"/>
+          </a:effectRef>
+          <a:fontRef idx="minor">
+            <a:schemeClr val="lt1"/>
+          </a:fontRef>
+        </p:style>
+        <p:txBody>
+          <a:bodyPr rtlCol="0" anchor="ctr"/>
+          <a:lstStyle/>
+          <a:p>
+            <a:pPr algn="ctr"/>
+            <a:endParaRPr lang="en-US"/>
+          </a:p>
+        </p:txBody>
+      </p:sp>
+    </p:spTree>
+    <p:extLst>
+      <p:ext uri="{BB962C8B-B14F-4D97-AF65-F5344CB8AC3E}">
+        <p14:creationId xmlns:p14="http://schemas.microsoft.com/office/powerpoint/2010/main" val="1770306866"/>
+      </p:ext>
+    </p:extLst>
+  </p:cSld>
+  <p:clrMapOvr>
+    <a:masterClrMapping/>
+  </p:clrMapOvr>
+</p:sld>
+</file>
+
+<file path=ppt/slides/slide38.xml><?xml version="1.0" encoding="utf-8"?>
+<p:sld xmlns:a="http://schemas.openxmlformats.org/drawingml/2006/main" xmlns:r="http://schemas.openxmlformats.org/officeDocument/2006/relationships" xmlns:p="http://schemas.openxmlformats.org/presentationml/2006/main">
+  <p:cSld>
+    <p:spTree>
+      <p:nvGrpSpPr>
+        <p:cNvPr id="1" name=""/>
+        <p:cNvGrpSpPr/>
+        <p:nvPr/>
+      </p:nvGrpSpPr>
+      <p:grpSpPr>
+        <a:xfrm>
+          <a:off x="0" y="0"/>
+          <a:ext cx="0" cy="0"/>
+          <a:chOff x="0" y="0"/>
+          <a:chExt cx="0" cy="0"/>
+        </a:xfrm>
+      </p:grpSpPr>
+      <p:pic>
+        <p:nvPicPr>
           <p:cNvPr id="21" name="Picture 20">
             <a:extLst>
               <a:ext uri="{FF2B5EF4-FFF2-40B4-BE49-F238E27FC236}">
@@ -26593,7 +26664,7 @@
 </p:sld>
 </file>
 
-<file path=ppt/slides/slide38.xml><?xml version="1.0" encoding="utf-8"?>
+<file path=ppt/slides/slide39.xml><?xml version="1.0" encoding="utf-8"?>
 <p:sld xmlns:a="http://schemas.openxmlformats.org/drawingml/2006/main" xmlns:r="http://schemas.openxmlformats.org/officeDocument/2006/relationships" xmlns:p="http://schemas.openxmlformats.org/presentationml/2006/main">
   <p:cSld>
     <p:bg>
@@ -26823,288 +26894,6 @@
   </p:cSld>
   <p:clrMapOvr>
     <a:overrideClrMapping bg1="dk1" tx1="lt1" bg2="dk2" tx2="lt2" accent1="accent1" accent2="accent2" accent3="accent3" accent4="accent4" accent5="accent5" accent6="accent6" hlink="hlink" folHlink="folHlink"/>
-  </p:clrMapOvr>
-</p:sld>
-</file>
-
-<file path=ppt/slides/slide39.xml><?xml version="1.0" encoding="utf-8"?>
-<p:sld xmlns:a="http://schemas.openxmlformats.org/drawingml/2006/main" xmlns:r="http://schemas.openxmlformats.org/officeDocument/2006/relationships" xmlns:p="http://schemas.openxmlformats.org/presentationml/2006/main">
-  <p:cSld>
-    <p:spTree>
-      <p:nvGrpSpPr>
-        <p:cNvPr id="1" name=""/>
-        <p:cNvGrpSpPr/>
-        <p:nvPr/>
-      </p:nvGrpSpPr>
-      <p:grpSpPr>
-        <a:xfrm>
-          <a:off x="0" y="0"/>
-          <a:ext cx="0" cy="0"/>
-          <a:chOff x="0" y="0"/>
-          <a:chExt cx="0" cy="0"/>
-        </a:xfrm>
-      </p:grpSpPr>
-      <p:sp>
-        <p:nvSpPr>
-          <p:cNvPr id="4" name="Title 3">
-            <a:extLst>
-              <a:ext uri="{FF2B5EF4-FFF2-40B4-BE49-F238E27FC236}">
-                <a16:creationId xmlns:a16="http://schemas.microsoft.com/office/drawing/2014/main" id="{525AB14B-7B11-4861-A0E3-8B3461489556}"/>
-              </a:ext>
-            </a:extLst>
-          </p:cNvPr>
-          <p:cNvSpPr>
-            <a:spLocks noGrp="1"/>
-          </p:cNvSpPr>
-          <p:nvPr>
-            <p:ph type="title"/>
-          </p:nvPr>
-        </p:nvSpPr>
-        <p:spPr/>
-        <p:txBody>
-          <a:bodyPr/>
-          <a:lstStyle/>
-          <a:p>
-            <a:r>
-              <a:rPr lang="en-US" dirty="0"/>
-              <a:t>Stochastic Games</a:t>
-            </a:r>
-          </a:p>
-        </p:txBody>
-      </p:sp>
-      <mc:AlternateContent xmlns:mc="http://schemas.openxmlformats.org/markup-compatibility/2006" xmlns:a14="http://schemas.microsoft.com/office/drawing/2010/main">
-        <mc:Choice Requires="a14">
-          <p:sp>
-            <p:nvSpPr>
-              <p:cNvPr id="5" name="Content Placeholder 4">
-                <a:extLst>
-                  <a:ext uri="{FF2B5EF4-FFF2-40B4-BE49-F238E27FC236}">
-                    <a16:creationId xmlns:a16="http://schemas.microsoft.com/office/drawing/2014/main" id="{59040CDB-8DE8-4A3C-A1DE-CD1AA1D53E95}"/>
-                  </a:ext>
-                </a:extLst>
-              </p:cNvPr>
-              <p:cNvSpPr>
-                <a:spLocks noGrp="1"/>
-              </p:cNvSpPr>
-              <p:nvPr>
-                <p:ph idx="1"/>
-              </p:nvPr>
-            </p:nvSpPr>
-            <p:spPr>
-              <a:xfrm>
-                <a:off x="628650" y="1825625"/>
-                <a:ext cx="7886700" cy="765175"/>
-              </a:xfrm>
-            </p:spPr>
-            <p:txBody>
-              <a:bodyPr>
-                <a:normAutofit fontScale="85000" lnSpcReduction="20000"/>
-              </a:bodyPr>
-              <a:lstStyle/>
-              <a:p>
-                <a:r>
-                  <a:rPr lang="en-US" dirty="0"/>
-                  <a:t>Game includes a “random action” </a:t>
-                </a:r>
-                <a14:m>
-                  <m:oMath xmlns:m="http://schemas.openxmlformats.org/officeDocument/2006/math">
-                    <m:r>
-                      <a:rPr lang="en-US" i="1" dirty="0" smtClean="0">
-                        <a:latin typeface="Cambria Math" panose="02040503050406030204" pitchFamily="18" charset="0"/>
-                      </a:rPr>
-                      <m:t>𝑟</m:t>
-                    </m:r>
-                  </m:oMath>
-                </a14:m>
-                <a:r>
-                  <a:rPr lang="en-US" dirty="0"/>
-                  <a:t> (e.g., dice, dealt cards) </a:t>
-                </a:r>
-              </a:p>
-              <a:p>
-                <a:r>
-                  <a:rPr lang="en-US" dirty="0"/>
-                  <a:t>Add </a:t>
-                </a:r>
-                <a:r>
-                  <a:rPr lang="en-US" b="1" dirty="0"/>
-                  <a:t>chance nodes </a:t>
-                </a:r>
-                <a:r>
-                  <a:rPr lang="en-US" dirty="0"/>
-                  <a:t>that calculate the expected value.</a:t>
-                </a:r>
-              </a:p>
-              <a:p>
-                <a:endParaRPr lang="en-US" dirty="0"/>
-              </a:p>
-              <a:p>
-                <a:endParaRPr lang="en-US" dirty="0"/>
-              </a:p>
-              <a:p>
-                <a:endParaRPr lang="en-US" dirty="0"/>
-              </a:p>
-              <a:p>
-                <a:endParaRPr lang="en-US" dirty="0"/>
-              </a:p>
-              <a:p>
-                <a:pPr marL="0" indent="0">
-                  <a:buNone/>
-                </a:pPr>
-                <a:endParaRPr lang="en-US" dirty="0"/>
-              </a:p>
-            </p:txBody>
-          </p:sp>
-        </mc:Choice>
-        <mc:Fallback xmlns="">
-          <p:sp>
-            <p:nvSpPr>
-              <p:cNvPr id="5" name="Content Placeholder 4">
-                <a:extLst>
-                  <a:ext uri="{FF2B5EF4-FFF2-40B4-BE49-F238E27FC236}">
-                    <a16:creationId xmlns:a16="http://schemas.microsoft.com/office/drawing/2014/main" id="{59040CDB-8DE8-4A3C-A1DE-CD1AA1D53E95}"/>
-                  </a:ext>
-                </a:extLst>
-              </p:cNvPr>
-              <p:cNvSpPr>
-                <a:spLocks noGrp="1" noRot="1" noChangeAspect="1" noMove="1" noResize="1" noEditPoints="1" noAdjustHandles="1" noChangeArrowheads="1" noChangeShapeType="1" noTextEdit="1"/>
-              </p:cNvSpPr>
-              <p:nvPr>
-                <p:ph idx="1"/>
-              </p:nvPr>
-            </p:nvSpPr>
-            <p:spPr>
-              <a:xfrm>
-                <a:off x="628650" y="1825625"/>
-                <a:ext cx="7886700" cy="765175"/>
-              </a:xfrm>
-              <a:blipFill>
-                <a:blip r:embed="rId2"/>
-                <a:stretch>
-                  <a:fillRect l="-1005" t="-18254" b="-15079"/>
-                </a:stretch>
-              </a:blipFill>
-            </p:spPr>
-            <p:txBody>
-              <a:bodyPr/>
-              <a:lstStyle/>
-              <a:p>
-                <a:r>
-                  <a:rPr lang="en-US">
-                    <a:noFill/>
-                  </a:rPr>
-                  <a:t> </a:t>
-                </a:r>
-              </a:p>
-            </p:txBody>
-          </p:sp>
-        </mc:Fallback>
-      </mc:AlternateContent>
-      <p:pic>
-        <p:nvPicPr>
-          <p:cNvPr id="6" name="Picture 5">
-            <a:extLst>
-              <a:ext uri="{FF2B5EF4-FFF2-40B4-BE49-F238E27FC236}">
-                <a16:creationId xmlns:a16="http://schemas.microsoft.com/office/drawing/2014/main" id="{5E017E5A-62FF-4B56-9279-A88A9144BA86}"/>
-              </a:ext>
-            </a:extLst>
-          </p:cNvPr>
-          <p:cNvPicPr>
-            <a:picLocks noChangeAspect="1"/>
-          </p:cNvPicPr>
-          <p:nvPr/>
-        </p:nvPicPr>
-        <p:blipFill>
-          <a:blip r:embed="rId3"/>
-          <a:stretch>
-            <a:fillRect/>
-          </a:stretch>
-        </p:blipFill>
-        <p:spPr>
-          <a:xfrm>
-            <a:off x="4185684" y="2971800"/>
-            <a:ext cx="4590149" cy="3309827"/>
-          </a:xfrm>
-          <a:prstGeom prst="rect">
-            <a:avLst/>
-          </a:prstGeom>
-        </p:spPr>
-      </p:pic>
-      <p:pic>
-        <p:nvPicPr>
-          <p:cNvPr id="8" name="Picture 7">
-            <a:extLst>
-              <a:ext uri="{FF2B5EF4-FFF2-40B4-BE49-F238E27FC236}">
-                <a16:creationId xmlns:a16="http://schemas.microsoft.com/office/drawing/2014/main" id="{6271D193-65B7-4E8F-9588-C27770B1EBBA}"/>
-              </a:ext>
-            </a:extLst>
-          </p:cNvPr>
-          <p:cNvPicPr>
-            <a:picLocks noChangeAspect="1"/>
-          </p:cNvPicPr>
-          <p:nvPr/>
-        </p:nvPicPr>
-        <p:blipFill>
-          <a:blip r:embed="rId4"/>
-          <a:stretch>
-            <a:fillRect/>
-          </a:stretch>
-        </p:blipFill>
-        <p:spPr>
-          <a:xfrm>
-            <a:off x="304800" y="2859773"/>
-            <a:ext cx="3886200" cy="3533879"/>
-          </a:xfrm>
-          <a:prstGeom prst="rect">
-            <a:avLst/>
-          </a:prstGeom>
-        </p:spPr>
-      </p:pic>
-      <p:sp>
-        <p:nvSpPr>
-          <p:cNvPr id="9" name="TextBox 8">
-            <a:extLst>
-              <a:ext uri="{FF2B5EF4-FFF2-40B4-BE49-F238E27FC236}">
-                <a16:creationId xmlns:a16="http://schemas.microsoft.com/office/drawing/2014/main" id="{DBB0CC40-9191-4E88-8E2D-AA6E76931D05}"/>
-              </a:ext>
-            </a:extLst>
-          </p:cNvPr>
-          <p:cNvSpPr txBox="1"/>
-          <p:nvPr/>
-        </p:nvSpPr>
-        <p:spPr>
-          <a:xfrm>
-            <a:off x="3804684" y="6400800"/>
-            <a:ext cx="1905000" cy="369332"/>
-          </a:xfrm>
-          <a:prstGeom prst="rect">
-            <a:avLst/>
-          </a:prstGeom>
-          <a:noFill/>
-        </p:spPr>
-        <p:txBody>
-          <a:bodyPr wrap="square" rtlCol="0">
-            <a:spAutoFit/>
-          </a:bodyPr>
-          <a:lstStyle/>
-          <a:p>
-            <a:pPr algn="ctr"/>
-            <a:r>
-              <a:rPr lang="en-US" dirty="0"/>
-              <a:t>Backgammon</a:t>
-            </a:r>
-          </a:p>
-        </p:txBody>
-      </p:sp>
-    </p:spTree>
-    <p:extLst>
-      <p:ext uri="{BB962C8B-B14F-4D97-AF65-F5344CB8AC3E}">
-        <p14:creationId xmlns:p14="http://schemas.microsoft.com/office/powerpoint/2010/main" val="55184196"/>
-      </p:ext>
-    </p:extLst>
-  </p:cSld>
-  <p:clrMapOvr>
-    <a:masterClrMapping/>
   </p:clrMapOvr>
 </p:sld>
 </file>
@@ -27595,6 +27384,288 @@
           <a:lstStyle/>
           <a:p>
             <a:r>
+              <a:rPr lang="en-US" dirty="0"/>
+              <a:t>Stochastic Games</a:t>
+            </a:r>
+          </a:p>
+        </p:txBody>
+      </p:sp>
+      <mc:AlternateContent xmlns:mc="http://schemas.openxmlformats.org/markup-compatibility/2006" xmlns:a14="http://schemas.microsoft.com/office/drawing/2010/main">
+        <mc:Choice Requires="a14">
+          <p:sp>
+            <p:nvSpPr>
+              <p:cNvPr id="5" name="Content Placeholder 4">
+                <a:extLst>
+                  <a:ext uri="{FF2B5EF4-FFF2-40B4-BE49-F238E27FC236}">
+                    <a16:creationId xmlns:a16="http://schemas.microsoft.com/office/drawing/2014/main" id="{59040CDB-8DE8-4A3C-A1DE-CD1AA1D53E95}"/>
+                  </a:ext>
+                </a:extLst>
+              </p:cNvPr>
+              <p:cNvSpPr>
+                <a:spLocks noGrp="1"/>
+              </p:cNvSpPr>
+              <p:nvPr>
+                <p:ph idx="1"/>
+              </p:nvPr>
+            </p:nvSpPr>
+            <p:spPr>
+              <a:xfrm>
+                <a:off x="628650" y="1825625"/>
+                <a:ext cx="7886700" cy="765175"/>
+              </a:xfrm>
+            </p:spPr>
+            <p:txBody>
+              <a:bodyPr>
+                <a:normAutofit fontScale="85000" lnSpcReduction="20000"/>
+              </a:bodyPr>
+              <a:lstStyle/>
+              <a:p>
+                <a:r>
+                  <a:rPr lang="en-US" dirty="0"/>
+                  <a:t>Game includes a “random action” </a:t>
+                </a:r>
+                <a14:m>
+                  <m:oMath xmlns:m="http://schemas.openxmlformats.org/officeDocument/2006/math">
+                    <m:r>
+                      <a:rPr lang="en-US" i="1" dirty="0" smtClean="0">
+                        <a:latin typeface="Cambria Math" panose="02040503050406030204" pitchFamily="18" charset="0"/>
+                      </a:rPr>
+                      <m:t>𝑟</m:t>
+                    </m:r>
+                  </m:oMath>
+                </a14:m>
+                <a:r>
+                  <a:rPr lang="en-US" dirty="0"/>
+                  <a:t> (e.g., dice, dealt cards) </a:t>
+                </a:r>
+              </a:p>
+              <a:p>
+                <a:r>
+                  <a:rPr lang="en-US" dirty="0"/>
+                  <a:t>Add </a:t>
+                </a:r>
+                <a:r>
+                  <a:rPr lang="en-US" b="1" dirty="0"/>
+                  <a:t>chance nodes </a:t>
+                </a:r>
+                <a:r>
+                  <a:rPr lang="en-US" dirty="0"/>
+                  <a:t>that calculate the expected value.</a:t>
+                </a:r>
+              </a:p>
+              <a:p>
+                <a:endParaRPr lang="en-US" dirty="0"/>
+              </a:p>
+              <a:p>
+                <a:endParaRPr lang="en-US" dirty="0"/>
+              </a:p>
+              <a:p>
+                <a:endParaRPr lang="en-US" dirty="0"/>
+              </a:p>
+              <a:p>
+                <a:endParaRPr lang="en-US" dirty="0"/>
+              </a:p>
+              <a:p>
+                <a:pPr marL="0" indent="0">
+                  <a:buNone/>
+                </a:pPr>
+                <a:endParaRPr lang="en-US" dirty="0"/>
+              </a:p>
+            </p:txBody>
+          </p:sp>
+        </mc:Choice>
+        <mc:Fallback xmlns="">
+          <p:sp>
+            <p:nvSpPr>
+              <p:cNvPr id="5" name="Content Placeholder 4">
+                <a:extLst>
+                  <a:ext uri="{FF2B5EF4-FFF2-40B4-BE49-F238E27FC236}">
+                    <a16:creationId xmlns:a16="http://schemas.microsoft.com/office/drawing/2014/main" id="{59040CDB-8DE8-4A3C-A1DE-CD1AA1D53E95}"/>
+                  </a:ext>
+                </a:extLst>
+              </p:cNvPr>
+              <p:cNvSpPr>
+                <a:spLocks noGrp="1" noRot="1" noChangeAspect="1" noMove="1" noResize="1" noEditPoints="1" noAdjustHandles="1" noChangeArrowheads="1" noChangeShapeType="1" noTextEdit="1"/>
+              </p:cNvSpPr>
+              <p:nvPr>
+                <p:ph idx="1"/>
+              </p:nvPr>
+            </p:nvSpPr>
+            <p:spPr>
+              <a:xfrm>
+                <a:off x="628650" y="1825625"/>
+                <a:ext cx="7886700" cy="765175"/>
+              </a:xfrm>
+              <a:blipFill>
+                <a:blip r:embed="rId2"/>
+                <a:stretch>
+                  <a:fillRect l="-1005" t="-18254" b="-15079"/>
+                </a:stretch>
+              </a:blipFill>
+            </p:spPr>
+            <p:txBody>
+              <a:bodyPr/>
+              <a:lstStyle/>
+              <a:p>
+                <a:r>
+                  <a:rPr lang="en-US">
+                    <a:noFill/>
+                  </a:rPr>
+                  <a:t> </a:t>
+                </a:r>
+              </a:p>
+            </p:txBody>
+          </p:sp>
+        </mc:Fallback>
+      </mc:AlternateContent>
+      <p:pic>
+        <p:nvPicPr>
+          <p:cNvPr id="6" name="Picture 5">
+            <a:extLst>
+              <a:ext uri="{FF2B5EF4-FFF2-40B4-BE49-F238E27FC236}">
+                <a16:creationId xmlns:a16="http://schemas.microsoft.com/office/drawing/2014/main" id="{5E017E5A-62FF-4B56-9279-A88A9144BA86}"/>
+              </a:ext>
+            </a:extLst>
+          </p:cNvPr>
+          <p:cNvPicPr>
+            <a:picLocks noChangeAspect="1"/>
+          </p:cNvPicPr>
+          <p:nvPr/>
+        </p:nvPicPr>
+        <p:blipFill>
+          <a:blip r:embed="rId3"/>
+          <a:stretch>
+            <a:fillRect/>
+          </a:stretch>
+        </p:blipFill>
+        <p:spPr>
+          <a:xfrm>
+            <a:off x="4185684" y="2971800"/>
+            <a:ext cx="4590149" cy="3309827"/>
+          </a:xfrm>
+          <a:prstGeom prst="rect">
+            <a:avLst/>
+          </a:prstGeom>
+        </p:spPr>
+      </p:pic>
+      <p:pic>
+        <p:nvPicPr>
+          <p:cNvPr id="8" name="Picture 7">
+            <a:extLst>
+              <a:ext uri="{FF2B5EF4-FFF2-40B4-BE49-F238E27FC236}">
+                <a16:creationId xmlns:a16="http://schemas.microsoft.com/office/drawing/2014/main" id="{6271D193-65B7-4E8F-9588-C27770B1EBBA}"/>
+              </a:ext>
+            </a:extLst>
+          </p:cNvPr>
+          <p:cNvPicPr>
+            <a:picLocks noChangeAspect="1"/>
+          </p:cNvPicPr>
+          <p:nvPr/>
+        </p:nvPicPr>
+        <p:blipFill>
+          <a:blip r:embed="rId4"/>
+          <a:stretch>
+            <a:fillRect/>
+          </a:stretch>
+        </p:blipFill>
+        <p:spPr>
+          <a:xfrm>
+            <a:off x="304800" y="2859773"/>
+            <a:ext cx="3886200" cy="3533879"/>
+          </a:xfrm>
+          <a:prstGeom prst="rect">
+            <a:avLst/>
+          </a:prstGeom>
+        </p:spPr>
+      </p:pic>
+      <p:sp>
+        <p:nvSpPr>
+          <p:cNvPr id="9" name="TextBox 8">
+            <a:extLst>
+              <a:ext uri="{FF2B5EF4-FFF2-40B4-BE49-F238E27FC236}">
+                <a16:creationId xmlns:a16="http://schemas.microsoft.com/office/drawing/2014/main" id="{DBB0CC40-9191-4E88-8E2D-AA6E76931D05}"/>
+              </a:ext>
+            </a:extLst>
+          </p:cNvPr>
+          <p:cNvSpPr txBox="1"/>
+          <p:nvPr/>
+        </p:nvSpPr>
+        <p:spPr>
+          <a:xfrm>
+            <a:off x="3804684" y="6400800"/>
+            <a:ext cx="1905000" cy="369332"/>
+          </a:xfrm>
+          <a:prstGeom prst="rect">
+            <a:avLst/>
+          </a:prstGeom>
+          <a:noFill/>
+        </p:spPr>
+        <p:txBody>
+          <a:bodyPr wrap="square" rtlCol="0">
+            <a:spAutoFit/>
+          </a:bodyPr>
+          <a:lstStyle/>
+          <a:p>
+            <a:pPr algn="ctr"/>
+            <a:r>
+              <a:rPr lang="en-US" dirty="0"/>
+              <a:t>Backgammon</a:t>
+            </a:r>
+          </a:p>
+        </p:txBody>
+      </p:sp>
+    </p:spTree>
+    <p:extLst>
+      <p:ext uri="{BB962C8B-B14F-4D97-AF65-F5344CB8AC3E}">
+        <p14:creationId xmlns:p14="http://schemas.microsoft.com/office/powerpoint/2010/main" val="55184196"/>
+      </p:ext>
+    </p:extLst>
+  </p:cSld>
+  <p:clrMapOvr>
+    <a:masterClrMapping/>
+  </p:clrMapOvr>
+</p:sld>
+</file>
+
+<file path=ppt/slides/slide41.xml><?xml version="1.0" encoding="utf-8"?>
+<p:sld xmlns:a="http://schemas.openxmlformats.org/drawingml/2006/main" xmlns:r="http://schemas.openxmlformats.org/officeDocument/2006/relationships" xmlns:p="http://schemas.openxmlformats.org/presentationml/2006/main">
+  <p:cSld>
+    <p:spTree>
+      <p:nvGrpSpPr>
+        <p:cNvPr id="1" name=""/>
+        <p:cNvGrpSpPr/>
+        <p:nvPr/>
+      </p:nvGrpSpPr>
+      <p:grpSpPr>
+        <a:xfrm>
+          <a:off x="0" y="0"/>
+          <a:ext cx="0" cy="0"/>
+          <a:chOff x="0" y="0"/>
+          <a:chExt cx="0" cy="0"/>
+        </a:xfrm>
+      </p:grpSpPr>
+      <p:sp>
+        <p:nvSpPr>
+          <p:cNvPr id="4" name="Title 3">
+            <a:extLst>
+              <a:ext uri="{FF2B5EF4-FFF2-40B4-BE49-F238E27FC236}">
+                <a16:creationId xmlns:a16="http://schemas.microsoft.com/office/drawing/2014/main" id="{525AB14B-7B11-4861-A0E3-8B3461489556}"/>
+              </a:ext>
+            </a:extLst>
+          </p:cNvPr>
+          <p:cNvSpPr>
+            <a:spLocks noGrp="1"/>
+          </p:cNvSpPr>
+          <p:nvPr>
+            <p:ph type="title"/>
+          </p:nvPr>
+        </p:nvSpPr>
+        <p:spPr/>
+        <p:txBody>
+          <a:bodyPr/>
+          <a:lstStyle/>
+          <a:p>
+            <a:r>
               <a:rPr lang="en-US" dirty="0" err="1"/>
               <a:t>Expectiminimax</a:t>
             </a:r>
@@ -27602,8 +27673,8 @@
           </a:p>
         </p:txBody>
       </p:sp>
-      <mc:AlternateContent xmlns:mc="http://schemas.openxmlformats.org/markup-compatibility/2006">
-        <mc:Choice xmlns:a14="http://schemas.microsoft.com/office/drawing/2010/main" Requires="a14">
+      <mc:AlternateContent xmlns:mc="http://schemas.openxmlformats.org/markup-compatibility/2006" xmlns:a14="http://schemas.microsoft.com/office/drawing/2010/main">
+        <mc:Choice Requires="a14">
           <p:sp>
             <p:nvSpPr>
               <p:cNvPr id="5" name="Content Placeholder 4">
@@ -28405,7 +28476,7 @@
             </p:txBody>
           </p:sp>
         </mc:Choice>
-        <mc:Fallback>
+        <mc:Fallback xmlns="">
           <p:sp>
             <p:nvSpPr>
               <p:cNvPr id="5" name="Content Placeholder 4">
@@ -28514,7 +28585,7 @@
 </p:sld>
 </file>
 
-<file path=ppt/slides/slide41.xml><?xml version="1.0" encoding="utf-8"?>
+<file path=ppt/slides/slide42.xml><?xml version="1.0" encoding="utf-8"?>
 <p:sld xmlns:a="http://schemas.openxmlformats.org/drawingml/2006/main" xmlns:r="http://schemas.openxmlformats.org/officeDocument/2006/relationships" xmlns:p="http://schemas.openxmlformats.org/presentationml/2006/main">
   <p:cSld>
     <p:bg>

</xml_diff>

<commit_message>
Additional work is not for credit.
</commit_message>
<xml_diff>
--- a/slides/05_games.pptx
+++ b/slides/05_games.pptx
@@ -224,6 +224,10 @@
             <p14:sldId id="286"/>
             <p14:sldId id="287"/>
             <p14:sldId id="300"/>
+          </p14:sldIdLst>
+        </p14:section>
+        <p14:section name="Wrap up" id="{F656B63C-8C1F-4C48-B983-F70B9145C75C}">
+          <p14:sldIdLst>
             <p14:sldId id="288"/>
           </p14:sldIdLst>
         </p14:section>
@@ -5625,7 +5629,7 @@
             <a:fld id="{46E2045A-045A-4BC7-A4D3-1395440B1C3D}" type="datetimeFigureOut">
               <a:rPr lang="en-US" smtClean="0"/>
               <a:pPr/>
-              <a:t>12/6/2024</a:t>
+              <a:t>2/11/2025</a:t>
             </a:fld>
             <a:endParaRPr lang="en-US"/>
           </a:p>
@@ -17653,8 +17657,8 @@
             </a:p>
           </p:txBody>
         </p:sp>
-        <mc:AlternateContent xmlns:mc="http://schemas.openxmlformats.org/markup-compatibility/2006">
-          <mc:Choice xmlns:a14="http://schemas.microsoft.com/office/drawing/2010/main" Requires="a14">
+        <mc:AlternateContent xmlns:mc="http://schemas.openxmlformats.org/markup-compatibility/2006" xmlns:a14="http://schemas.microsoft.com/office/drawing/2010/main">
+          <mc:Choice Requires="a14">
             <p:sp>
               <p:nvSpPr>
                 <p:cNvPr id="51" name="TextBox 50">
@@ -17723,7 +17727,7 @@
               </p:txBody>
             </p:sp>
           </mc:Choice>
-          <mc:Fallback>
+          <mc:Fallback xmlns="">
             <p:sp>
               <p:nvSpPr>
                 <p:cNvPr id="51" name="TextBox 50">
@@ -17768,8 +17772,8 @@
             </p:sp>
           </mc:Fallback>
         </mc:AlternateContent>
-        <mc:AlternateContent xmlns:mc="http://schemas.openxmlformats.org/markup-compatibility/2006">
-          <mc:Choice xmlns:a14="http://schemas.microsoft.com/office/drawing/2010/main" Requires="a14">
+        <mc:AlternateContent xmlns:mc="http://schemas.openxmlformats.org/markup-compatibility/2006" xmlns:a14="http://schemas.microsoft.com/office/drawing/2010/main">
+          <mc:Choice Requires="a14">
             <p:sp>
               <p:nvSpPr>
                 <p:cNvPr id="52" name="TextBox 51">
@@ -17838,7 +17842,7 @@
               </p:txBody>
             </p:sp>
           </mc:Choice>
-          <mc:Fallback>
+          <mc:Fallback xmlns="">
             <p:sp>
               <p:nvSpPr>
                 <p:cNvPr id="52" name="TextBox 51">
@@ -17883,8 +17887,8 @@
             </p:sp>
           </mc:Fallback>
         </mc:AlternateContent>
-        <mc:AlternateContent xmlns:mc="http://schemas.openxmlformats.org/markup-compatibility/2006">
-          <mc:Choice xmlns:a14="http://schemas.microsoft.com/office/drawing/2010/main" Requires="a14">
+        <mc:AlternateContent xmlns:mc="http://schemas.openxmlformats.org/markup-compatibility/2006" xmlns:a14="http://schemas.microsoft.com/office/drawing/2010/main">
+          <mc:Choice Requires="a14">
             <p:sp>
               <p:nvSpPr>
                 <p:cNvPr id="53" name="TextBox 52">
@@ -17953,7 +17957,7 @@
               </p:txBody>
             </p:sp>
           </mc:Choice>
-          <mc:Fallback>
+          <mc:Fallback xmlns="">
             <p:sp>
               <p:nvSpPr>
                 <p:cNvPr id="53" name="TextBox 52">
@@ -17998,8 +18002,8 @@
             </p:sp>
           </mc:Fallback>
         </mc:AlternateContent>
-        <mc:AlternateContent xmlns:mc="http://schemas.openxmlformats.org/markup-compatibility/2006">
-          <mc:Choice xmlns:a14="http://schemas.microsoft.com/office/drawing/2010/main" Requires="a14">
+        <mc:AlternateContent xmlns:mc="http://schemas.openxmlformats.org/markup-compatibility/2006" xmlns:a14="http://schemas.microsoft.com/office/drawing/2010/main">
+          <mc:Choice Requires="a14">
             <p:sp>
               <p:nvSpPr>
                 <p:cNvPr id="54" name="TextBox 53">
@@ -18068,7 +18072,7 @@
               </p:txBody>
             </p:sp>
           </mc:Choice>
-          <mc:Fallback>
+          <mc:Fallback xmlns="">
             <p:sp>
               <p:nvSpPr>
                 <p:cNvPr id="54" name="TextBox 53">
@@ -18113,8 +18117,8 @@
             </p:sp>
           </mc:Fallback>
         </mc:AlternateContent>
-        <mc:AlternateContent xmlns:mc="http://schemas.openxmlformats.org/markup-compatibility/2006">
-          <mc:Choice xmlns:a14="http://schemas.microsoft.com/office/drawing/2010/main" Requires="a14">
+        <mc:AlternateContent xmlns:mc="http://schemas.openxmlformats.org/markup-compatibility/2006" xmlns:a14="http://schemas.microsoft.com/office/drawing/2010/main">
+          <mc:Choice Requires="a14">
             <p:sp>
               <p:nvSpPr>
                 <p:cNvPr id="55" name="TextBox 54">
@@ -18183,7 +18187,7 @@
               </p:txBody>
             </p:sp>
           </mc:Choice>
-          <mc:Fallback>
+          <mc:Fallback xmlns="">
             <p:sp>
               <p:nvSpPr>
                 <p:cNvPr id="55" name="TextBox 54">
@@ -18228,8 +18232,8 @@
             </p:sp>
           </mc:Fallback>
         </mc:AlternateContent>
-        <mc:AlternateContent xmlns:mc="http://schemas.openxmlformats.org/markup-compatibility/2006">
-          <mc:Choice xmlns:a14="http://schemas.microsoft.com/office/drawing/2010/main" Requires="a14">
+        <mc:AlternateContent xmlns:mc="http://schemas.openxmlformats.org/markup-compatibility/2006" xmlns:a14="http://schemas.microsoft.com/office/drawing/2010/main">
+          <mc:Choice Requires="a14">
             <p:sp>
               <p:nvSpPr>
                 <p:cNvPr id="56" name="TextBox 55">
@@ -18298,7 +18302,7 @@
               </p:txBody>
             </p:sp>
           </mc:Choice>
-          <mc:Fallback>
+          <mc:Fallback xmlns="">
             <p:sp>
               <p:nvSpPr>
                 <p:cNvPr id="56" name="TextBox 55">
@@ -18343,8 +18347,8 @@
             </p:sp>
           </mc:Fallback>
         </mc:AlternateContent>
-        <mc:AlternateContent xmlns:mc="http://schemas.openxmlformats.org/markup-compatibility/2006">
-          <mc:Choice xmlns:a14="http://schemas.microsoft.com/office/drawing/2010/main" Requires="a14">
+        <mc:AlternateContent xmlns:mc="http://schemas.openxmlformats.org/markup-compatibility/2006" xmlns:a14="http://schemas.microsoft.com/office/drawing/2010/main">
+          <mc:Choice Requires="a14">
             <p:sp>
               <p:nvSpPr>
                 <p:cNvPr id="57" name="TextBox 56">
@@ -18413,7 +18417,7 @@
               </p:txBody>
             </p:sp>
           </mc:Choice>
-          <mc:Fallback>
+          <mc:Fallback xmlns="">
             <p:sp>
               <p:nvSpPr>
                 <p:cNvPr id="57" name="TextBox 56">
@@ -18458,8 +18462,8 @@
             </p:sp>
           </mc:Fallback>
         </mc:AlternateContent>
-        <mc:AlternateContent xmlns:mc="http://schemas.openxmlformats.org/markup-compatibility/2006">
-          <mc:Choice xmlns:a14="http://schemas.microsoft.com/office/drawing/2010/main" Requires="a14">
+        <mc:AlternateContent xmlns:mc="http://schemas.openxmlformats.org/markup-compatibility/2006" xmlns:a14="http://schemas.microsoft.com/office/drawing/2010/main">
+          <mc:Choice Requires="a14">
             <p:sp>
               <p:nvSpPr>
                 <p:cNvPr id="58" name="TextBox 57">
@@ -18528,7 +18532,7 @@
               </p:txBody>
             </p:sp>
           </mc:Choice>
-          <mc:Fallback>
+          <mc:Fallback xmlns="">
             <p:sp>
               <p:nvSpPr>
                 <p:cNvPr id="58" name="TextBox 57">
@@ -18573,8 +18577,8 @@
             </p:sp>
           </mc:Fallback>
         </mc:AlternateContent>
-        <mc:AlternateContent xmlns:mc="http://schemas.openxmlformats.org/markup-compatibility/2006">
-          <mc:Choice xmlns:a14="http://schemas.microsoft.com/office/drawing/2010/main" Requires="a14">
+        <mc:AlternateContent xmlns:mc="http://schemas.openxmlformats.org/markup-compatibility/2006" xmlns:a14="http://schemas.microsoft.com/office/drawing/2010/main">
+          <mc:Choice Requires="a14">
             <p:sp>
               <p:nvSpPr>
                 <p:cNvPr id="59" name="TextBox 58">
@@ -18643,7 +18647,7 @@
               </p:txBody>
             </p:sp>
           </mc:Choice>
-          <mc:Fallback>
+          <mc:Fallback xmlns="">
             <p:sp>
               <p:nvSpPr>
                 <p:cNvPr id="59" name="TextBox 58">
@@ -18688,8 +18692,8 @@
             </p:sp>
           </mc:Fallback>
         </mc:AlternateContent>
-        <mc:AlternateContent xmlns:mc="http://schemas.openxmlformats.org/markup-compatibility/2006">
-          <mc:Choice xmlns:a14="http://schemas.microsoft.com/office/drawing/2010/main" Requires="a14">
+        <mc:AlternateContent xmlns:mc="http://schemas.openxmlformats.org/markup-compatibility/2006" xmlns:a14="http://schemas.microsoft.com/office/drawing/2010/main">
+          <mc:Choice Requires="a14">
             <p:sp>
               <p:nvSpPr>
                 <p:cNvPr id="60" name="TextBox 59">
@@ -18758,7 +18762,7 @@
               </p:txBody>
             </p:sp>
           </mc:Choice>
-          <mc:Fallback>
+          <mc:Fallback xmlns="">
             <p:sp>
               <p:nvSpPr>
                 <p:cNvPr id="60" name="TextBox 59">
@@ -18803,8 +18807,8 @@
             </p:sp>
           </mc:Fallback>
         </mc:AlternateContent>
-        <mc:AlternateContent xmlns:mc="http://schemas.openxmlformats.org/markup-compatibility/2006">
-          <mc:Choice xmlns:a14="http://schemas.microsoft.com/office/drawing/2010/main" Requires="a14">
+        <mc:AlternateContent xmlns:mc="http://schemas.openxmlformats.org/markup-compatibility/2006" xmlns:a14="http://schemas.microsoft.com/office/drawing/2010/main">
+          <mc:Choice Requires="a14">
             <p:sp>
               <p:nvSpPr>
                 <p:cNvPr id="61" name="TextBox 60">
@@ -18873,7 +18877,7 @@
               </p:txBody>
             </p:sp>
           </mc:Choice>
-          <mc:Fallback>
+          <mc:Fallback xmlns="">
             <p:sp>
               <p:nvSpPr>
                 <p:cNvPr id="61" name="TextBox 60">
@@ -18918,8 +18922,8 @@
             </p:sp>
           </mc:Fallback>
         </mc:AlternateContent>
-        <mc:AlternateContent xmlns:mc="http://schemas.openxmlformats.org/markup-compatibility/2006">
-          <mc:Choice xmlns:a14="http://schemas.microsoft.com/office/drawing/2010/main" Requires="a14">
+        <mc:AlternateContent xmlns:mc="http://schemas.openxmlformats.org/markup-compatibility/2006" xmlns:a14="http://schemas.microsoft.com/office/drawing/2010/main">
+          <mc:Choice Requires="a14">
             <p:sp>
               <p:nvSpPr>
                 <p:cNvPr id="62" name="TextBox 61">
@@ -18988,7 +18992,7 @@
               </p:txBody>
             </p:sp>
           </mc:Choice>
-          <mc:Fallback>
+          <mc:Fallback xmlns="">
             <p:sp>
               <p:nvSpPr>
                 <p:cNvPr id="62" name="TextBox 61">
@@ -20757,8 +20761,8 @@
             </a:p>
           </p:txBody>
         </p:sp>
-        <mc:AlternateContent xmlns:mc="http://schemas.openxmlformats.org/markup-compatibility/2006">
-          <mc:Choice xmlns:a14="http://schemas.microsoft.com/office/drawing/2010/main" Requires="a14">
+        <mc:AlternateContent xmlns:mc="http://schemas.openxmlformats.org/markup-compatibility/2006" xmlns:a14="http://schemas.microsoft.com/office/drawing/2010/main">
+          <mc:Choice Requires="a14">
             <p:sp>
               <p:nvSpPr>
                 <p:cNvPr id="9" name="TextBox 8">
@@ -20841,7 +20845,7 @@
               </p:txBody>
             </p:sp>
           </mc:Choice>
-          <mc:Fallback>
+          <mc:Fallback xmlns="">
             <p:sp>
               <p:nvSpPr>
                 <p:cNvPr id="9" name="TextBox 8">
@@ -20886,8 +20890,8 @@
             </p:sp>
           </mc:Fallback>
         </mc:AlternateContent>
-        <mc:AlternateContent xmlns:mc="http://schemas.openxmlformats.org/markup-compatibility/2006">
-          <mc:Choice xmlns:a14="http://schemas.microsoft.com/office/drawing/2010/main" Requires="a14">
+        <mc:AlternateContent xmlns:mc="http://schemas.openxmlformats.org/markup-compatibility/2006" xmlns:a14="http://schemas.microsoft.com/office/drawing/2010/main">
+          <mc:Choice Requires="a14">
             <p:sp>
               <p:nvSpPr>
                 <p:cNvPr id="10" name="TextBox 9">
@@ -20986,7 +20990,7 @@
               </p:txBody>
             </p:sp>
           </mc:Choice>
-          <mc:Fallback>
+          <mc:Fallback xmlns="">
             <p:sp>
               <p:nvSpPr>
                 <p:cNvPr id="10" name="TextBox 9">
@@ -21643,8 +21647,8 @@
             </a:fontRef>
           </p:style>
         </p:cxnSp>
-        <mc:AlternateContent xmlns:mc="http://schemas.openxmlformats.org/markup-compatibility/2006">
-          <mc:Choice xmlns:a14="http://schemas.microsoft.com/office/drawing/2010/main" Requires="a14">
+        <mc:AlternateContent xmlns:mc="http://schemas.openxmlformats.org/markup-compatibility/2006" xmlns:a14="http://schemas.microsoft.com/office/drawing/2010/main">
+          <mc:Choice Requires="a14">
             <p:sp>
               <p:nvSpPr>
                 <p:cNvPr id="51" name="TextBox 50">
@@ -21727,7 +21731,7 @@
               </p:txBody>
             </p:sp>
           </mc:Choice>
-          <mc:Fallback>
+          <mc:Fallback xmlns="">
             <p:sp>
               <p:nvSpPr>
                 <p:cNvPr id="51" name="TextBox 50">
@@ -21772,8 +21776,8 @@
             </p:sp>
           </mc:Fallback>
         </mc:AlternateContent>
-        <mc:AlternateContent xmlns:mc="http://schemas.openxmlformats.org/markup-compatibility/2006">
-          <mc:Choice xmlns:a14="http://schemas.microsoft.com/office/drawing/2010/main" Requires="a14">
+        <mc:AlternateContent xmlns:mc="http://schemas.openxmlformats.org/markup-compatibility/2006" xmlns:a14="http://schemas.microsoft.com/office/drawing/2010/main">
+          <mc:Choice Requires="a14">
             <p:sp>
               <p:nvSpPr>
                 <p:cNvPr id="56" name="TextBox 55">
@@ -21839,7 +21843,7 @@
               </p:txBody>
             </p:sp>
           </mc:Choice>
-          <mc:Fallback>
+          <mc:Fallback xmlns="">
             <p:sp>
               <p:nvSpPr>
                 <p:cNvPr id="56" name="TextBox 55">
@@ -21884,8 +21888,8 @@
             </p:sp>
           </mc:Fallback>
         </mc:AlternateContent>
-        <mc:AlternateContent xmlns:mc="http://schemas.openxmlformats.org/markup-compatibility/2006">
-          <mc:Choice xmlns:a14="http://schemas.microsoft.com/office/drawing/2010/main" Requires="a14">
+        <mc:AlternateContent xmlns:mc="http://schemas.openxmlformats.org/markup-compatibility/2006" xmlns:a14="http://schemas.microsoft.com/office/drawing/2010/main">
+          <mc:Choice Requires="a14">
             <p:sp>
               <p:nvSpPr>
                 <p:cNvPr id="57" name="TextBox 56">
@@ -21951,7 +21955,7 @@
               </p:txBody>
             </p:sp>
           </mc:Choice>
-          <mc:Fallback>
+          <mc:Fallback xmlns="">
             <p:sp>
               <p:nvSpPr>
                 <p:cNvPr id="57" name="TextBox 56">
@@ -21996,8 +22000,8 @@
             </p:sp>
           </mc:Fallback>
         </mc:AlternateContent>
-        <mc:AlternateContent xmlns:mc="http://schemas.openxmlformats.org/markup-compatibility/2006">
-          <mc:Choice xmlns:a14="http://schemas.microsoft.com/office/drawing/2010/main" Requires="a14">
+        <mc:AlternateContent xmlns:mc="http://schemas.openxmlformats.org/markup-compatibility/2006" xmlns:a14="http://schemas.microsoft.com/office/drawing/2010/main">
+          <mc:Choice Requires="a14">
             <p:sp>
               <p:nvSpPr>
                 <p:cNvPr id="58" name="TextBox 57">
@@ -22063,7 +22067,7 @@
               </p:txBody>
             </p:sp>
           </mc:Choice>
-          <mc:Fallback>
+          <mc:Fallback xmlns="">
             <p:sp>
               <p:nvSpPr>
                 <p:cNvPr id="58" name="TextBox 57">
@@ -22293,8 +22297,8 @@
             </a:fontRef>
           </p:style>
         </p:cxnSp>
-        <mc:AlternateContent xmlns:mc="http://schemas.openxmlformats.org/markup-compatibility/2006">
-          <mc:Choice xmlns:a14="http://schemas.microsoft.com/office/drawing/2010/main" Requires="a14">
+        <mc:AlternateContent xmlns:mc="http://schemas.openxmlformats.org/markup-compatibility/2006" xmlns:a14="http://schemas.microsoft.com/office/drawing/2010/main">
+          <mc:Choice Requires="a14">
             <p:sp>
               <p:nvSpPr>
                 <p:cNvPr id="72" name="TextBox 71">
@@ -22358,7 +22362,7 @@
               </p:txBody>
             </p:sp>
           </mc:Choice>
-          <mc:Fallback>
+          <mc:Fallback xmlns="">
             <p:sp>
               <p:nvSpPr>
                 <p:cNvPr id="72" name="TextBox 71">
@@ -22544,8 +22548,8 @@
             </a:fontRef>
           </p:style>
         </p:cxnSp>
-        <mc:AlternateContent xmlns:mc="http://schemas.openxmlformats.org/markup-compatibility/2006">
-          <mc:Choice xmlns:a14="http://schemas.microsoft.com/office/drawing/2010/main" Requires="a14">
+        <mc:AlternateContent xmlns:mc="http://schemas.openxmlformats.org/markup-compatibility/2006" xmlns:a14="http://schemas.microsoft.com/office/drawing/2010/main">
+          <mc:Choice Requires="a14">
             <p:sp>
               <p:nvSpPr>
                 <p:cNvPr id="79" name="TextBox 78">
@@ -22611,7 +22615,7 @@
               </p:txBody>
             </p:sp>
           </mc:Choice>
-          <mc:Fallback>
+          <mc:Fallback xmlns="">
             <p:sp>
               <p:nvSpPr>
                 <p:cNvPr id="79" name="TextBox 78">
@@ -24675,8 +24679,8 @@
             </a:p>
           </p:txBody>
         </p:sp>
-        <mc:AlternateContent xmlns:mc="http://schemas.openxmlformats.org/markup-compatibility/2006">
-          <mc:Choice xmlns:a14="http://schemas.microsoft.com/office/drawing/2010/main" Requires="a14">
+        <mc:AlternateContent xmlns:mc="http://schemas.openxmlformats.org/markup-compatibility/2006" xmlns:a14="http://schemas.microsoft.com/office/drawing/2010/main">
+          <mc:Choice Requires="a14">
             <p:sp>
               <p:nvSpPr>
                 <p:cNvPr id="51" name="TextBox 50">
@@ -24745,7 +24749,7 @@
               </p:txBody>
             </p:sp>
           </mc:Choice>
-          <mc:Fallback>
+          <mc:Fallback xmlns="">
             <p:sp>
               <p:nvSpPr>
                 <p:cNvPr id="51" name="TextBox 50">
@@ -24790,8 +24794,8 @@
             </p:sp>
           </mc:Fallback>
         </mc:AlternateContent>
-        <mc:AlternateContent xmlns:mc="http://schemas.openxmlformats.org/markup-compatibility/2006">
-          <mc:Choice xmlns:a14="http://schemas.microsoft.com/office/drawing/2010/main" Requires="a14">
+        <mc:AlternateContent xmlns:mc="http://schemas.openxmlformats.org/markup-compatibility/2006" xmlns:a14="http://schemas.microsoft.com/office/drawing/2010/main">
+          <mc:Choice Requires="a14">
             <p:sp>
               <p:nvSpPr>
                 <p:cNvPr id="52" name="TextBox 51">
@@ -24860,7 +24864,7 @@
               </p:txBody>
             </p:sp>
           </mc:Choice>
-          <mc:Fallback>
+          <mc:Fallback xmlns="">
             <p:sp>
               <p:nvSpPr>
                 <p:cNvPr id="52" name="TextBox 51">
@@ -24905,8 +24909,8 @@
             </p:sp>
           </mc:Fallback>
         </mc:AlternateContent>
-        <mc:AlternateContent xmlns:mc="http://schemas.openxmlformats.org/markup-compatibility/2006">
-          <mc:Choice xmlns:a14="http://schemas.microsoft.com/office/drawing/2010/main" Requires="a14">
+        <mc:AlternateContent xmlns:mc="http://schemas.openxmlformats.org/markup-compatibility/2006" xmlns:a14="http://schemas.microsoft.com/office/drawing/2010/main">
+          <mc:Choice Requires="a14">
             <p:sp>
               <p:nvSpPr>
                 <p:cNvPr id="53" name="TextBox 52">
@@ -24975,7 +24979,7 @@
               </p:txBody>
             </p:sp>
           </mc:Choice>
-          <mc:Fallback>
+          <mc:Fallback xmlns="">
             <p:sp>
               <p:nvSpPr>
                 <p:cNvPr id="53" name="TextBox 52">
@@ -25020,8 +25024,8 @@
             </p:sp>
           </mc:Fallback>
         </mc:AlternateContent>
-        <mc:AlternateContent xmlns:mc="http://schemas.openxmlformats.org/markup-compatibility/2006">
-          <mc:Choice xmlns:a14="http://schemas.microsoft.com/office/drawing/2010/main" Requires="a14">
+        <mc:AlternateContent xmlns:mc="http://schemas.openxmlformats.org/markup-compatibility/2006" xmlns:a14="http://schemas.microsoft.com/office/drawing/2010/main">
+          <mc:Choice Requires="a14">
             <p:sp>
               <p:nvSpPr>
                 <p:cNvPr id="54" name="TextBox 53">
@@ -25090,7 +25094,7 @@
               </p:txBody>
             </p:sp>
           </mc:Choice>
-          <mc:Fallback>
+          <mc:Fallback xmlns="">
             <p:sp>
               <p:nvSpPr>
                 <p:cNvPr id="54" name="TextBox 53">
@@ -25135,8 +25139,8 @@
             </p:sp>
           </mc:Fallback>
         </mc:AlternateContent>
-        <mc:AlternateContent xmlns:mc="http://schemas.openxmlformats.org/markup-compatibility/2006">
-          <mc:Choice xmlns:a14="http://schemas.microsoft.com/office/drawing/2010/main" Requires="a14">
+        <mc:AlternateContent xmlns:mc="http://schemas.openxmlformats.org/markup-compatibility/2006" xmlns:a14="http://schemas.microsoft.com/office/drawing/2010/main">
+          <mc:Choice Requires="a14">
             <p:sp>
               <p:nvSpPr>
                 <p:cNvPr id="55" name="TextBox 54">
@@ -25205,7 +25209,7 @@
               </p:txBody>
             </p:sp>
           </mc:Choice>
-          <mc:Fallback>
+          <mc:Fallback xmlns="">
             <p:sp>
               <p:nvSpPr>
                 <p:cNvPr id="55" name="TextBox 54">
@@ -25250,8 +25254,8 @@
             </p:sp>
           </mc:Fallback>
         </mc:AlternateContent>
-        <mc:AlternateContent xmlns:mc="http://schemas.openxmlformats.org/markup-compatibility/2006">
-          <mc:Choice xmlns:a14="http://schemas.microsoft.com/office/drawing/2010/main" Requires="a14">
+        <mc:AlternateContent xmlns:mc="http://schemas.openxmlformats.org/markup-compatibility/2006" xmlns:a14="http://schemas.microsoft.com/office/drawing/2010/main">
+          <mc:Choice Requires="a14">
             <p:sp>
               <p:nvSpPr>
                 <p:cNvPr id="56" name="TextBox 55">
@@ -25320,7 +25324,7 @@
               </p:txBody>
             </p:sp>
           </mc:Choice>
-          <mc:Fallback>
+          <mc:Fallback xmlns="">
             <p:sp>
               <p:nvSpPr>
                 <p:cNvPr id="56" name="TextBox 55">
@@ -25365,8 +25369,8 @@
             </p:sp>
           </mc:Fallback>
         </mc:AlternateContent>
-        <mc:AlternateContent xmlns:mc="http://schemas.openxmlformats.org/markup-compatibility/2006">
-          <mc:Choice xmlns:a14="http://schemas.microsoft.com/office/drawing/2010/main" Requires="a14">
+        <mc:AlternateContent xmlns:mc="http://schemas.openxmlformats.org/markup-compatibility/2006" xmlns:a14="http://schemas.microsoft.com/office/drawing/2010/main">
+          <mc:Choice Requires="a14">
             <p:sp>
               <p:nvSpPr>
                 <p:cNvPr id="57" name="TextBox 56">
@@ -25435,7 +25439,7 @@
               </p:txBody>
             </p:sp>
           </mc:Choice>
-          <mc:Fallback>
+          <mc:Fallback xmlns="">
             <p:sp>
               <p:nvSpPr>
                 <p:cNvPr id="57" name="TextBox 56">
@@ -25480,8 +25484,8 @@
             </p:sp>
           </mc:Fallback>
         </mc:AlternateContent>
-        <mc:AlternateContent xmlns:mc="http://schemas.openxmlformats.org/markup-compatibility/2006">
-          <mc:Choice xmlns:a14="http://schemas.microsoft.com/office/drawing/2010/main" Requires="a14">
+        <mc:AlternateContent xmlns:mc="http://schemas.openxmlformats.org/markup-compatibility/2006" xmlns:a14="http://schemas.microsoft.com/office/drawing/2010/main">
+          <mc:Choice Requires="a14">
             <p:sp>
               <p:nvSpPr>
                 <p:cNvPr id="58" name="TextBox 57">
@@ -25550,7 +25554,7 @@
               </p:txBody>
             </p:sp>
           </mc:Choice>
-          <mc:Fallback>
+          <mc:Fallback xmlns="">
             <p:sp>
               <p:nvSpPr>
                 <p:cNvPr id="58" name="TextBox 57">
@@ -25595,8 +25599,8 @@
             </p:sp>
           </mc:Fallback>
         </mc:AlternateContent>
-        <mc:AlternateContent xmlns:mc="http://schemas.openxmlformats.org/markup-compatibility/2006">
-          <mc:Choice xmlns:a14="http://schemas.microsoft.com/office/drawing/2010/main" Requires="a14">
+        <mc:AlternateContent xmlns:mc="http://schemas.openxmlformats.org/markup-compatibility/2006" xmlns:a14="http://schemas.microsoft.com/office/drawing/2010/main">
+          <mc:Choice Requires="a14">
             <p:sp>
               <p:nvSpPr>
                 <p:cNvPr id="59" name="TextBox 58">
@@ -25665,7 +25669,7 @@
               </p:txBody>
             </p:sp>
           </mc:Choice>
-          <mc:Fallback>
+          <mc:Fallback xmlns="">
             <p:sp>
               <p:nvSpPr>
                 <p:cNvPr id="59" name="TextBox 58">
@@ -25710,8 +25714,8 @@
             </p:sp>
           </mc:Fallback>
         </mc:AlternateContent>
-        <mc:AlternateContent xmlns:mc="http://schemas.openxmlformats.org/markup-compatibility/2006">
-          <mc:Choice xmlns:a14="http://schemas.microsoft.com/office/drawing/2010/main" Requires="a14">
+        <mc:AlternateContent xmlns:mc="http://schemas.openxmlformats.org/markup-compatibility/2006" xmlns:a14="http://schemas.microsoft.com/office/drawing/2010/main">
+          <mc:Choice Requires="a14">
             <p:sp>
               <p:nvSpPr>
                 <p:cNvPr id="60" name="TextBox 59">
@@ -25780,7 +25784,7 @@
               </p:txBody>
             </p:sp>
           </mc:Choice>
-          <mc:Fallback>
+          <mc:Fallback xmlns="">
             <p:sp>
               <p:nvSpPr>
                 <p:cNvPr id="60" name="TextBox 59">
@@ -25825,8 +25829,8 @@
             </p:sp>
           </mc:Fallback>
         </mc:AlternateContent>
-        <mc:AlternateContent xmlns:mc="http://schemas.openxmlformats.org/markup-compatibility/2006">
-          <mc:Choice xmlns:a14="http://schemas.microsoft.com/office/drawing/2010/main" Requires="a14">
+        <mc:AlternateContent xmlns:mc="http://schemas.openxmlformats.org/markup-compatibility/2006" xmlns:a14="http://schemas.microsoft.com/office/drawing/2010/main">
+          <mc:Choice Requires="a14">
             <p:sp>
               <p:nvSpPr>
                 <p:cNvPr id="61" name="TextBox 60">
@@ -25895,7 +25899,7 @@
               </p:txBody>
             </p:sp>
           </mc:Choice>
-          <mc:Fallback>
+          <mc:Fallback xmlns="">
             <p:sp>
               <p:nvSpPr>
                 <p:cNvPr id="61" name="TextBox 60">
@@ -25940,8 +25944,8 @@
             </p:sp>
           </mc:Fallback>
         </mc:AlternateContent>
-        <mc:AlternateContent xmlns:mc="http://schemas.openxmlformats.org/markup-compatibility/2006">
-          <mc:Choice xmlns:a14="http://schemas.microsoft.com/office/drawing/2010/main" Requires="a14">
+        <mc:AlternateContent xmlns:mc="http://schemas.openxmlformats.org/markup-compatibility/2006" xmlns:a14="http://schemas.microsoft.com/office/drawing/2010/main">
+          <mc:Choice Requires="a14">
             <p:sp>
               <p:nvSpPr>
                 <p:cNvPr id="62" name="TextBox 61">
@@ -26010,7 +26014,7 @@
               </p:txBody>
             </p:sp>
           </mc:Choice>
-          <mc:Fallback>
+          <mc:Fallback xmlns="">
             <p:sp>
               <p:nvSpPr>
                 <p:cNvPr id="62" name="TextBox 61">
@@ -26254,8 +26258,8 @@
             </a:p>
           </p:txBody>
         </p:sp>
-        <mc:AlternateContent xmlns:mc="http://schemas.openxmlformats.org/markup-compatibility/2006">
-          <mc:Choice xmlns:a14="http://schemas.microsoft.com/office/drawing/2010/main" Requires="a14">
+        <mc:AlternateContent xmlns:mc="http://schemas.openxmlformats.org/markup-compatibility/2006" xmlns:a14="http://schemas.microsoft.com/office/drawing/2010/main">
+          <mc:Choice Requires="a14">
             <p:sp>
               <p:nvSpPr>
                 <p:cNvPr id="77" name="TextBox 76">
@@ -26329,7 +26333,7 @@
               </p:txBody>
             </p:sp>
           </mc:Choice>
-          <mc:Fallback>
+          <mc:Fallback xmlns="">
             <p:sp>
               <p:nvSpPr>
                 <p:cNvPr id="77" name="TextBox 76">
@@ -26374,8 +26378,8 @@
             </p:sp>
           </mc:Fallback>
         </mc:AlternateContent>
-        <mc:AlternateContent xmlns:mc="http://schemas.openxmlformats.org/markup-compatibility/2006">
-          <mc:Choice xmlns:a14="http://schemas.microsoft.com/office/drawing/2010/main" Requires="a14">
+        <mc:AlternateContent xmlns:mc="http://schemas.openxmlformats.org/markup-compatibility/2006" xmlns:a14="http://schemas.microsoft.com/office/drawing/2010/main">
+          <mc:Choice Requires="a14">
             <p:sp>
               <p:nvSpPr>
                 <p:cNvPr id="3" name="TextBox 2">
@@ -26449,7 +26453,7 @@
               </p:txBody>
             </p:sp>
           </mc:Choice>
-          <mc:Fallback>
+          <mc:Fallback xmlns="">
             <p:sp>
               <p:nvSpPr>
                 <p:cNvPr id="3" name="TextBox 2">
@@ -26494,8 +26498,8 @@
             </p:sp>
           </mc:Fallback>
         </mc:AlternateContent>
-        <mc:AlternateContent xmlns:mc="http://schemas.openxmlformats.org/markup-compatibility/2006">
-          <mc:Choice xmlns:a14="http://schemas.microsoft.com/office/drawing/2010/main" Requires="a14">
+        <mc:AlternateContent xmlns:mc="http://schemas.openxmlformats.org/markup-compatibility/2006" xmlns:a14="http://schemas.microsoft.com/office/drawing/2010/main">
+          <mc:Choice Requires="a14">
             <p:sp>
               <p:nvSpPr>
                 <p:cNvPr id="8" name="TextBox 7">
@@ -26569,7 +26573,7 @@
               </p:txBody>
             </p:sp>
           </mc:Choice>
-          <mc:Fallback>
+          <mc:Fallback xmlns="">
             <p:sp>
               <p:nvSpPr>
                 <p:cNvPr id="8" name="TextBox 7">
@@ -26614,8 +26618,8 @@
             </p:sp>
           </mc:Fallback>
         </mc:AlternateContent>
-        <mc:AlternateContent xmlns:mc="http://schemas.openxmlformats.org/markup-compatibility/2006">
-          <mc:Choice xmlns:a14="http://schemas.microsoft.com/office/drawing/2010/main" Requires="a14">
+        <mc:AlternateContent xmlns:mc="http://schemas.openxmlformats.org/markup-compatibility/2006" xmlns:a14="http://schemas.microsoft.com/office/drawing/2010/main">
+          <mc:Choice Requires="a14">
             <p:sp>
               <p:nvSpPr>
                 <p:cNvPr id="12" name="TextBox 11">
@@ -26689,7 +26693,7 @@
               </p:txBody>
             </p:sp>
           </mc:Choice>
-          <mc:Fallback>
+          <mc:Fallback xmlns="">
             <p:sp>
               <p:nvSpPr>
                 <p:cNvPr id="12" name="TextBox 11">
@@ -28360,8 +28364,8 @@
             </a:p>
           </p:txBody>
         </p:sp>
-        <mc:AlternateContent xmlns:mc="http://schemas.openxmlformats.org/markup-compatibility/2006">
-          <mc:Choice xmlns:a14="http://schemas.microsoft.com/office/drawing/2010/main" Requires="a14">
+        <mc:AlternateContent xmlns:mc="http://schemas.openxmlformats.org/markup-compatibility/2006" xmlns:a14="http://schemas.microsoft.com/office/drawing/2010/main">
+          <mc:Choice Requires="a14">
             <p:sp>
               <p:nvSpPr>
                 <p:cNvPr id="51" name="TextBox 50">
@@ -28430,7 +28434,7 @@
               </p:txBody>
             </p:sp>
           </mc:Choice>
-          <mc:Fallback>
+          <mc:Fallback xmlns="">
             <p:sp>
               <p:nvSpPr>
                 <p:cNvPr id="51" name="TextBox 50">
@@ -28475,8 +28479,8 @@
             </p:sp>
           </mc:Fallback>
         </mc:AlternateContent>
-        <mc:AlternateContent xmlns:mc="http://schemas.openxmlformats.org/markup-compatibility/2006">
-          <mc:Choice xmlns:a14="http://schemas.microsoft.com/office/drawing/2010/main" Requires="a14">
+        <mc:AlternateContent xmlns:mc="http://schemas.openxmlformats.org/markup-compatibility/2006" xmlns:a14="http://schemas.microsoft.com/office/drawing/2010/main">
+          <mc:Choice Requires="a14">
             <p:sp>
               <p:nvSpPr>
                 <p:cNvPr id="52" name="TextBox 51">
@@ -28545,7 +28549,7 @@
               </p:txBody>
             </p:sp>
           </mc:Choice>
-          <mc:Fallback>
+          <mc:Fallback xmlns="">
             <p:sp>
               <p:nvSpPr>
                 <p:cNvPr id="52" name="TextBox 51">
@@ -28590,8 +28594,8 @@
             </p:sp>
           </mc:Fallback>
         </mc:AlternateContent>
-        <mc:AlternateContent xmlns:mc="http://schemas.openxmlformats.org/markup-compatibility/2006">
-          <mc:Choice xmlns:a14="http://schemas.microsoft.com/office/drawing/2010/main" Requires="a14">
+        <mc:AlternateContent xmlns:mc="http://schemas.openxmlformats.org/markup-compatibility/2006" xmlns:a14="http://schemas.microsoft.com/office/drawing/2010/main">
+          <mc:Choice Requires="a14">
             <p:sp>
               <p:nvSpPr>
                 <p:cNvPr id="53" name="TextBox 52">
@@ -28660,7 +28664,7 @@
               </p:txBody>
             </p:sp>
           </mc:Choice>
-          <mc:Fallback>
+          <mc:Fallback xmlns="">
             <p:sp>
               <p:nvSpPr>
                 <p:cNvPr id="53" name="TextBox 52">
@@ -28705,8 +28709,8 @@
             </p:sp>
           </mc:Fallback>
         </mc:AlternateContent>
-        <mc:AlternateContent xmlns:mc="http://schemas.openxmlformats.org/markup-compatibility/2006">
-          <mc:Choice xmlns:a14="http://schemas.microsoft.com/office/drawing/2010/main" Requires="a14">
+        <mc:AlternateContent xmlns:mc="http://schemas.openxmlformats.org/markup-compatibility/2006" xmlns:a14="http://schemas.microsoft.com/office/drawing/2010/main">
+          <mc:Choice Requires="a14">
             <p:sp>
               <p:nvSpPr>
                 <p:cNvPr id="54" name="TextBox 53">
@@ -28775,7 +28779,7 @@
               </p:txBody>
             </p:sp>
           </mc:Choice>
-          <mc:Fallback>
+          <mc:Fallback xmlns="">
             <p:sp>
               <p:nvSpPr>
                 <p:cNvPr id="54" name="TextBox 53">
@@ -28820,8 +28824,8 @@
             </p:sp>
           </mc:Fallback>
         </mc:AlternateContent>
-        <mc:AlternateContent xmlns:mc="http://schemas.openxmlformats.org/markup-compatibility/2006">
-          <mc:Choice xmlns:a14="http://schemas.microsoft.com/office/drawing/2010/main" Requires="a14">
+        <mc:AlternateContent xmlns:mc="http://schemas.openxmlformats.org/markup-compatibility/2006" xmlns:a14="http://schemas.microsoft.com/office/drawing/2010/main">
+          <mc:Choice Requires="a14">
             <p:sp>
               <p:nvSpPr>
                 <p:cNvPr id="55" name="TextBox 54">
@@ -28890,7 +28894,7 @@
               </p:txBody>
             </p:sp>
           </mc:Choice>
-          <mc:Fallback>
+          <mc:Fallback xmlns="">
             <p:sp>
               <p:nvSpPr>
                 <p:cNvPr id="55" name="TextBox 54">
@@ -28935,8 +28939,8 @@
             </p:sp>
           </mc:Fallback>
         </mc:AlternateContent>
-        <mc:AlternateContent xmlns:mc="http://schemas.openxmlformats.org/markup-compatibility/2006">
-          <mc:Choice xmlns:a14="http://schemas.microsoft.com/office/drawing/2010/main" Requires="a14">
+        <mc:AlternateContent xmlns:mc="http://schemas.openxmlformats.org/markup-compatibility/2006" xmlns:a14="http://schemas.microsoft.com/office/drawing/2010/main">
+          <mc:Choice Requires="a14">
             <p:sp>
               <p:nvSpPr>
                 <p:cNvPr id="56" name="TextBox 55">
@@ -29005,7 +29009,7 @@
               </p:txBody>
             </p:sp>
           </mc:Choice>
-          <mc:Fallback>
+          <mc:Fallback xmlns="">
             <p:sp>
               <p:nvSpPr>
                 <p:cNvPr id="56" name="TextBox 55">
@@ -29050,8 +29054,8 @@
             </p:sp>
           </mc:Fallback>
         </mc:AlternateContent>
-        <mc:AlternateContent xmlns:mc="http://schemas.openxmlformats.org/markup-compatibility/2006">
-          <mc:Choice xmlns:a14="http://schemas.microsoft.com/office/drawing/2010/main" Requires="a14">
+        <mc:AlternateContent xmlns:mc="http://schemas.openxmlformats.org/markup-compatibility/2006" xmlns:a14="http://schemas.microsoft.com/office/drawing/2010/main">
+          <mc:Choice Requires="a14">
             <p:sp>
               <p:nvSpPr>
                 <p:cNvPr id="57" name="TextBox 56">
@@ -29120,7 +29124,7 @@
               </p:txBody>
             </p:sp>
           </mc:Choice>
-          <mc:Fallback>
+          <mc:Fallback xmlns="">
             <p:sp>
               <p:nvSpPr>
                 <p:cNvPr id="57" name="TextBox 56">
@@ -29165,8 +29169,8 @@
             </p:sp>
           </mc:Fallback>
         </mc:AlternateContent>
-        <mc:AlternateContent xmlns:mc="http://schemas.openxmlformats.org/markup-compatibility/2006">
-          <mc:Choice xmlns:a14="http://schemas.microsoft.com/office/drawing/2010/main" Requires="a14">
+        <mc:AlternateContent xmlns:mc="http://schemas.openxmlformats.org/markup-compatibility/2006" xmlns:a14="http://schemas.microsoft.com/office/drawing/2010/main">
+          <mc:Choice Requires="a14">
             <p:sp>
               <p:nvSpPr>
                 <p:cNvPr id="58" name="TextBox 57">
@@ -29235,7 +29239,7 @@
               </p:txBody>
             </p:sp>
           </mc:Choice>
-          <mc:Fallback>
+          <mc:Fallback xmlns="">
             <p:sp>
               <p:nvSpPr>
                 <p:cNvPr id="58" name="TextBox 57">
@@ -29280,8 +29284,8 @@
             </p:sp>
           </mc:Fallback>
         </mc:AlternateContent>
-        <mc:AlternateContent xmlns:mc="http://schemas.openxmlformats.org/markup-compatibility/2006">
-          <mc:Choice xmlns:a14="http://schemas.microsoft.com/office/drawing/2010/main" Requires="a14">
+        <mc:AlternateContent xmlns:mc="http://schemas.openxmlformats.org/markup-compatibility/2006" xmlns:a14="http://schemas.microsoft.com/office/drawing/2010/main">
+          <mc:Choice Requires="a14">
             <p:sp>
               <p:nvSpPr>
                 <p:cNvPr id="59" name="TextBox 58">
@@ -29350,7 +29354,7 @@
               </p:txBody>
             </p:sp>
           </mc:Choice>
-          <mc:Fallback>
+          <mc:Fallback xmlns="">
             <p:sp>
               <p:nvSpPr>
                 <p:cNvPr id="59" name="TextBox 58">
@@ -29395,8 +29399,8 @@
             </p:sp>
           </mc:Fallback>
         </mc:AlternateContent>
-        <mc:AlternateContent xmlns:mc="http://schemas.openxmlformats.org/markup-compatibility/2006">
-          <mc:Choice xmlns:a14="http://schemas.microsoft.com/office/drawing/2010/main" Requires="a14">
+        <mc:AlternateContent xmlns:mc="http://schemas.openxmlformats.org/markup-compatibility/2006" xmlns:a14="http://schemas.microsoft.com/office/drawing/2010/main">
+          <mc:Choice Requires="a14">
             <p:sp>
               <p:nvSpPr>
                 <p:cNvPr id="60" name="TextBox 59">
@@ -29465,7 +29469,7 @@
               </p:txBody>
             </p:sp>
           </mc:Choice>
-          <mc:Fallback>
+          <mc:Fallback xmlns="">
             <p:sp>
               <p:nvSpPr>
                 <p:cNvPr id="60" name="TextBox 59">
@@ -29510,8 +29514,8 @@
             </p:sp>
           </mc:Fallback>
         </mc:AlternateContent>
-        <mc:AlternateContent xmlns:mc="http://schemas.openxmlformats.org/markup-compatibility/2006">
-          <mc:Choice xmlns:a14="http://schemas.microsoft.com/office/drawing/2010/main" Requires="a14">
+        <mc:AlternateContent xmlns:mc="http://schemas.openxmlformats.org/markup-compatibility/2006" xmlns:a14="http://schemas.microsoft.com/office/drawing/2010/main">
+          <mc:Choice Requires="a14">
             <p:sp>
               <p:nvSpPr>
                 <p:cNvPr id="61" name="TextBox 60">
@@ -29580,7 +29584,7 @@
               </p:txBody>
             </p:sp>
           </mc:Choice>
-          <mc:Fallback>
+          <mc:Fallback xmlns="">
             <p:sp>
               <p:nvSpPr>
                 <p:cNvPr id="61" name="TextBox 60">
@@ -29625,8 +29629,8 @@
             </p:sp>
           </mc:Fallback>
         </mc:AlternateContent>
-        <mc:AlternateContent xmlns:mc="http://schemas.openxmlformats.org/markup-compatibility/2006">
-          <mc:Choice xmlns:a14="http://schemas.microsoft.com/office/drawing/2010/main" Requires="a14">
+        <mc:AlternateContent xmlns:mc="http://schemas.openxmlformats.org/markup-compatibility/2006" xmlns:a14="http://schemas.microsoft.com/office/drawing/2010/main">
+          <mc:Choice Requires="a14">
             <p:sp>
               <p:nvSpPr>
                 <p:cNvPr id="62" name="TextBox 61">
@@ -29695,7 +29699,7 @@
               </p:txBody>
             </p:sp>
           </mc:Choice>
-          <mc:Fallback>
+          <mc:Fallback xmlns="">
             <p:sp>
               <p:nvSpPr>
                 <p:cNvPr id="62" name="TextBox 61">
@@ -29939,8 +29943,8 @@
             </a:p>
           </p:txBody>
         </p:sp>
-        <mc:AlternateContent xmlns:mc="http://schemas.openxmlformats.org/markup-compatibility/2006">
-          <mc:Choice xmlns:a14="http://schemas.microsoft.com/office/drawing/2010/main" Requires="a14">
+        <mc:AlternateContent xmlns:mc="http://schemas.openxmlformats.org/markup-compatibility/2006" xmlns:a14="http://schemas.microsoft.com/office/drawing/2010/main">
+          <mc:Choice Requires="a14">
             <p:sp>
               <p:nvSpPr>
                 <p:cNvPr id="77" name="TextBox 76">
@@ -30014,7 +30018,7 @@
               </p:txBody>
             </p:sp>
           </mc:Choice>
-          <mc:Fallback>
+          <mc:Fallback xmlns="">
             <p:sp>
               <p:nvSpPr>
                 <p:cNvPr id="77" name="TextBox 76">
@@ -30059,8 +30063,8 @@
             </p:sp>
           </mc:Fallback>
         </mc:AlternateContent>
-        <mc:AlternateContent xmlns:mc="http://schemas.openxmlformats.org/markup-compatibility/2006">
-          <mc:Choice xmlns:a14="http://schemas.microsoft.com/office/drawing/2010/main" Requires="a14">
+        <mc:AlternateContent xmlns:mc="http://schemas.openxmlformats.org/markup-compatibility/2006" xmlns:a14="http://schemas.microsoft.com/office/drawing/2010/main">
+          <mc:Choice Requires="a14">
             <p:sp>
               <p:nvSpPr>
                 <p:cNvPr id="3" name="TextBox 2">
@@ -30134,7 +30138,7 @@
               </p:txBody>
             </p:sp>
           </mc:Choice>
-          <mc:Fallback>
+          <mc:Fallback xmlns="">
             <p:sp>
               <p:nvSpPr>
                 <p:cNvPr id="3" name="TextBox 2">
@@ -30179,8 +30183,8 @@
             </p:sp>
           </mc:Fallback>
         </mc:AlternateContent>
-        <mc:AlternateContent xmlns:mc="http://schemas.openxmlformats.org/markup-compatibility/2006">
-          <mc:Choice xmlns:a14="http://schemas.microsoft.com/office/drawing/2010/main" Requires="a14">
+        <mc:AlternateContent xmlns:mc="http://schemas.openxmlformats.org/markup-compatibility/2006" xmlns:a14="http://schemas.microsoft.com/office/drawing/2010/main">
+          <mc:Choice Requires="a14">
             <p:sp>
               <p:nvSpPr>
                 <p:cNvPr id="8" name="TextBox 7">
@@ -30254,7 +30258,7 @@
               </p:txBody>
             </p:sp>
           </mc:Choice>
-          <mc:Fallback>
+          <mc:Fallback xmlns="">
             <p:sp>
               <p:nvSpPr>
                 <p:cNvPr id="8" name="TextBox 7">
@@ -30299,8 +30303,8 @@
             </p:sp>
           </mc:Fallback>
         </mc:AlternateContent>
-        <mc:AlternateContent xmlns:mc="http://schemas.openxmlformats.org/markup-compatibility/2006">
-          <mc:Choice xmlns:a14="http://schemas.microsoft.com/office/drawing/2010/main" Requires="a14">
+        <mc:AlternateContent xmlns:mc="http://schemas.openxmlformats.org/markup-compatibility/2006" xmlns:a14="http://schemas.microsoft.com/office/drawing/2010/main">
+          <mc:Choice Requires="a14">
             <p:sp>
               <p:nvSpPr>
                 <p:cNvPr id="12" name="TextBox 11">
@@ -30374,7 +30378,7 @@
               </p:txBody>
             </p:sp>
           </mc:Choice>
-          <mc:Fallback>
+          <mc:Fallback xmlns="">
             <p:sp>
               <p:nvSpPr>
                 <p:cNvPr id="12" name="TextBox 11">
@@ -37638,8 +37642,8 @@
           </a:p>
         </p:txBody>
       </p:sp>
-      <mc:AlternateContent xmlns:mc="http://schemas.openxmlformats.org/markup-compatibility/2006">
-        <mc:Choice xmlns:a14="http://schemas.microsoft.com/office/drawing/2010/main" Requires="a14">
+      <mc:AlternateContent xmlns:mc="http://schemas.openxmlformats.org/markup-compatibility/2006" xmlns:a14="http://schemas.microsoft.com/office/drawing/2010/main">
+        <mc:Choice Requires="a14">
           <p:sp>
             <p:nvSpPr>
               <p:cNvPr id="8" name="Rectangle 7">
@@ -37898,7 +37902,7 @@
             </p:txBody>
           </p:sp>
         </mc:Choice>
-        <mc:Fallback>
+        <mc:Fallback xmlns="">
           <p:sp>
             <p:nvSpPr>
               <p:cNvPr id="8" name="Rectangle 7">
@@ -37943,8 +37947,8 @@
           </p:sp>
         </mc:Fallback>
       </mc:AlternateContent>
-      <mc:AlternateContent xmlns:mc="http://schemas.openxmlformats.org/markup-compatibility/2006">
-        <mc:Choice xmlns:a14="http://schemas.microsoft.com/office/drawing/2010/main" Requires="a14">
+      <mc:AlternateContent xmlns:mc="http://schemas.openxmlformats.org/markup-compatibility/2006" xmlns:a14="http://schemas.microsoft.com/office/drawing/2010/main">
+        <mc:Choice Requires="a14">
           <p:sp>
             <p:nvSpPr>
               <p:cNvPr id="6" name="Rectangle 5">
@@ -38059,7 +38063,7 @@
             </p:txBody>
           </p:sp>
         </mc:Choice>
-        <mc:Fallback>
+        <mc:Fallback xmlns="">
           <p:sp>
             <p:nvSpPr>
               <p:cNvPr id="6" name="Rectangle 5">
@@ -38172,8 +38176,8 @@
           </a:p>
         </p:txBody>
       </p:sp>
-      <mc:AlternateContent xmlns:mc="http://schemas.openxmlformats.org/markup-compatibility/2006">
-        <mc:Choice xmlns:a14="http://schemas.microsoft.com/office/drawing/2010/main" Requires="a14">
+      <mc:AlternateContent xmlns:mc="http://schemas.openxmlformats.org/markup-compatibility/2006" xmlns:a14="http://schemas.microsoft.com/office/drawing/2010/main">
+        <mc:Choice Requires="a14">
           <p:sp>
             <p:nvSpPr>
               <p:cNvPr id="5" name="Speech Bubble: Rectangle 4">
@@ -38264,7 +38268,7 @@
             </p:txBody>
           </p:sp>
         </mc:Choice>
-        <mc:Fallback>
+        <mc:Fallback xmlns="">
           <p:sp>
             <p:nvSpPr>
               <p:cNvPr id="5" name="Speech Bubble: Rectangle 4">
@@ -38315,8 +38319,8 @@
           </p:sp>
         </mc:Fallback>
       </mc:AlternateContent>
-      <mc:AlternateContent xmlns:mc="http://schemas.openxmlformats.org/markup-compatibility/2006">
-        <mc:Choice xmlns:a14="http://schemas.microsoft.com/office/drawing/2010/main" Requires="a14">
+      <mc:AlternateContent xmlns:mc="http://schemas.openxmlformats.org/markup-compatibility/2006" xmlns:a14="http://schemas.microsoft.com/office/drawing/2010/main">
+        <mc:Choice Requires="a14">
           <p:sp>
             <p:nvSpPr>
               <p:cNvPr id="7" name="Speech Bubble: Rectangle 6">
@@ -38405,7 +38409,7 @@
             </p:txBody>
           </p:sp>
         </mc:Choice>
-        <mc:Fallback>
+        <mc:Fallback xmlns="">
           <p:sp>
             <p:nvSpPr>
               <p:cNvPr id="7" name="Speech Bubble: Rectangle 6">
@@ -45017,8 +45021,8 @@
             </a:p>
           </p:txBody>
         </p:sp>
-        <mc:AlternateContent xmlns:mc="http://schemas.openxmlformats.org/markup-compatibility/2006">
-          <mc:Choice xmlns:a14="http://schemas.microsoft.com/office/drawing/2010/main" Requires="a14">
+        <mc:AlternateContent xmlns:mc="http://schemas.openxmlformats.org/markup-compatibility/2006" xmlns:a14="http://schemas.microsoft.com/office/drawing/2010/main">
+          <mc:Choice Requires="a14">
             <p:sp>
               <p:nvSpPr>
                 <p:cNvPr id="10" name="TextBox 9">
@@ -45074,7 +45078,7 @@
               </p:txBody>
             </p:sp>
           </mc:Choice>
-          <mc:Fallback>
+          <mc:Fallback xmlns="">
             <p:sp>
               <p:nvSpPr>
                 <p:cNvPr id="10" name="TextBox 9">

</xml_diff>

<commit_message>
added animation for pure MC.
</commit_message>
<xml_diff>
--- a/slides/05_games.pptx
+++ b/slides/05_games.pptx
@@ -2804,8 +2804,8 @@
       </dsp:nvSpPr>
       <dsp:spPr>
         <a:xfrm rot="21300000">
-          <a:off x="979649" y="887917"/>
-          <a:ext cx="5098725" cy="446080"/>
+          <a:off x="716009" y="706050"/>
+          <a:ext cx="4054381" cy="354712"/>
         </a:xfrm>
         <a:prstGeom prst="mathMinus">
           <a:avLst/>
@@ -2853,8 +2853,8 @@
       </dsp:nvSpPr>
       <dsp:spPr>
         <a:xfrm>
-          <a:off x="846963" y="111095"/>
-          <a:ext cx="2117407" cy="888766"/>
+          <a:off x="658368" y="88340"/>
+          <a:ext cx="1645920" cy="706725"/>
         </a:xfrm>
         <a:prstGeom prst="downArrow">
           <a:avLst/>
@@ -2903,8 +2903,8 @@
       </dsp:nvSpPr>
       <dsp:spPr>
         <a:xfrm>
-          <a:off x="3123170" y="0"/>
-          <a:ext cx="3493733" cy="933204"/>
+          <a:off x="2427727" y="0"/>
+          <a:ext cx="2715776" cy="742061"/>
         </a:xfrm>
         <a:prstGeom prst="rect">
           <a:avLst/>
@@ -2928,12 +2928,12 @@
         <a:fontRef idx="minor"/>
       </dsp:style>
       <dsp:txBody>
-        <a:bodyPr spcFirstLastPara="0" vert="horz" wrap="square" lIns="106680" tIns="106680" rIns="106680" bIns="106680" numCol="1" spcCol="1270" anchor="ctr" anchorCtr="0">
+        <a:bodyPr spcFirstLastPara="0" vert="horz" wrap="square" lIns="85344" tIns="85344" rIns="85344" bIns="85344" numCol="1" spcCol="1270" anchor="ctr" anchorCtr="0">
           <a:noAutofit/>
         </a:bodyPr>
         <a:lstStyle/>
         <a:p>
-          <a:pPr marL="0" lvl="0" indent="0" algn="ctr" defTabSz="666750">
+          <a:pPr marL="0" lvl="0" indent="0" algn="ctr" defTabSz="533400">
             <a:lnSpc>
               <a:spcPct val="90000"/>
             </a:lnSpc>
@@ -2947,18 +2947,18 @@
             <a:buNone/>
           </a:pPr>
           <a:r>
-            <a:rPr lang="en-US" sz="1500" b="1" kern="1200" dirty="0"/>
+            <a:rPr lang="en-US" sz="1200" b="1" kern="1200" dirty="0"/>
             <a:t>Exploration</a:t>
           </a:r>
           <a:r>
-            <a:rPr lang="en-US" sz="1500" kern="1200" dirty="0"/>
+            <a:rPr lang="en-US" sz="1200" kern="1200" dirty="0"/>
             <a:t>: perform more playouts from states that currently have no or few playouts.</a:t>
           </a:r>
         </a:p>
       </dsp:txBody>
       <dsp:txXfrm>
-        <a:off x="3123170" y="0"/>
-        <a:ext cx="3493733" cy="933204"/>
+        <a:off x="2427727" y="0"/>
+        <a:ext cx="2715776" cy="742061"/>
       </dsp:txXfrm>
     </dsp:sp>
     <dsp:sp modelId="{EC55A2F8-97C2-4D3B-ADF8-DBE6FB6A38DF}">
@@ -2968,8 +2968,8 @@
       </dsp:nvSpPr>
       <dsp:spPr>
         <a:xfrm>
-          <a:off x="4093654" y="1222053"/>
-          <a:ext cx="2117407" cy="888766"/>
+          <a:off x="3182112" y="971747"/>
+          <a:ext cx="1645920" cy="706725"/>
         </a:xfrm>
         <a:prstGeom prst="upArrow">
           <a:avLst/>
@@ -3018,8 +3018,8 @@
       </dsp:nvSpPr>
       <dsp:spPr>
         <a:xfrm>
-          <a:off x="202187" y="1288711"/>
-          <a:ext cx="3971601" cy="933204"/>
+          <a:off x="157165" y="1024751"/>
+          <a:ext cx="3087236" cy="742061"/>
         </a:xfrm>
         <a:prstGeom prst="rect">
           <a:avLst/>
@@ -3043,12 +3043,12 @@
         <a:fontRef idx="minor"/>
       </dsp:style>
       <dsp:txBody>
-        <a:bodyPr spcFirstLastPara="0" vert="horz" wrap="square" lIns="99568" tIns="99568" rIns="99568" bIns="99568" numCol="1" spcCol="1270" anchor="ctr" anchorCtr="0">
+        <a:bodyPr spcFirstLastPara="0" vert="horz" wrap="square" lIns="78232" tIns="78232" rIns="78232" bIns="78232" numCol="1" spcCol="1270" anchor="ctr" anchorCtr="0">
           <a:noAutofit/>
         </a:bodyPr>
         <a:lstStyle/>
         <a:p>
-          <a:pPr marL="0" lvl="0" indent="0" algn="ctr" defTabSz="622300">
+          <a:pPr marL="0" lvl="0" indent="0" algn="ctr" defTabSz="488950">
             <a:lnSpc>
               <a:spcPct val="90000"/>
             </a:lnSpc>
@@ -3062,18 +3062,18 @@
             <a:buNone/>
           </a:pPr>
           <a:r>
-            <a:rPr lang="en-US" sz="1400" b="1" kern="1200" dirty="0"/>
+            <a:rPr lang="en-US" sz="1100" b="1" kern="1200" dirty="0"/>
             <a:t>Exploitation</a:t>
           </a:r>
           <a:r>
-            <a:rPr lang="en-US" sz="1400" kern="1200" dirty="0"/>
+            <a:rPr lang="en-US" sz="1100" kern="1200" dirty="0"/>
             <a:t>: more playouts for states that have done well to get more accurate estimates.</a:t>
           </a:r>
         </a:p>
       </dsp:txBody>
       <dsp:txXfrm>
-        <a:off x="202187" y="1288711"/>
-        <a:ext cx="3971601" cy="933204"/>
+        <a:off x="157165" y="1024751"/>
+        <a:ext cx="3087236" cy="742061"/>
       </dsp:txXfrm>
     </dsp:sp>
   </dsp:spTree>
@@ -34080,8 +34080,8 @@
           </a:p>
         </p:txBody>
       </p:sp>
-      <mc:AlternateContent xmlns:mc="http://schemas.openxmlformats.org/markup-compatibility/2006">
-        <mc:Choice xmlns:a14="http://schemas.microsoft.com/office/drawing/2010/main" Requires="a14">
+      <mc:AlternateContent xmlns:mc="http://schemas.openxmlformats.org/markup-compatibility/2006" xmlns:a14="http://schemas.microsoft.com/office/drawing/2010/main">
+        <mc:Choice Requires="a14">
           <p:sp>
             <p:nvSpPr>
               <p:cNvPr id="5" name="Content Placeholder 4">
@@ -34667,7 +34667,7 @@
             </p:txBody>
           </p:sp>
         </mc:Choice>
-        <mc:Fallback>
+        <mc:Fallback xmlns="">
           <p:sp>
             <p:nvSpPr>
               <p:cNvPr id="5" name="Content Placeholder 4">
@@ -36799,8 +36799,8 @@
           </a:p>
         </p:txBody>
       </p:sp>
-      <mc:AlternateContent xmlns:mc="http://schemas.openxmlformats.org/markup-compatibility/2006">
-        <mc:Choice xmlns:a14="http://schemas.microsoft.com/office/drawing/2010/main" Requires="a14">
+      <mc:AlternateContent xmlns:mc="http://schemas.openxmlformats.org/markup-compatibility/2006" xmlns:a14="http://schemas.microsoft.com/office/drawing/2010/main">
+        <mc:Choice Requires="a14">
           <p:sp>
             <p:nvSpPr>
               <p:cNvPr id="5" name="Content Placeholder 4">
@@ -36943,7 +36943,7 @@
             </p:txBody>
           </p:sp>
         </mc:Choice>
-        <mc:Fallback>
+        <mc:Fallback xmlns="">
           <p:sp>
             <p:nvSpPr>
               <p:cNvPr id="5" name="Content Placeholder 4">
@@ -40043,8 +40043,8 @@
           </a:p>
         </p:txBody>
       </p:sp>
-      <mc:AlternateContent xmlns:mc="http://schemas.openxmlformats.org/markup-compatibility/2006">
-        <mc:Choice xmlns:a14="http://schemas.microsoft.com/office/drawing/2010/main" Requires="a14">
+      <mc:AlternateContent xmlns:mc="http://schemas.openxmlformats.org/markup-compatibility/2006" xmlns:a14="http://schemas.microsoft.com/office/drawing/2010/main">
+        <mc:Choice Requires="a14">
           <p:sp>
             <p:nvSpPr>
               <p:cNvPr id="3" name="Content Placeholder 2">
@@ -40215,7 +40215,7 @@
             </p:txBody>
           </p:sp>
         </mc:Choice>
-        <mc:Fallback>
+        <mc:Fallback xmlns="">
           <p:sp>
             <p:nvSpPr>
               <p:cNvPr id="3" name="Content Placeholder 2">
@@ -40663,10 +40663,15 @@
                 <p:ph idx="1"/>
               </p:nvPr>
             </p:nvSpPr>
-            <p:spPr/>
+            <p:spPr>
+              <a:xfrm>
+                <a:off x="628650" y="1515289"/>
+                <a:ext cx="7886700" cy="1378020"/>
+              </a:xfrm>
+            </p:spPr>
             <p:txBody>
               <a:bodyPr>
-                <a:normAutofit fontScale="85000" lnSpcReduction="20000"/>
+                <a:normAutofit fontScale="70000" lnSpcReduction="20000"/>
               </a:bodyPr>
               <a:lstStyle/>
               <a:p>
@@ -40678,9 +40683,6 @@
                   <a:rPr lang="en-US" dirty="0"/>
                   <a:t>: Find the next best move.</a:t>
                 </a:r>
-              </a:p>
-              <a:p>
-                <a:endParaRPr lang="en-US" dirty="0"/>
               </a:p>
               <a:p>
                 <a:r>
@@ -40727,42 +40729,7 @@
                 </a:pPr>
                 <a:r>
                   <a:rPr lang="en-US" dirty="0"/>
-                  <a:t>Select the move that results in the highest win percentage (</a:t>
-                </a:r>
-                <a14:m>
-                  <m:oMath xmlns:m="http://schemas.openxmlformats.org/officeDocument/2006/math">
-                    <m:r>
-                      <a:rPr lang="en-US" b="0" i="0" dirty="0" smtClean="0">
-                        <a:latin typeface="Cambria Math" panose="02040503050406030204" pitchFamily="18" charset="0"/>
-                      </a:rPr>
-                      <m:t>#</m:t>
-                    </m:r>
-                    <m:r>
-                      <m:rPr>
-                        <m:sty m:val="p"/>
-                      </m:rPr>
-                      <a:rPr lang="en-US" b="0" i="0" dirty="0" smtClean="0">
-                        <a:latin typeface="Cambria Math" panose="02040503050406030204" pitchFamily="18" charset="0"/>
-                      </a:rPr>
-                      <m:t>wins</m:t>
-                    </m:r>
-                    <m:r>
-                      <a:rPr lang="en-US" b="0" i="0" dirty="0" smtClean="0">
-                        <a:latin typeface="Cambria Math" panose="02040503050406030204" pitchFamily="18" charset="0"/>
-                      </a:rPr>
-                      <m:t>/</m:t>
-                    </m:r>
-                    <m:r>
-                      <a:rPr lang="en-US" i="1" dirty="0">
-                        <a:latin typeface="Cambria Math" panose="02040503050406030204" pitchFamily="18" charset="0"/>
-                      </a:rPr>
-                      <m:t>𝑁</m:t>
-                    </m:r>
-                  </m:oMath>
-                </a14:m>
-                <a:r>
-                  <a:rPr lang="en-US" dirty="0"/>
-                  <a:t>).</a:t>
+                  <a:t>Track which move has the highest win percentage (or largest expected utility) in its subtree.</a:t>
                 </a:r>
               </a:p>
               <a:p>
@@ -40772,6 +40739,89 @@
                 <a:endParaRPr lang="en-US" dirty="0"/>
               </a:p>
               <a:p>
+                <a:endParaRPr lang="en-US" b="1" dirty="0"/>
+              </a:p>
+            </p:txBody>
+          </p:sp>
+        </mc:Choice>
+        <mc:Fallback>
+          <p:sp>
+            <p:nvSpPr>
+              <p:cNvPr id="3" name="Content Placeholder 2">
+                <a:extLst>
+                  <a:ext uri="{FF2B5EF4-FFF2-40B4-BE49-F238E27FC236}">
+                    <a16:creationId xmlns:a16="http://schemas.microsoft.com/office/drawing/2014/main" id="{9E5BC60F-9922-4121-96B3-829D8DA4E635}"/>
+                  </a:ext>
+                </a:extLst>
+              </p:cNvPr>
+              <p:cNvSpPr>
+                <a:spLocks noGrp="1" noRot="1" noChangeAspect="1" noMove="1" noResize="1" noEditPoints="1" noAdjustHandles="1" noChangeArrowheads="1" noChangeShapeType="1" noTextEdit="1"/>
+              </p:cNvSpPr>
+              <p:nvPr>
+                <p:ph idx="1"/>
+              </p:nvPr>
+            </p:nvSpPr>
+            <p:spPr>
+              <a:xfrm>
+                <a:off x="628650" y="1515289"/>
+                <a:ext cx="7886700" cy="1378020"/>
+              </a:xfrm>
+              <a:blipFill>
+                <a:blip r:embed="rId2"/>
+                <a:stretch>
+                  <a:fillRect l="-696" t="-8407" b="-2212"/>
+                </a:stretch>
+              </a:blipFill>
+            </p:spPr>
+            <p:txBody>
+              <a:bodyPr/>
+              <a:lstStyle/>
+              <a:p>
+                <a:r>
+                  <a:rPr lang="en-US">
+                    <a:noFill/>
+                  </a:rPr>
+                  <a:t> </a:t>
+                </a:r>
+              </a:p>
+            </p:txBody>
+          </p:sp>
+        </mc:Fallback>
+      </mc:AlternateContent>
+      <mc:AlternateContent xmlns:mc="http://schemas.openxmlformats.org/markup-compatibility/2006" xmlns:a14="http://schemas.microsoft.com/office/drawing/2010/main">
+        <mc:Choice Requires="a14">
+          <p:sp>
+            <p:nvSpPr>
+              <p:cNvPr id="9" name="TextBox 8">
+                <a:extLst>
+                  <a:ext uri="{FF2B5EF4-FFF2-40B4-BE49-F238E27FC236}">
+                    <a16:creationId xmlns:a16="http://schemas.microsoft.com/office/drawing/2014/main" id="{50D29C90-D35D-701C-7863-6075D5B0F7D7}"/>
+                  </a:ext>
+                </a:extLst>
+              </p:cNvPr>
+              <p:cNvSpPr txBox="1"/>
+              <p:nvPr/>
+            </p:nvSpPr>
+            <p:spPr>
+              <a:xfrm>
+                <a:off x="739671" y="4867910"/>
+                <a:ext cx="7664658" cy="1477328"/>
+              </a:xfrm>
+              <a:prstGeom prst="rect">
+                <a:avLst/>
+              </a:prstGeom>
+              <a:noFill/>
+            </p:spPr>
+            <p:txBody>
+              <a:bodyPr wrap="square">
+                <a:spAutoFit/>
+              </a:bodyPr>
+              <a:lstStyle/>
+              <a:p>
+                <a:pPr marL="285750" indent="-285750">
+                  <a:buFont typeface="Arial" panose="020B0604020202020204" pitchFamily="34" charset="0"/>
+                  <a:buChar char="•"/>
+                </a:pPr>
                 <a:r>
                   <a:rPr lang="en-US" b="1" dirty="0"/>
                   <a:t>Optimality Guarantee</a:t>
@@ -40802,9 +40852,17 @@
                 </a:r>
               </a:p>
               <a:p>
+                <a:pPr marL="285750" indent="-285750">
+                  <a:buFont typeface="Arial" panose="020B0604020202020204" pitchFamily="34" charset="0"/>
+                  <a:buChar char="•"/>
+                </a:pPr>
                 <a:endParaRPr lang="en-US" dirty="0"/>
               </a:p>
               <a:p>
+                <a:pPr marL="285750" indent="-285750">
+                  <a:buFont typeface="Arial" panose="020B0604020202020204" pitchFamily="34" charset="0"/>
+                  <a:buChar char="•"/>
+                </a:pPr>
                 <a:r>
                   <a:rPr lang="en-US" dirty="0"/>
                   <a:t>Typical strategy for </a:t>
@@ -40841,28 +40899,33 @@
             </p:txBody>
           </p:sp>
         </mc:Choice>
-        <mc:Fallback>
+        <mc:Fallback xmlns="">
           <p:sp>
             <p:nvSpPr>
-              <p:cNvPr id="3" name="Content Placeholder 2">
+              <p:cNvPr id="9" name="TextBox 8">
                 <a:extLst>
                   <a:ext uri="{FF2B5EF4-FFF2-40B4-BE49-F238E27FC236}">
-                    <a16:creationId xmlns:a16="http://schemas.microsoft.com/office/drawing/2014/main" id="{9E5BC60F-9922-4121-96B3-829D8DA4E635}"/>
+                    <a16:creationId xmlns:a16="http://schemas.microsoft.com/office/drawing/2014/main" id="{50D29C90-D35D-701C-7863-6075D5B0F7D7}"/>
                   </a:ext>
                 </a:extLst>
               </p:cNvPr>
-              <p:cNvSpPr>
-                <a:spLocks noGrp="1" noRot="1" noChangeAspect="1" noMove="1" noResize="1" noEditPoints="1" noAdjustHandles="1" noChangeArrowheads="1" noChangeShapeType="1" noTextEdit="1"/>
+              <p:cNvSpPr txBox="1">
+                <a:spLocks noRot="1" noChangeAspect="1" noMove="1" noResize="1" noEditPoints="1" noAdjustHandles="1" noChangeArrowheads="1" noChangeShapeType="1" noTextEdit="1"/>
               </p:cNvSpPr>
-              <p:nvPr>
-                <p:ph idx="1"/>
-              </p:nvPr>
+              <p:nvPr/>
             </p:nvSpPr>
             <p:spPr>
+              <a:xfrm>
+                <a:off x="739671" y="4867910"/>
+                <a:ext cx="7664658" cy="1477328"/>
+              </a:xfrm>
+              <a:prstGeom prst="rect">
+                <a:avLst/>
+              </a:prstGeom>
               <a:blipFill>
-                <a:blip r:embed="rId2"/>
+                <a:blip r:embed="rId3"/>
                 <a:stretch>
-                  <a:fillRect l="-1005" t="-3221"/>
+                  <a:fillRect l="-477" t="-2479" b="-5785"/>
                 </a:stretch>
               </a:blipFill>
             </p:spPr>
@@ -40881,6 +40944,677 @@
           </p:sp>
         </mc:Fallback>
       </mc:AlternateContent>
+      <p:grpSp>
+        <p:nvGrpSpPr>
+          <p:cNvPr id="27" name="Group 26">
+            <a:extLst>
+              <a:ext uri="{FF2B5EF4-FFF2-40B4-BE49-F238E27FC236}">
+                <a16:creationId xmlns:a16="http://schemas.microsoft.com/office/drawing/2014/main" id="{32701E70-217E-662C-B4BF-42DB7BBE1CFD}"/>
+              </a:ext>
+            </a:extLst>
+          </p:cNvPr>
+          <p:cNvGrpSpPr/>
+          <p:nvPr/>
+        </p:nvGrpSpPr>
+        <p:grpSpPr>
+          <a:xfrm>
+            <a:off x="1371600" y="2940079"/>
+            <a:ext cx="7391400" cy="1357538"/>
+            <a:chOff x="1371600" y="2940079"/>
+            <a:chExt cx="7391400" cy="1357538"/>
+          </a:xfrm>
+        </p:grpSpPr>
+        <p:pic>
+          <p:nvPicPr>
+            <p:cNvPr id="11" name="Picture 10">
+              <a:extLst>
+                <a:ext uri="{FF2B5EF4-FFF2-40B4-BE49-F238E27FC236}">
+                  <a16:creationId xmlns:a16="http://schemas.microsoft.com/office/drawing/2014/main" id="{DA32E638-D1F9-F74C-576F-FDB9DA810811}"/>
+                </a:ext>
+              </a:extLst>
+            </p:cNvPr>
+            <p:cNvPicPr>
+              <a:picLocks noChangeAspect="1"/>
+            </p:cNvPicPr>
+            <p:nvPr/>
+          </p:nvPicPr>
+          <p:blipFill rotWithShape="1">
+            <a:blip r:embed="rId4"/>
+            <a:srcRect b="67721"/>
+            <a:stretch/>
+          </p:blipFill>
+          <p:spPr>
+            <a:xfrm>
+              <a:off x="1371600" y="2981248"/>
+              <a:ext cx="5943600" cy="1166991"/>
+            </a:xfrm>
+            <a:prstGeom prst="rect">
+              <a:avLst/>
+            </a:prstGeom>
+          </p:spPr>
+        </p:pic>
+        <p:sp>
+          <p:nvSpPr>
+            <p:cNvPr id="24" name="Speech Bubble: Rectangle with Corners Rounded 23">
+              <a:extLst>
+                <a:ext uri="{FF2B5EF4-FFF2-40B4-BE49-F238E27FC236}">
+                  <a16:creationId xmlns:a16="http://schemas.microsoft.com/office/drawing/2014/main" id="{3458479E-5358-E349-13FB-6FCCAA3003B8}"/>
+                </a:ext>
+              </a:extLst>
+            </p:cNvPr>
+            <p:cNvSpPr/>
+            <p:nvPr/>
+          </p:nvSpPr>
+          <p:spPr>
+            <a:xfrm>
+              <a:off x="5181600" y="2940079"/>
+              <a:ext cx="1524000" cy="234485"/>
+            </a:xfrm>
+            <a:prstGeom prst="wedgeRoundRectCallout">
+              <a:avLst>
+                <a:gd name="adj1" fmla="val -66079"/>
+                <a:gd name="adj2" fmla="val 44467"/>
+                <a:gd name="adj3" fmla="val 16667"/>
+              </a:avLst>
+            </a:prstGeom>
+          </p:spPr>
+          <p:style>
+            <a:lnRef idx="2">
+              <a:schemeClr val="accent3">
+                <a:shade val="15000"/>
+              </a:schemeClr>
+            </a:lnRef>
+            <a:fillRef idx="1">
+              <a:schemeClr val="accent3"/>
+            </a:fillRef>
+            <a:effectRef idx="0">
+              <a:schemeClr val="accent3"/>
+            </a:effectRef>
+            <a:fontRef idx="minor">
+              <a:schemeClr val="lt1"/>
+            </a:fontRef>
+          </p:style>
+          <p:txBody>
+            <a:bodyPr rtlCol="0" anchor="ctr"/>
+            <a:lstStyle/>
+            <a:p>
+              <a:pPr algn="ctr"/>
+              <a:r>
+                <a:rPr lang="en-US" sz="1600" dirty="0"/>
+                <a:t>Start playouts</a:t>
+              </a:r>
+            </a:p>
+          </p:txBody>
+        </p:sp>
+        <p:sp>
+          <p:nvSpPr>
+            <p:cNvPr id="25" name="Speech Bubble: Rectangle with Corners Rounded 24">
+              <a:extLst>
+                <a:ext uri="{FF2B5EF4-FFF2-40B4-BE49-F238E27FC236}">
+                  <a16:creationId xmlns:a16="http://schemas.microsoft.com/office/drawing/2014/main" id="{C481EE72-4D5B-5A99-50CD-E016B40C0E1B}"/>
+                </a:ext>
+              </a:extLst>
+            </p:cNvPr>
+            <p:cNvSpPr/>
+            <p:nvPr/>
+          </p:nvSpPr>
+          <p:spPr>
+            <a:xfrm>
+              <a:off x="7239000" y="3529901"/>
+              <a:ext cx="1524000" cy="490387"/>
+            </a:xfrm>
+            <a:prstGeom prst="wedgeRoundRectCallout">
+              <a:avLst>
+                <a:gd name="adj1" fmla="val -64603"/>
+                <a:gd name="adj2" fmla="val 6257"/>
+                <a:gd name="adj3" fmla="val 16667"/>
+              </a:avLst>
+            </a:prstGeom>
+          </p:spPr>
+          <p:style>
+            <a:lnRef idx="2">
+              <a:schemeClr val="accent3">
+                <a:shade val="15000"/>
+              </a:schemeClr>
+            </a:lnRef>
+            <a:fillRef idx="1">
+              <a:schemeClr val="accent3"/>
+            </a:fillRef>
+            <a:effectRef idx="0">
+              <a:schemeClr val="accent3"/>
+            </a:effectRef>
+            <a:fontRef idx="minor">
+              <a:schemeClr val="lt1"/>
+            </a:fontRef>
+          </p:style>
+          <p:txBody>
+            <a:bodyPr rtlCol="0" anchor="ctr"/>
+            <a:lstStyle/>
+            <a:p>
+              <a:pPr algn="ctr"/>
+              <a:r>
+                <a:rPr lang="en-US" sz="1600" dirty="0"/>
+                <a:t>Estimate win probability</a:t>
+              </a:r>
+            </a:p>
+          </p:txBody>
+        </p:sp>
+        <p:sp>
+          <p:nvSpPr>
+            <p:cNvPr id="26" name="Rectangle 25">
+              <a:extLst>
+                <a:ext uri="{FF2B5EF4-FFF2-40B4-BE49-F238E27FC236}">
+                  <a16:creationId xmlns:a16="http://schemas.microsoft.com/office/drawing/2014/main" id="{0CAFE15D-30E3-7284-C647-2F6D6D66F693}"/>
+                </a:ext>
+              </a:extLst>
+            </p:cNvPr>
+            <p:cNvSpPr/>
+            <p:nvPr/>
+          </p:nvSpPr>
+          <p:spPr>
+            <a:xfrm>
+              <a:off x="2492115" y="3529901"/>
+              <a:ext cx="4648200" cy="767716"/>
+            </a:xfrm>
+            <a:prstGeom prst="rect">
+              <a:avLst/>
+            </a:prstGeom>
+            <a:noFill/>
+            <a:ln w="9525" cap="flat" cmpd="sng" algn="ctr">
+              <a:solidFill>
+                <a:schemeClr val="accent2"/>
+              </a:solidFill>
+              <a:prstDash val="solid"/>
+              <a:round/>
+              <a:headEnd type="none" w="med" len="med"/>
+              <a:tailEnd type="none" w="med" len="med"/>
+            </a:ln>
+          </p:spPr>
+          <p:style>
+            <a:lnRef idx="0">
+              <a:scrgbClr r="0" g="0" b="0"/>
+            </a:lnRef>
+            <a:fillRef idx="0">
+              <a:scrgbClr r="0" g="0" b="0"/>
+            </a:fillRef>
+            <a:effectRef idx="0">
+              <a:scrgbClr r="0" g="0" b="0"/>
+            </a:effectRef>
+            <a:fontRef idx="minor">
+              <a:schemeClr val="accent2"/>
+            </a:fontRef>
+          </p:style>
+          <p:txBody>
+            <a:bodyPr rtlCol="0" anchor="ctr"/>
+            <a:lstStyle/>
+            <a:p>
+              <a:pPr algn="ctr"/>
+              <a:endParaRPr lang="en-US"/>
+            </a:p>
+          </p:txBody>
+        </p:sp>
+      </p:grpSp>
+      <p:grpSp>
+        <p:nvGrpSpPr>
+          <p:cNvPr id="17" name="Group 16">
+            <a:extLst>
+              <a:ext uri="{FF2B5EF4-FFF2-40B4-BE49-F238E27FC236}">
+                <a16:creationId xmlns:a16="http://schemas.microsoft.com/office/drawing/2014/main" id="{EBC61A15-45F5-693B-350E-32C350E23076}"/>
+              </a:ext>
+            </a:extLst>
+          </p:cNvPr>
+          <p:cNvGrpSpPr/>
+          <p:nvPr/>
+        </p:nvGrpSpPr>
+        <p:grpSpPr>
+          <a:xfrm>
+            <a:off x="720494" y="3206132"/>
+            <a:ext cx="6234059" cy="1132121"/>
+            <a:chOff x="720494" y="3206132"/>
+            <a:chExt cx="6234059" cy="1132121"/>
+          </a:xfrm>
+        </p:grpSpPr>
+        <p:sp>
+          <p:nvSpPr>
+            <p:cNvPr id="4" name="TextBox 3">
+              <a:extLst>
+                <a:ext uri="{FF2B5EF4-FFF2-40B4-BE49-F238E27FC236}">
+                  <a16:creationId xmlns:a16="http://schemas.microsoft.com/office/drawing/2014/main" id="{280B5962-5E88-98CC-2991-C6B8D2794DB1}"/>
+                </a:ext>
+              </a:extLst>
+            </p:cNvPr>
+            <p:cNvSpPr txBox="1"/>
+            <p:nvPr/>
+          </p:nvSpPr>
+          <p:spPr>
+            <a:xfrm>
+              <a:off x="720494" y="4020618"/>
+              <a:ext cx="1196715" cy="276999"/>
+            </a:xfrm>
+            <a:prstGeom prst="rect">
+              <a:avLst/>
+            </a:prstGeom>
+          </p:spPr>
+          <p:style>
+            <a:lnRef idx="2">
+              <a:schemeClr val="accent2">
+                <a:shade val="15000"/>
+              </a:schemeClr>
+            </a:lnRef>
+            <a:fillRef idx="1">
+              <a:schemeClr val="accent2"/>
+            </a:fillRef>
+            <a:effectRef idx="0">
+              <a:schemeClr val="accent2"/>
+            </a:effectRef>
+            <a:fontRef idx="minor">
+              <a:schemeClr val="lt1"/>
+            </a:fontRef>
+          </p:style>
+          <p:txBody>
+            <a:bodyPr wrap="square" rtlCol="0">
+              <a:spAutoFit/>
+            </a:bodyPr>
+            <a:lstStyle/>
+            <a:p>
+              <a:r>
+                <a:rPr lang="en-US" sz="1200" dirty="0"/>
+                <a:t>#wins/playouts</a:t>
+              </a:r>
+            </a:p>
+          </p:txBody>
+        </p:sp>
+        <p:sp>
+          <p:nvSpPr>
+            <p:cNvPr id="5" name="TextBox 4">
+              <a:extLst>
+                <a:ext uri="{FF2B5EF4-FFF2-40B4-BE49-F238E27FC236}">
+                  <a16:creationId xmlns:a16="http://schemas.microsoft.com/office/drawing/2014/main" id="{2AE58547-616F-2E88-9A38-9245F7541311}"/>
+                </a:ext>
+              </a:extLst>
+            </p:cNvPr>
+            <p:cNvSpPr txBox="1"/>
+            <p:nvPr/>
+          </p:nvSpPr>
+          <p:spPr>
+            <a:xfrm>
+              <a:off x="2667000" y="4050908"/>
+              <a:ext cx="458780" cy="276999"/>
+            </a:xfrm>
+            <a:prstGeom prst="rect">
+              <a:avLst/>
+            </a:prstGeom>
+            <a:noFill/>
+          </p:spPr>
+          <p:txBody>
+            <a:bodyPr wrap="none" rtlCol="0">
+              <a:spAutoFit/>
+            </a:bodyPr>
+            <a:lstStyle/>
+            <a:p>
+              <a:r>
+                <a:rPr lang="en-US" sz="1200" dirty="0">
+                  <a:solidFill>
+                    <a:schemeClr val="accent2"/>
+                  </a:solidFill>
+                </a:rPr>
+                <a:t>0.54</a:t>
+              </a:r>
+            </a:p>
+          </p:txBody>
+        </p:sp>
+        <p:sp>
+          <p:nvSpPr>
+            <p:cNvPr id="6" name="TextBox 5">
+              <a:extLst>
+                <a:ext uri="{FF2B5EF4-FFF2-40B4-BE49-F238E27FC236}">
+                  <a16:creationId xmlns:a16="http://schemas.microsoft.com/office/drawing/2014/main" id="{B9493EA8-7B54-1729-8160-552DC171EBBB}"/>
+                </a:ext>
+              </a:extLst>
+            </p:cNvPr>
+            <p:cNvSpPr txBox="1"/>
+            <p:nvPr/>
+          </p:nvSpPr>
+          <p:spPr>
+            <a:xfrm>
+              <a:off x="3116870" y="4050908"/>
+              <a:ext cx="458780" cy="276999"/>
+            </a:xfrm>
+            <a:prstGeom prst="rect">
+              <a:avLst/>
+            </a:prstGeom>
+            <a:noFill/>
+          </p:spPr>
+          <p:txBody>
+            <a:bodyPr wrap="none" rtlCol="0">
+              <a:spAutoFit/>
+            </a:bodyPr>
+            <a:lstStyle/>
+            <a:p>
+              <a:r>
+                <a:rPr lang="en-US" sz="1200" dirty="0">
+                  <a:solidFill>
+                    <a:schemeClr val="accent2"/>
+                  </a:solidFill>
+                </a:rPr>
+                <a:t>0.50</a:t>
+              </a:r>
+            </a:p>
+          </p:txBody>
+        </p:sp>
+        <p:sp>
+          <p:nvSpPr>
+            <p:cNvPr id="7" name="TextBox 6">
+              <a:extLst>
+                <a:ext uri="{FF2B5EF4-FFF2-40B4-BE49-F238E27FC236}">
+                  <a16:creationId xmlns:a16="http://schemas.microsoft.com/office/drawing/2014/main" id="{698DFABD-0200-8A55-A16D-768ACAD69112}"/>
+                </a:ext>
+              </a:extLst>
+            </p:cNvPr>
+            <p:cNvSpPr txBox="1"/>
+            <p:nvPr/>
+          </p:nvSpPr>
+          <p:spPr>
+            <a:xfrm>
+              <a:off x="3611380" y="4050908"/>
+              <a:ext cx="458780" cy="276999"/>
+            </a:xfrm>
+            <a:prstGeom prst="rect">
+              <a:avLst/>
+            </a:prstGeom>
+            <a:noFill/>
+          </p:spPr>
+          <p:txBody>
+            <a:bodyPr wrap="none" rtlCol="0">
+              <a:spAutoFit/>
+            </a:bodyPr>
+            <a:lstStyle/>
+            <a:p>
+              <a:r>
+                <a:rPr lang="en-US" sz="1200" dirty="0">
+                  <a:solidFill>
+                    <a:schemeClr val="accent2"/>
+                  </a:solidFill>
+                </a:rPr>
+                <a:t>0.62</a:t>
+              </a:r>
+            </a:p>
+          </p:txBody>
+        </p:sp>
+        <p:sp>
+          <p:nvSpPr>
+            <p:cNvPr id="8" name="TextBox 7">
+              <a:extLst>
+                <a:ext uri="{FF2B5EF4-FFF2-40B4-BE49-F238E27FC236}">
+                  <a16:creationId xmlns:a16="http://schemas.microsoft.com/office/drawing/2014/main" id="{6ED8D035-3541-B736-3945-7B01CDE20D73}"/>
+                </a:ext>
+              </a:extLst>
+            </p:cNvPr>
+            <p:cNvSpPr txBox="1"/>
+            <p:nvPr/>
+          </p:nvSpPr>
+          <p:spPr>
+            <a:xfrm>
+              <a:off x="4100151" y="4050907"/>
+              <a:ext cx="458780" cy="276999"/>
+            </a:xfrm>
+            <a:prstGeom prst="rect">
+              <a:avLst/>
+            </a:prstGeom>
+            <a:noFill/>
+          </p:spPr>
+          <p:txBody>
+            <a:bodyPr wrap="none" rtlCol="0">
+              <a:spAutoFit/>
+            </a:bodyPr>
+            <a:lstStyle/>
+            <a:p>
+              <a:r>
+                <a:rPr lang="en-US" sz="1200" dirty="0">
+                  <a:solidFill>
+                    <a:schemeClr val="accent2"/>
+                  </a:solidFill>
+                </a:rPr>
+                <a:t>0.57</a:t>
+              </a:r>
+            </a:p>
+          </p:txBody>
+        </p:sp>
+        <p:sp>
+          <p:nvSpPr>
+            <p:cNvPr id="10" name="TextBox 9">
+              <a:extLst>
+                <a:ext uri="{FF2B5EF4-FFF2-40B4-BE49-F238E27FC236}">
+                  <a16:creationId xmlns:a16="http://schemas.microsoft.com/office/drawing/2014/main" id="{069F41AC-CBE4-1612-4FCA-4ADE80FCA59A}"/>
+                </a:ext>
+              </a:extLst>
+            </p:cNvPr>
+            <p:cNvSpPr txBox="1"/>
+            <p:nvPr/>
+          </p:nvSpPr>
+          <p:spPr>
+            <a:xfrm>
+              <a:off x="4558931" y="4050562"/>
+              <a:ext cx="458780" cy="276999"/>
+            </a:xfrm>
+            <a:prstGeom prst="rect">
+              <a:avLst/>
+            </a:prstGeom>
+            <a:noFill/>
+          </p:spPr>
+          <p:txBody>
+            <a:bodyPr wrap="none" rtlCol="0">
+              <a:spAutoFit/>
+            </a:bodyPr>
+            <a:lstStyle/>
+            <a:p>
+              <a:r>
+                <a:rPr lang="en-US" sz="1200" dirty="0">
+                  <a:solidFill>
+                    <a:schemeClr val="accent2"/>
+                  </a:solidFill>
+                </a:rPr>
+                <a:t>0.78</a:t>
+              </a:r>
+            </a:p>
+          </p:txBody>
+        </p:sp>
+        <p:sp>
+          <p:nvSpPr>
+            <p:cNvPr id="12" name="TextBox 11">
+              <a:extLst>
+                <a:ext uri="{FF2B5EF4-FFF2-40B4-BE49-F238E27FC236}">
+                  <a16:creationId xmlns:a16="http://schemas.microsoft.com/office/drawing/2014/main" id="{7BBADD54-8DA9-E1B7-0F8F-B31F902E7B3E}"/>
+                </a:ext>
+              </a:extLst>
+            </p:cNvPr>
+            <p:cNvSpPr txBox="1"/>
+            <p:nvPr/>
+          </p:nvSpPr>
+          <p:spPr>
+            <a:xfrm>
+              <a:off x="5036104" y="4050562"/>
+              <a:ext cx="458780" cy="276999"/>
+            </a:xfrm>
+            <a:prstGeom prst="rect">
+              <a:avLst/>
+            </a:prstGeom>
+            <a:noFill/>
+          </p:spPr>
+          <p:txBody>
+            <a:bodyPr wrap="none" rtlCol="0">
+              <a:spAutoFit/>
+            </a:bodyPr>
+            <a:lstStyle/>
+            <a:p>
+              <a:r>
+                <a:rPr lang="en-US" sz="1200" dirty="0">
+                  <a:solidFill>
+                    <a:schemeClr val="accent2"/>
+                  </a:solidFill>
+                </a:rPr>
+                <a:t>0.52</a:t>
+              </a:r>
+            </a:p>
+          </p:txBody>
+        </p:sp>
+        <p:sp>
+          <p:nvSpPr>
+            <p:cNvPr id="13" name="TextBox 12">
+              <a:extLst>
+                <a:ext uri="{FF2B5EF4-FFF2-40B4-BE49-F238E27FC236}">
+                  <a16:creationId xmlns:a16="http://schemas.microsoft.com/office/drawing/2014/main" id="{4E43AD03-EC72-003C-F29B-72131BAE030E}"/>
+                </a:ext>
+              </a:extLst>
+            </p:cNvPr>
+            <p:cNvSpPr txBox="1"/>
+            <p:nvPr/>
+          </p:nvSpPr>
+          <p:spPr>
+            <a:xfrm>
+              <a:off x="5533302" y="4035590"/>
+              <a:ext cx="458780" cy="276999"/>
+            </a:xfrm>
+            <a:prstGeom prst="rect">
+              <a:avLst/>
+            </a:prstGeom>
+            <a:noFill/>
+          </p:spPr>
+          <p:txBody>
+            <a:bodyPr wrap="none" rtlCol="0">
+              <a:spAutoFit/>
+            </a:bodyPr>
+            <a:lstStyle/>
+            <a:p>
+              <a:r>
+                <a:rPr lang="en-US" sz="1200" dirty="0">
+                  <a:solidFill>
+                    <a:schemeClr val="accent2"/>
+                  </a:solidFill>
+                </a:rPr>
+                <a:t>0.38</a:t>
+              </a:r>
+            </a:p>
+          </p:txBody>
+        </p:sp>
+        <p:sp>
+          <p:nvSpPr>
+            <p:cNvPr id="14" name="TextBox 13">
+              <a:extLst>
+                <a:ext uri="{FF2B5EF4-FFF2-40B4-BE49-F238E27FC236}">
+                  <a16:creationId xmlns:a16="http://schemas.microsoft.com/office/drawing/2014/main" id="{D4D6C62E-509D-CEA1-417A-63049D6B98CF}"/>
+                </a:ext>
+              </a:extLst>
+            </p:cNvPr>
+            <p:cNvSpPr txBox="1"/>
+            <p:nvPr/>
+          </p:nvSpPr>
+          <p:spPr>
+            <a:xfrm>
+              <a:off x="6007002" y="4054905"/>
+              <a:ext cx="458780" cy="276999"/>
+            </a:xfrm>
+            <a:prstGeom prst="rect">
+              <a:avLst/>
+            </a:prstGeom>
+            <a:noFill/>
+          </p:spPr>
+          <p:txBody>
+            <a:bodyPr wrap="none" rtlCol="0">
+              <a:spAutoFit/>
+            </a:bodyPr>
+            <a:lstStyle/>
+            <a:p>
+              <a:r>
+                <a:rPr lang="en-US" sz="1200" dirty="0">
+                  <a:solidFill>
+                    <a:schemeClr val="accent2"/>
+                  </a:solidFill>
+                </a:rPr>
+                <a:t>0.65</a:t>
+              </a:r>
+            </a:p>
+          </p:txBody>
+        </p:sp>
+        <p:sp>
+          <p:nvSpPr>
+            <p:cNvPr id="15" name="TextBox 14">
+              <a:extLst>
+                <a:ext uri="{FF2B5EF4-FFF2-40B4-BE49-F238E27FC236}">
+                  <a16:creationId xmlns:a16="http://schemas.microsoft.com/office/drawing/2014/main" id="{9592F80D-0904-AD2A-4E0A-4DD6B06C3DD1}"/>
+                </a:ext>
+              </a:extLst>
+            </p:cNvPr>
+            <p:cNvSpPr txBox="1"/>
+            <p:nvPr/>
+          </p:nvSpPr>
+          <p:spPr>
+            <a:xfrm>
+              <a:off x="6495773" y="4061254"/>
+              <a:ext cx="458780" cy="276999"/>
+            </a:xfrm>
+            <a:prstGeom prst="rect">
+              <a:avLst/>
+            </a:prstGeom>
+            <a:noFill/>
+          </p:spPr>
+          <p:txBody>
+            <a:bodyPr wrap="none" rtlCol="0">
+              <a:spAutoFit/>
+            </a:bodyPr>
+            <a:lstStyle/>
+            <a:p>
+              <a:r>
+                <a:rPr lang="en-US" sz="1200" dirty="0">
+                  <a:solidFill>
+                    <a:schemeClr val="accent2"/>
+                  </a:solidFill>
+                </a:rPr>
+                <a:t>0.14</a:t>
+              </a:r>
+            </a:p>
+          </p:txBody>
+        </p:sp>
+        <p:sp>
+          <p:nvSpPr>
+            <p:cNvPr id="16" name="TextBox 15">
+              <a:extLst>
+                <a:ext uri="{FF2B5EF4-FFF2-40B4-BE49-F238E27FC236}">
+                  <a16:creationId xmlns:a16="http://schemas.microsoft.com/office/drawing/2014/main" id="{2C78FAE4-36AD-D85F-224A-1A401B9B97BE}"/>
+                </a:ext>
+              </a:extLst>
+            </p:cNvPr>
+            <p:cNvSpPr txBox="1"/>
+            <p:nvPr/>
+          </p:nvSpPr>
+          <p:spPr>
+            <a:xfrm>
+              <a:off x="4952210" y="3206132"/>
+              <a:ext cx="458780" cy="276999"/>
+            </a:xfrm>
+            <a:prstGeom prst="rect">
+              <a:avLst/>
+            </a:prstGeom>
+            <a:noFill/>
+          </p:spPr>
+          <p:txBody>
+            <a:bodyPr wrap="none" rtlCol="0">
+              <a:spAutoFit/>
+            </a:bodyPr>
+            <a:lstStyle/>
+            <a:p>
+              <a:r>
+                <a:rPr lang="en-US" sz="1200" dirty="0">
+                  <a:solidFill>
+                    <a:schemeClr val="accent2"/>
+                  </a:solidFill>
+                </a:rPr>
+                <a:t>0.61</a:t>
+              </a:r>
+            </a:p>
+          </p:txBody>
+        </p:sp>
+      </p:grpSp>
     </p:spTree>
     <p:extLst>
       <p:ext uri="{BB962C8B-B14F-4D97-AF65-F5344CB8AC3E}">
@@ -40925,11 +41659,7 @@
                                           </p:stCondLst>
                                         </p:cTn>
                                         <p:tgtEl>
-                                          <p:spTgt spid="3">
-                                            <p:txEl>
-                                              <p:pRg st="6" end="6"/>
-                                            </p:txEl>
-                                          </p:spTgt>
+                                          <p:spTgt spid="17"/>
                                         </p:tgtEl>
                                         <p:attrNameLst>
                                           <p:attrName>style.visibility</p:attrName>
@@ -40961,7 +41691,7 @@
                             </p:stCondLst>
                             <p:childTnLst>
                               <p:par>
-                                <p:cTn id="9" presetID="1" presetClass="entr" presetSubtype="0" fill="hold" nodeType="clickEffect">
+                                <p:cTn id="9" presetID="1" presetClass="entr" presetSubtype="0" fill="hold" grpId="0" nodeType="clickEffect">
                                   <p:stCondLst>
                                     <p:cond delay="0"/>
                                   </p:stCondLst>
@@ -40974,11 +41704,7 @@
                                           </p:stCondLst>
                                         </p:cTn>
                                         <p:tgtEl>
-                                          <p:spTgt spid="3">
-                                            <p:txEl>
-                                              <p:pRg st="8" end="8"/>
-                                            </p:txEl>
-                                          </p:spTgt>
+                                          <p:spTgt spid="9"/>
                                         </p:tgtEl>
                                         <p:attrNameLst>
                                           <p:attrName>style.visibility</p:attrName>
@@ -41018,6 +41744,9 @@
         </p:cTn>
       </p:par>
     </p:tnLst>
+    <p:bldLst>
+      <p:bldP spid="9" grpId="0"/>
+    </p:bldLst>
   </p:timing>
 </p:sld>
 </file>
@@ -41086,12 +41815,12 @@
         <p:spPr>
           <a:xfrm>
             <a:off x="762000" y="2945395"/>
-            <a:ext cx="7886700" cy="1325563"/>
+            <a:ext cx="7886700" cy="1450062"/>
           </a:xfrm>
         </p:spPr>
         <p:txBody>
           <a:bodyPr>
-            <a:normAutofit fontScale="62500" lnSpcReduction="20000"/>
+            <a:normAutofit fontScale="55000" lnSpcReduction="20000"/>
           </a:bodyPr>
           <a:lstStyle/>
           <a:p>
@@ -41106,6 +41835,12 @@
               <a:rPr lang="en-US" dirty="0"/>
               <a:t>: Pure Monte Carlo Search with a random playout policy spends a lot of time to create playouts for bad move.</a:t>
             </a:r>
+          </a:p>
+          <a:p>
+            <a:pPr marL="0" indent="0">
+              <a:buNone/>
+            </a:pPr>
+            <a:endParaRPr lang="en-US" b="1" dirty="0"/>
           </a:p>
           <a:p>
             <a:pPr marL="0" indent="0">
@@ -41144,14 +41879,14 @@
           <p:nvPr>
             <p:extLst>
               <p:ext uri="{D42A27DB-BD31-4B8C-83A1-F6EECF244321}">
-                <p14:modId xmlns:p14="http://schemas.microsoft.com/office/powerpoint/2010/main" val="167018402"/>
+                <p14:modId xmlns:p14="http://schemas.microsoft.com/office/powerpoint/2010/main" val="40584790"/>
               </p:ext>
             </p:extLst>
           </p:nvPr>
         </p:nvGraphicFramePr>
         <p:xfrm>
-          <a:off x="1019175" y="4270958"/>
-          <a:ext cx="7058025" cy="2221916"/>
+          <a:off x="2057400" y="4410447"/>
+          <a:ext cx="5486400" cy="1766813"/>
         </p:xfrm>
         <a:graphic>
           <a:graphicData uri="http://schemas.openxmlformats.org/drawingml/2006/diagram">
@@ -41365,7 +42100,7 @@
                                         <p:tgtEl>
                                           <p:spTgt spid="3">
                                             <p:txEl>
-                                              <p:pRg st="1" end="1"/>
+                                              <p:pRg st="2" end="2"/>
                                             </p:txEl>
                                           </p:spTgt>
                                         </p:tgtEl>
@@ -41396,7 +42131,7 @@
                                         <p:tgtEl>
                                           <p:spTgt spid="3">
                                             <p:txEl>
-                                              <p:pRg st="2" end="2"/>
+                                              <p:pRg st="3" end="3"/>
                                             </p:txEl>
                                           </p:spTgt>
                                         </p:tgtEl>
@@ -43126,7 +43861,7 @@
             </a:r>
             <a:r>
               <a:rPr lang="en-US" sz="2400" dirty="0"/>
-              <a:t>search always start playouts from a given state.</a:t>
+              <a:t>search always start playouts from a given state (or its children).</a:t>
             </a:r>
           </a:p>
           <a:p>
@@ -44799,6 +45534,42 @@
             <a:r>
               <a:rPr lang="en-US" sz="1200" dirty="0"/>
               <a:t>(update counts)</a:t>
+            </a:r>
+          </a:p>
+        </p:txBody>
+      </p:sp>
+      <p:sp>
+        <p:nvSpPr>
+          <p:cNvPr id="18" name="TextBox 17">
+            <a:extLst>
+              <a:ext uri="{FF2B5EF4-FFF2-40B4-BE49-F238E27FC236}">
+                <a16:creationId xmlns:a16="http://schemas.microsoft.com/office/drawing/2014/main" id="{8216AA83-99CB-361C-EB6F-26ACC27A17D8}"/>
+              </a:ext>
+            </a:extLst>
+          </p:cNvPr>
+          <p:cNvSpPr txBox="1"/>
+          <p:nvPr/>
+        </p:nvSpPr>
+        <p:spPr>
+          <a:xfrm rot="16200000">
+            <a:off x="-774260" y="4044221"/>
+            <a:ext cx="2182890" cy="307777"/>
+          </a:xfrm>
+          <a:prstGeom prst="rect">
+            <a:avLst/>
+          </a:prstGeom>
+          <a:noFill/>
+        </p:spPr>
+        <p:txBody>
+          <a:bodyPr wrap="square" rtlCol="0">
+            <a:spAutoFit/>
+          </a:bodyPr>
+          <a:lstStyle/>
+          <a:p>
+            <a:pPr algn="ctr"/>
+            <a:r>
+              <a:rPr lang="en-US" sz="1400" dirty="0"/>
+              <a:t>First few levels</a:t>
             </a:r>
           </a:p>
         </p:txBody>

</xml_diff>